<commit_message>
Atualizacao anotacoes ppt parte 2
</commit_message>
<xml_diff>
--- a/Curso Web API Parte 2.pptx
+++ b/Curso Web API Parte 2.pptx
@@ -5,10 +5,10 @@
     <p:sldMasterId id="2147483660" r:id="rId1"/>
   </p:sldMasterIdLst>
   <p:notesMasterIdLst>
-    <p:notesMasterId r:id="rId35"/>
+    <p:notesMasterId r:id="rId36"/>
   </p:notesMasterIdLst>
   <p:handoutMasterIdLst>
-    <p:handoutMasterId r:id="rId36"/>
+    <p:handoutMasterId r:id="rId37"/>
   </p:handoutMasterIdLst>
   <p:sldIdLst>
     <p:sldId id="256" r:id="rId2"/>
@@ -43,7 +43,8 @@
     <p:sldId id="323" r:id="rId31"/>
     <p:sldId id="324" r:id="rId32"/>
     <p:sldId id="325" r:id="rId33"/>
-    <p:sldId id="282" r:id="rId34"/>
+    <p:sldId id="326" r:id="rId34"/>
+    <p:sldId id="282" r:id="rId35"/>
   </p:sldIdLst>
   <p:sldSz cx="12192000" cy="6858000"/>
   <p:notesSz cx="6858000" cy="9144000"/>
@@ -183,6 +184,7 @@
             <p14:sldId id="323"/>
             <p14:sldId id="324"/>
             <p14:sldId id="325"/>
+            <p14:sldId id="326"/>
           </p14:sldIdLst>
         </p14:section>
         <p14:section name="Learn More" id="{2CC34DB2-6590-42C0-AD4B-A04C6060184E}">
@@ -273,6 +275,20 @@
 </p:cmLst>
 </file>
 
+<file path=ppt/comments/comment4.xml><?xml version="1.0" encoding="utf-8"?>
+<p:cmLst xmlns:a="http://schemas.openxmlformats.org/drawingml/2006/main" xmlns:r="http://schemas.openxmlformats.org/officeDocument/2006/relationships" xmlns:p="http://schemas.openxmlformats.org/presentationml/2006/main">
+  <p:cm authorId="3" dt="2018-01-04T10:56:22.186" idx="2">
+    <p:pos x="10" y="10"/>
+    <p:text>AOP</p:text>
+    <p:extLst>
+      <p:ext uri="{C676402C-5697-4E1C-873F-D02D1690AC5C}">
+        <p15:threadingInfo xmlns:p15="http://schemas.microsoft.com/office/powerpoint/2012/main" timeZoneBias="120"/>
+      </p:ext>
+    </p:extLst>
+  </p:cm>
+</p:cmLst>
+</file>
+
 <file path=ppt/diagrams/colors1.xml><?xml version="1.0" encoding="utf-8"?>
 <dgm:colorsDef xmlns:dgm="http://schemas.openxmlformats.org/drawingml/2006/diagram" xmlns:a="http://schemas.openxmlformats.org/drawingml/2006/main" uniqueId="urn:microsoft.com/office/officeart/2005/8/colors/accent2_2">
   <dgm:title val=""/>
@@ -1793,6 +1809,753 @@
   <dgm:styleLbl name="fgShp">
     <dgm:fillClrLst meth="repeat">
       <a:schemeClr val="accent2">
+        <a:tint val="60000"/>
+      </a:schemeClr>
+    </dgm:fillClrLst>
+    <dgm:linClrLst meth="repeat">
+      <a:schemeClr val="lt1"/>
+    </dgm:linClrLst>
+    <dgm:effectClrLst/>
+    <dgm:txLinClrLst/>
+    <dgm:txFillClrLst meth="repeat">
+      <a:schemeClr val="dk1"/>
+    </dgm:txFillClrLst>
+    <dgm:txEffectClrLst/>
+  </dgm:styleLbl>
+  <dgm:styleLbl name="revTx">
+    <dgm:fillClrLst meth="repeat">
+      <a:schemeClr val="lt1">
+        <a:alpha val="0"/>
+      </a:schemeClr>
+    </dgm:fillClrLst>
+    <dgm:linClrLst meth="repeat">
+      <a:schemeClr val="dk1">
+        <a:alpha val="0"/>
+      </a:schemeClr>
+    </dgm:linClrLst>
+    <dgm:effectClrLst/>
+    <dgm:txLinClrLst/>
+    <dgm:txFillClrLst meth="repeat">
+      <a:schemeClr val="tx1"/>
+    </dgm:txFillClrLst>
+    <dgm:txEffectClrLst/>
+  </dgm:styleLbl>
+</dgm:colorsDef>
+</file>
+
+<file path=ppt/diagrams/colors11.xml><?xml version="1.0" encoding="utf-8"?>
+<dgm:colorsDef xmlns:dgm="http://schemas.openxmlformats.org/drawingml/2006/diagram" xmlns:a="http://schemas.openxmlformats.org/drawingml/2006/main" uniqueId="urn:microsoft.com/office/officeart/2005/8/colors/accent1_2">
+  <dgm:title val=""/>
+  <dgm:desc val=""/>
+  <dgm:catLst>
+    <dgm:cat type="accent1" pri="11200"/>
+  </dgm:catLst>
+  <dgm:styleLbl name="node0">
+    <dgm:fillClrLst meth="repeat">
+      <a:schemeClr val="accent1"/>
+    </dgm:fillClrLst>
+    <dgm:linClrLst meth="repeat">
+      <a:schemeClr val="lt1"/>
+    </dgm:linClrLst>
+    <dgm:effectClrLst/>
+    <dgm:txLinClrLst/>
+    <dgm:txFillClrLst/>
+    <dgm:txEffectClrLst/>
+  </dgm:styleLbl>
+  <dgm:styleLbl name="alignNode1">
+    <dgm:fillClrLst meth="repeat">
+      <a:schemeClr val="accent1"/>
+    </dgm:fillClrLst>
+    <dgm:linClrLst meth="repeat">
+      <a:schemeClr val="accent1"/>
+    </dgm:linClrLst>
+    <dgm:effectClrLst/>
+    <dgm:txLinClrLst/>
+    <dgm:txFillClrLst/>
+    <dgm:txEffectClrLst/>
+  </dgm:styleLbl>
+  <dgm:styleLbl name="node1">
+    <dgm:fillClrLst meth="repeat">
+      <a:schemeClr val="accent1"/>
+    </dgm:fillClrLst>
+    <dgm:linClrLst meth="repeat">
+      <a:schemeClr val="lt1"/>
+    </dgm:linClrLst>
+    <dgm:effectClrLst/>
+    <dgm:txLinClrLst/>
+    <dgm:txFillClrLst/>
+    <dgm:txEffectClrLst/>
+  </dgm:styleLbl>
+  <dgm:styleLbl name="lnNode1">
+    <dgm:fillClrLst meth="repeat">
+      <a:schemeClr val="accent1"/>
+    </dgm:fillClrLst>
+    <dgm:linClrLst meth="repeat">
+      <a:schemeClr val="lt1"/>
+    </dgm:linClrLst>
+    <dgm:effectClrLst/>
+    <dgm:txLinClrLst/>
+    <dgm:txFillClrLst/>
+    <dgm:txEffectClrLst/>
+  </dgm:styleLbl>
+  <dgm:styleLbl name="vennNode1">
+    <dgm:fillClrLst meth="repeat">
+      <a:schemeClr val="accent1">
+        <a:alpha val="50000"/>
+      </a:schemeClr>
+    </dgm:fillClrLst>
+    <dgm:linClrLst meth="repeat">
+      <a:schemeClr val="lt1"/>
+    </dgm:linClrLst>
+    <dgm:effectClrLst/>
+    <dgm:txLinClrLst/>
+    <dgm:txFillClrLst/>
+    <dgm:txEffectClrLst/>
+  </dgm:styleLbl>
+  <dgm:styleLbl name="node2">
+    <dgm:fillClrLst meth="repeat">
+      <a:schemeClr val="accent1"/>
+    </dgm:fillClrLst>
+    <dgm:linClrLst meth="repeat">
+      <a:schemeClr val="lt1"/>
+    </dgm:linClrLst>
+    <dgm:effectClrLst/>
+    <dgm:txLinClrLst/>
+    <dgm:txFillClrLst/>
+    <dgm:txEffectClrLst/>
+  </dgm:styleLbl>
+  <dgm:styleLbl name="node3">
+    <dgm:fillClrLst meth="repeat">
+      <a:schemeClr val="accent1"/>
+    </dgm:fillClrLst>
+    <dgm:linClrLst meth="repeat">
+      <a:schemeClr val="lt1"/>
+    </dgm:linClrLst>
+    <dgm:effectClrLst/>
+    <dgm:txLinClrLst/>
+    <dgm:txFillClrLst/>
+    <dgm:txEffectClrLst/>
+  </dgm:styleLbl>
+  <dgm:styleLbl name="node4">
+    <dgm:fillClrLst meth="repeat">
+      <a:schemeClr val="accent1"/>
+    </dgm:fillClrLst>
+    <dgm:linClrLst meth="repeat">
+      <a:schemeClr val="lt1"/>
+    </dgm:linClrLst>
+    <dgm:effectClrLst/>
+    <dgm:txLinClrLst/>
+    <dgm:txFillClrLst/>
+    <dgm:txEffectClrLst/>
+  </dgm:styleLbl>
+  <dgm:styleLbl name="fgImgPlace1">
+    <dgm:fillClrLst meth="repeat">
+      <a:schemeClr val="accent1">
+        <a:tint val="50000"/>
+      </a:schemeClr>
+    </dgm:fillClrLst>
+    <dgm:linClrLst meth="repeat">
+      <a:schemeClr val="lt1"/>
+    </dgm:linClrLst>
+    <dgm:effectClrLst/>
+    <dgm:txLinClrLst/>
+    <dgm:txFillClrLst meth="repeat">
+      <a:schemeClr val="lt1"/>
+    </dgm:txFillClrLst>
+    <dgm:txEffectClrLst/>
+  </dgm:styleLbl>
+  <dgm:styleLbl name="alignImgPlace1">
+    <dgm:fillClrLst meth="repeat">
+      <a:schemeClr val="accent1">
+        <a:tint val="50000"/>
+      </a:schemeClr>
+    </dgm:fillClrLst>
+    <dgm:linClrLst meth="repeat">
+      <a:schemeClr val="lt1"/>
+    </dgm:linClrLst>
+    <dgm:effectClrLst/>
+    <dgm:txLinClrLst/>
+    <dgm:txFillClrLst meth="repeat">
+      <a:schemeClr val="lt1"/>
+    </dgm:txFillClrLst>
+    <dgm:txEffectClrLst/>
+  </dgm:styleLbl>
+  <dgm:styleLbl name="bgImgPlace1">
+    <dgm:fillClrLst meth="repeat">
+      <a:schemeClr val="accent1">
+        <a:tint val="50000"/>
+      </a:schemeClr>
+    </dgm:fillClrLst>
+    <dgm:linClrLst meth="repeat">
+      <a:schemeClr val="lt1"/>
+    </dgm:linClrLst>
+    <dgm:effectClrLst/>
+    <dgm:txLinClrLst/>
+    <dgm:txFillClrLst meth="repeat">
+      <a:schemeClr val="lt1"/>
+    </dgm:txFillClrLst>
+    <dgm:txEffectClrLst/>
+  </dgm:styleLbl>
+  <dgm:styleLbl name="sibTrans2D1">
+    <dgm:fillClrLst meth="repeat">
+      <a:schemeClr val="accent1">
+        <a:tint val="60000"/>
+      </a:schemeClr>
+    </dgm:fillClrLst>
+    <dgm:linClrLst meth="repeat">
+      <a:schemeClr val="accent1">
+        <a:tint val="60000"/>
+      </a:schemeClr>
+    </dgm:linClrLst>
+    <dgm:effectClrLst/>
+    <dgm:txLinClrLst/>
+    <dgm:txFillClrLst/>
+    <dgm:txEffectClrLst/>
+  </dgm:styleLbl>
+  <dgm:styleLbl name="fgSibTrans2D1">
+    <dgm:fillClrLst meth="repeat">
+      <a:schemeClr val="accent1">
+        <a:tint val="60000"/>
+      </a:schemeClr>
+    </dgm:fillClrLst>
+    <dgm:linClrLst meth="repeat">
+      <a:schemeClr val="accent1">
+        <a:tint val="60000"/>
+      </a:schemeClr>
+    </dgm:linClrLst>
+    <dgm:effectClrLst/>
+    <dgm:txLinClrLst/>
+    <dgm:txFillClrLst/>
+    <dgm:txEffectClrLst/>
+  </dgm:styleLbl>
+  <dgm:styleLbl name="bgSibTrans2D1">
+    <dgm:fillClrLst meth="repeat">
+      <a:schemeClr val="accent1">
+        <a:tint val="60000"/>
+      </a:schemeClr>
+    </dgm:fillClrLst>
+    <dgm:linClrLst meth="repeat">
+      <a:schemeClr val="accent1">
+        <a:tint val="60000"/>
+      </a:schemeClr>
+    </dgm:linClrLst>
+    <dgm:effectClrLst/>
+    <dgm:txLinClrLst/>
+    <dgm:txFillClrLst/>
+    <dgm:txEffectClrLst/>
+  </dgm:styleLbl>
+  <dgm:styleLbl name="sibTrans1D1">
+    <dgm:fillClrLst meth="repeat">
+      <a:schemeClr val="accent1"/>
+    </dgm:fillClrLst>
+    <dgm:linClrLst meth="repeat">
+      <a:schemeClr val="accent1"/>
+    </dgm:linClrLst>
+    <dgm:effectClrLst/>
+    <dgm:txLinClrLst/>
+    <dgm:txFillClrLst meth="repeat">
+      <a:schemeClr val="tx1"/>
+    </dgm:txFillClrLst>
+    <dgm:txEffectClrLst/>
+  </dgm:styleLbl>
+  <dgm:styleLbl name="callout">
+    <dgm:fillClrLst meth="repeat">
+      <a:schemeClr val="accent1"/>
+    </dgm:fillClrLst>
+    <dgm:linClrLst meth="repeat">
+      <a:schemeClr val="accent1">
+        <a:tint val="50000"/>
+      </a:schemeClr>
+    </dgm:linClrLst>
+    <dgm:effectClrLst/>
+    <dgm:txLinClrLst/>
+    <dgm:txFillClrLst meth="repeat">
+      <a:schemeClr val="tx1"/>
+    </dgm:txFillClrLst>
+    <dgm:txEffectClrLst/>
+  </dgm:styleLbl>
+  <dgm:styleLbl name="asst0">
+    <dgm:fillClrLst meth="repeat">
+      <a:schemeClr val="accent1"/>
+    </dgm:fillClrLst>
+    <dgm:linClrLst meth="repeat">
+      <a:schemeClr val="lt1"/>
+    </dgm:linClrLst>
+    <dgm:effectClrLst/>
+    <dgm:txLinClrLst/>
+    <dgm:txFillClrLst/>
+    <dgm:txEffectClrLst/>
+  </dgm:styleLbl>
+  <dgm:styleLbl name="asst1">
+    <dgm:fillClrLst meth="repeat">
+      <a:schemeClr val="accent1"/>
+    </dgm:fillClrLst>
+    <dgm:linClrLst meth="repeat">
+      <a:schemeClr val="lt1"/>
+    </dgm:linClrLst>
+    <dgm:effectClrLst/>
+    <dgm:txLinClrLst/>
+    <dgm:txFillClrLst/>
+    <dgm:txEffectClrLst/>
+  </dgm:styleLbl>
+  <dgm:styleLbl name="asst2">
+    <dgm:fillClrLst meth="repeat">
+      <a:schemeClr val="accent1"/>
+    </dgm:fillClrLst>
+    <dgm:linClrLst meth="repeat">
+      <a:schemeClr val="lt1"/>
+    </dgm:linClrLst>
+    <dgm:effectClrLst/>
+    <dgm:txLinClrLst/>
+    <dgm:txFillClrLst/>
+    <dgm:txEffectClrLst/>
+  </dgm:styleLbl>
+  <dgm:styleLbl name="asst3">
+    <dgm:fillClrLst meth="repeat">
+      <a:schemeClr val="accent1"/>
+    </dgm:fillClrLst>
+    <dgm:linClrLst meth="repeat">
+      <a:schemeClr val="lt1"/>
+    </dgm:linClrLst>
+    <dgm:effectClrLst/>
+    <dgm:txLinClrLst/>
+    <dgm:txFillClrLst/>
+    <dgm:txEffectClrLst/>
+  </dgm:styleLbl>
+  <dgm:styleLbl name="asst4">
+    <dgm:fillClrLst meth="repeat">
+      <a:schemeClr val="accent1"/>
+    </dgm:fillClrLst>
+    <dgm:linClrLst meth="repeat">
+      <a:schemeClr val="lt1"/>
+    </dgm:linClrLst>
+    <dgm:effectClrLst/>
+    <dgm:txLinClrLst/>
+    <dgm:txFillClrLst/>
+    <dgm:txEffectClrLst/>
+  </dgm:styleLbl>
+  <dgm:styleLbl name="parChTrans2D1">
+    <dgm:fillClrLst meth="repeat">
+      <a:schemeClr val="accent1">
+        <a:tint val="60000"/>
+      </a:schemeClr>
+    </dgm:fillClrLst>
+    <dgm:linClrLst meth="repeat">
+      <a:schemeClr val="accent1">
+        <a:tint val="60000"/>
+      </a:schemeClr>
+    </dgm:linClrLst>
+    <dgm:effectClrLst/>
+    <dgm:txLinClrLst/>
+    <dgm:txFillClrLst meth="repeat">
+      <a:schemeClr val="lt1"/>
+    </dgm:txFillClrLst>
+    <dgm:txEffectClrLst/>
+  </dgm:styleLbl>
+  <dgm:styleLbl name="parChTrans2D2">
+    <dgm:fillClrLst meth="repeat">
+      <a:schemeClr val="accent1"/>
+    </dgm:fillClrLst>
+    <dgm:linClrLst meth="repeat">
+      <a:schemeClr val="accent1"/>
+    </dgm:linClrLst>
+    <dgm:effectClrLst/>
+    <dgm:txLinClrLst/>
+    <dgm:txFillClrLst meth="repeat">
+      <a:schemeClr val="lt1"/>
+    </dgm:txFillClrLst>
+    <dgm:txEffectClrLst/>
+  </dgm:styleLbl>
+  <dgm:styleLbl name="parChTrans2D3">
+    <dgm:fillClrLst meth="repeat">
+      <a:schemeClr val="accent1"/>
+    </dgm:fillClrLst>
+    <dgm:linClrLst meth="repeat">
+      <a:schemeClr val="accent1"/>
+    </dgm:linClrLst>
+    <dgm:effectClrLst/>
+    <dgm:txLinClrLst/>
+    <dgm:txFillClrLst meth="repeat">
+      <a:schemeClr val="lt1"/>
+    </dgm:txFillClrLst>
+    <dgm:txEffectClrLst/>
+  </dgm:styleLbl>
+  <dgm:styleLbl name="parChTrans2D4">
+    <dgm:fillClrLst meth="repeat">
+      <a:schemeClr val="accent1"/>
+    </dgm:fillClrLst>
+    <dgm:linClrLst meth="repeat">
+      <a:schemeClr val="accent1"/>
+    </dgm:linClrLst>
+    <dgm:effectClrLst/>
+    <dgm:txLinClrLst/>
+    <dgm:txFillClrLst meth="repeat">
+      <a:schemeClr val="lt1"/>
+    </dgm:txFillClrLst>
+    <dgm:txEffectClrLst/>
+  </dgm:styleLbl>
+  <dgm:styleLbl name="parChTrans1D1">
+    <dgm:fillClrLst meth="repeat">
+      <a:schemeClr val="accent1"/>
+    </dgm:fillClrLst>
+    <dgm:linClrLst meth="repeat">
+      <a:schemeClr val="accent1">
+        <a:shade val="60000"/>
+      </a:schemeClr>
+    </dgm:linClrLst>
+    <dgm:effectClrLst/>
+    <dgm:txLinClrLst/>
+    <dgm:txFillClrLst meth="repeat">
+      <a:schemeClr val="tx1"/>
+    </dgm:txFillClrLst>
+    <dgm:txEffectClrLst/>
+  </dgm:styleLbl>
+  <dgm:styleLbl name="parChTrans1D2">
+    <dgm:fillClrLst meth="repeat">
+      <a:schemeClr val="accent1"/>
+    </dgm:fillClrLst>
+    <dgm:linClrLst meth="repeat">
+      <a:schemeClr val="accent1">
+        <a:shade val="60000"/>
+      </a:schemeClr>
+    </dgm:linClrLst>
+    <dgm:effectClrLst/>
+    <dgm:txLinClrLst/>
+    <dgm:txFillClrLst meth="repeat">
+      <a:schemeClr val="tx1"/>
+    </dgm:txFillClrLst>
+    <dgm:txEffectClrLst/>
+  </dgm:styleLbl>
+  <dgm:styleLbl name="parChTrans1D3">
+    <dgm:fillClrLst meth="repeat">
+      <a:schemeClr val="accent1"/>
+    </dgm:fillClrLst>
+    <dgm:linClrLst meth="repeat">
+      <a:schemeClr val="accent1">
+        <a:shade val="80000"/>
+      </a:schemeClr>
+    </dgm:linClrLst>
+    <dgm:effectClrLst/>
+    <dgm:txLinClrLst/>
+    <dgm:txFillClrLst meth="repeat">
+      <a:schemeClr val="tx1"/>
+    </dgm:txFillClrLst>
+    <dgm:txEffectClrLst/>
+  </dgm:styleLbl>
+  <dgm:styleLbl name="parChTrans1D4">
+    <dgm:fillClrLst meth="repeat">
+      <a:schemeClr val="accent1"/>
+    </dgm:fillClrLst>
+    <dgm:linClrLst meth="repeat">
+      <a:schemeClr val="accent1">
+        <a:shade val="80000"/>
+      </a:schemeClr>
+    </dgm:linClrLst>
+    <dgm:effectClrLst/>
+    <dgm:txLinClrLst/>
+    <dgm:txFillClrLst meth="repeat">
+      <a:schemeClr val="tx1"/>
+    </dgm:txFillClrLst>
+    <dgm:txEffectClrLst/>
+  </dgm:styleLbl>
+  <dgm:styleLbl name="fgAcc1">
+    <dgm:fillClrLst meth="repeat">
+      <a:schemeClr val="lt1">
+        <a:alpha val="90000"/>
+      </a:schemeClr>
+    </dgm:fillClrLst>
+    <dgm:linClrLst meth="repeat">
+      <a:schemeClr val="accent1"/>
+    </dgm:linClrLst>
+    <dgm:effectClrLst/>
+    <dgm:txLinClrLst/>
+    <dgm:txFillClrLst meth="repeat">
+      <a:schemeClr val="dk1"/>
+    </dgm:txFillClrLst>
+    <dgm:txEffectClrLst/>
+  </dgm:styleLbl>
+  <dgm:styleLbl name="conFgAcc1">
+    <dgm:fillClrLst meth="repeat">
+      <a:schemeClr val="lt1">
+        <a:alpha val="90000"/>
+      </a:schemeClr>
+    </dgm:fillClrLst>
+    <dgm:linClrLst meth="repeat">
+      <a:schemeClr val="accent1"/>
+    </dgm:linClrLst>
+    <dgm:effectClrLst/>
+    <dgm:txLinClrLst/>
+    <dgm:txFillClrLst meth="repeat">
+      <a:schemeClr val="dk1"/>
+    </dgm:txFillClrLst>
+    <dgm:txEffectClrLst/>
+  </dgm:styleLbl>
+  <dgm:styleLbl name="alignAcc1">
+    <dgm:fillClrLst meth="repeat">
+      <a:schemeClr val="lt1">
+        <a:alpha val="90000"/>
+      </a:schemeClr>
+    </dgm:fillClrLst>
+    <dgm:linClrLst meth="repeat">
+      <a:schemeClr val="accent1"/>
+    </dgm:linClrLst>
+    <dgm:effectClrLst/>
+    <dgm:txLinClrLst/>
+    <dgm:txFillClrLst meth="repeat">
+      <a:schemeClr val="dk1"/>
+    </dgm:txFillClrLst>
+    <dgm:txEffectClrLst/>
+  </dgm:styleLbl>
+  <dgm:styleLbl name="trAlignAcc1">
+    <dgm:fillClrLst meth="repeat">
+      <a:schemeClr val="lt1">
+        <a:alpha val="40000"/>
+      </a:schemeClr>
+    </dgm:fillClrLst>
+    <dgm:linClrLst meth="repeat">
+      <a:schemeClr val="accent1"/>
+    </dgm:linClrLst>
+    <dgm:effectClrLst/>
+    <dgm:txLinClrLst/>
+    <dgm:txFillClrLst meth="repeat">
+      <a:schemeClr val="dk1"/>
+    </dgm:txFillClrLst>
+    <dgm:txEffectClrLst/>
+  </dgm:styleLbl>
+  <dgm:styleLbl name="bgAcc1">
+    <dgm:fillClrLst meth="repeat">
+      <a:schemeClr val="lt1">
+        <a:alpha val="90000"/>
+      </a:schemeClr>
+    </dgm:fillClrLst>
+    <dgm:linClrLst meth="repeat">
+      <a:schemeClr val="accent1"/>
+    </dgm:linClrLst>
+    <dgm:effectClrLst/>
+    <dgm:txLinClrLst/>
+    <dgm:txFillClrLst meth="repeat">
+      <a:schemeClr val="dk1"/>
+    </dgm:txFillClrLst>
+    <dgm:txEffectClrLst/>
+  </dgm:styleLbl>
+  <dgm:styleLbl name="solidFgAcc1">
+    <dgm:fillClrLst meth="repeat">
+      <a:schemeClr val="lt1"/>
+    </dgm:fillClrLst>
+    <dgm:linClrLst meth="repeat">
+      <a:schemeClr val="accent1"/>
+    </dgm:linClrLst>
+    <dgm:effectClrLst/>
+    <dgm:txLinClrLst/>
+    <dgm:txFillClrLst meth="repeat">
+      <a:schemeClr val="dk1"/>
+    </dgm:txFillClrLst>
+    <dgm:txEffectClrLst/>
+  </dgm:styleLbl>
+  <dgm:styleLbl name="solidAlignAcc1">
+    <dgm:fillClrLst meth="repeat">
+      <a:schemeClr val="lt1"/>
+    </dgm:fillClrLst>
+    <dgm:linClrLst meth="repeat">
+      <a:schemeClr val="accent1"/>
+    </dgm:linClrLst>
+    <dgm:effectClrLst/>
+    <dgm:txLinClrLst/>
+    <dgm:txFillClrLst meth="repeat">
+      <a:schemeClr val="dk1"/>
+    </dgm:txFillClrLst>
+    <dgm:txEffectClrLst/>
+  </dgm:styleLbl>
+  <dgm:styleLbl name="solidBgAcc1">
+    <dgm:fillClrLst meth="repeat">
+      <a:schemeClr val="lt1"/>
+    </dgm:fillClrLst>
+    <dgm:linClrLst meth="repeat">
+      <a:schemeClr val="accent1"/>
+    </dgm:linClrLst>
+    <dgm:effectClrLst/>
+    <dgm:txLinClrLst/>
+    <dgm:txFillClrLst meth="repeat">
+      <a:schemeClr val="dk1"/>
+    </dgm:txFillClrLst>
+    <dgm:txEffectClrLst/>
+  </dgm:styleLbl>
+  <dgm:styleLbl name="fgAccFollowNode1">
+    <dgm:fillClrLst meth="repeat">
+      <a:schemeClr val="accent1">
+        <a:alpha val="90000"/>
+        <a:tint val="40000"/>
+      </a:schemeClr>
+    </dgm:fillClrLst>
+    <dgm:linClrLst meth="repeat">
+      <a:schemeClr val="accent1">
+        <a:alpha val="90000"/>
+        <a:tint val="40000"/>
+      </a:schemeClr>
+    </dgm:linClrLst>
+    <dgm:effectClrLst/>
+    <dgm:txLinClrLst/>
+    <dgm:txFillClrLst meth="repeat">
+      <a:schemeClr val="dk1"/>
+    </dgm:txFillClrLst>
+    <dgm:txEffectClrLst/>
+  </dgm:styleLbl>
+  <dgm:styleLbl name="alignAccFollowNode1">
+    <dgm:fillClrLst meth="repeat">
+      <a:schemeClr val="accent1">
+        <a:alpha val="90000"/>
+        <a:tint val="40000"/>
+      </a:schemeClr>
+    </dgm:fillClrLst>
+    <dgm:linClrLst meth="repeat">
+      <a:schemeClr val="accent1">
+        <a:alpha val="90000"/>
+        <a:tint val="40000"/>
+      </a:schemeClr>
+    </dgm:linClrLst>
+    <dgm:effectClrLst/>
+    <dgm:txLinClrLst/>
+    <dgm:txFillClrLst meth="repeat">
+      <a:schemeClr val="dk1"/>
+    </dgm:txFillClrLst>
+    <dgm:txEffectClrLst/>
+  </dgm:styleLbl>
+  <dgm:styleLbl name="bgAccFollowNode1">
+    <dgm:fillClrLst meth="repeat">
+      <a:schemeClr val="accent1">
+        <a:alpha val="90000"/>
+        <a:tint val="40000"/>
+      </a:schemeClr>
+    </dgm:fillClrLst>
+    <dgm:linClrLst meth="repeat">
+      <a:schemeClr val="accent1">
+        <a:alpha val="90000"/>
+        <a:tint val="40000"/>
+      </a:schemeClr>
+    </dgm:linClrLst>
+    <dgm:effectClrLst/>
+    <dgm:txLinClrLst/>
+    <dgm:txFillClrLst meth="repeat">
+      <a:schemeClr val="dk1"/>
+    </dgm:txFillClrLst>
+    <dgm:txEffectClrLst/>
+  </dgm:styleLbl>
+  <dgm:styleLbl name="fgAcc0">
+    <dgm:fillClrLst meth="repeat">
+      <a:schemeClr val="lt1">
+        <a:alpha val="90000"/>
+      </a:schemeClr>
+    </dgm:fillClrLst>
+    <dgm:linClrLst meth="repeat">
+      <a:schemeClr val="accent1"/>
+    </dgm:linClrLst>
+    <dgm:effectClrLst/>
+    <dgm:txLinClrLst/>
+    <dgm:txFillClrLst meth="repeat">
+      <a:schemeClr val="dk1"/>
+    </dgm:txFillClrLst>
+    <dgm:txEffectClrLst/>
+  </dgm:styleLbl>
+  <dgm:styleLbl name="fgAcc2">
+    <dgm:fillClrLst meth="repeat">
+      <a:schemeClr val="lt1">
+        <a:alpha val="90000"/>
+      </a:schemeClr>
+    </dgm:fillClrLst>
+    <dgm:linClrLst meth="repeat">
+      <a:schemeClr val="accent1"/>
+    </dgm:linClrLst>
+    <dgm:effectClrLst/>
+    <dgm:txLinClrLst/>
+    <dgm:txFillClrLst meth="repeat">
+      <a:schemeClr val="dk1"/>
+    </dgm:txFillClrLst>
+    <dgm:txEffectClrLst/>
+  </dgm:styleLbl>
+  <dgm:styleLbl name="fgAcc3">
+    <dgm:fillClrLst meth="repeat">
+      <a:schemeClr val="lt1">
+        <a:alpha val="90000"/>
+      </a:schemeClr>
+    </dgm:fillClrLst>
+    <dgm:linClrLst meth="repeat">
+      <a:schemeClr val="accent1"/>
+    </dgm:linClrLst>
+    <dgm:effectClrLst/>
+    <dgm:txLinClrLst/>
+    <dgm:txFillClrLst meth="repeat">
+      <a:schemeClr val="dk1"/>
+    </dgm:txFillClrLst>
+    <dgm:txEffectClrLst/>
+  </dgm:styleLbl>
+  <dgm:styleLbl name="fgAcc4">
+    <dgm:fillClrLst meth="repeat">
+      <a:schemeClr val="lt1">
+        <a:alpha val="90000"/>
+      </a:schemeClr>
+    </dgm:fillClrLst>
+    <dgm:linClrLst meth="repeat">
+      <a:schemeClr val="accent1"/>
+    </dgm:linClrLst>
+    <dgm:effectClrLst/>
+    <dgm:txLinClrLst/>
+    <dgm:txFillClrLst meth="repeat">
+      <a:schemeClr val="dk1"/>
+    </dgm:txFillClrLst>
+    <dgm:txEffectClrLst/>
+  </dgm:styleLbl>
+  <dgm:styleLbl name="bgShp">
+    <dgm:fillClrLst meth="repeat">
+      <a:schemeClr val="accent1">
+        <a:tint val="40000"/>
+      </a:schemeClr>
+    </dgm:fillClrLst>
+    <dgm:linClrLst meth="repeat">
+      <a:schemeClr val="accent1"/>
+    </dgm:linClrLst>
+    <dgm:effectClrLst/>
+    <dgm:txLinClrLst/>
+    <dgm:txFillClrLst meth="repeat">
+      <a:schemeClr val="dk1"/>
+    </dgm:txFillClrLst>
+    <dgm:txEffectClrLst/>
+  </dgm:styleLbl>
+  <dgm:styleLbl name="dkBgShp">
+    <dgm:fillClrLst meth="repeat">
+      <a:schemeClr val="accent1">
+        <a:shade val="80000"/>
+      </a:schemeClr>
+    </dgm:fillClrLst>
+    <dgm:linClrLst meth="repeat">
+      <a:schemeClr val="accent1"/>
+    </dgm:linClrLst>
+    <dgm:effectClrLst/>
+    <dgm:txLinClrLst/>
+    <dgm:txFillClrLst meth="repeat">
+      <a:schemeClr val="lt1"/>
+    </dgm:txFillClrLst>
+    <dgm:txEffectClrLst/>
+  </dgm:styleLbl>
+  <dgm:styleLbl name="trBgShp">
+    <dgm:fillClrLst meth="repeat">
+      <a:schemeClr val="accent1">
+        <a:tint val="50000"/>
+        <a:alpha val="40000"/>
+      </a:schemeClr>
+    </dgm:fillClrLst>
+    <dgm:linClrLst meth="repeat">
+      <a:schemeClr val="accent1"/>
+    </dgm:linClrLst>
+    <dgm:effectClrLst/>
+    <dgm:txLinClrLst/>
+    <dgm:txFillClrLst meth="repeat">
+      <a:schemeClr val="lt1"/>
+    </dgm:txFillClrLst>
+    <dgm:txEffectClrLst/>
+  </dgm:styleLbl>
+  <dgm:styleLbl name="fgShp">
+    <dgm:fillClrLst meth="repeat">
+      <a:schemeClr val="accent1">
         <a:tint val="60000"/>
       </a:schemeClr>
     </dgm:fillClrLst>
@@ -9238,6 +10001,13 @@
         </dgm:presLayoutVars>
       </dgm:prSet>
       <dgm:spPr/>
+      <dgm:t>
+        <a:bodyPr/>
+        <a:lstStyle/>
+        <a:p>
+          <a:endParaRPr lang="en-US"/>
+        </a:p>
+      </dgm:t>
     </dgm:pt>
     <dgm:pt modelId="{FF8361E7-D3B9-4FD3-A820-14A4EC21CE3B}" type="pres">
       <dgm:prSet presAssocID="{BB3C7BD7-FF07-4004-B78A-8A5629A77149}" presName="Name1" presStyleCnt="0"/>
@@ -9254,6 +10024,13 @@
     <dgm:pt modelId="{A77297E9-3332-481A-9C41-9780E4054317}" type="pres">
       <dgm:prSet presAssocID="{BB3C7BD7-FF07-4004-B78A-8A5629A77149}" presName="conn" presStyleLbl="parChTrans1D2" presStyleIdx="0" presStyleCnt="1"/>
       <dgm:spPr/>
+      <dgm:t>
+        <a:bodyPr/>
+        <a:lstStyle/>
+        <a:p>
+          <a:endParaRPr lang="en-US"/>
+        </a:p>
+      </dgm:t>
     </dgm:pt>
     <dgm:pt modelId="{42AD3E3F-2825-49DC-BAC2-C3148CC5AFAF}" type="pres">
       <dgm:prSet presAssocID="{BB3C7BD7-FF07-4004-B78A-8A5629A77149}" presName="extraNode" presStyleLbl="node1" presStyleIdx="0" presStyleCnt="3"/>
@@ -9270,6 +10047,13 @@
         </dgm:presLayoutVars>
       </dgm:prSet>
       <dgm:spPr/>
+      <dgm:t>
+        <a:bodyPr/>
+        <a:lstStyle/>
+        <a:p>
+          <a:endParaRPr lang="en-US"/>
+        </a:p>
+      </dgm:t>
     </dgm:pt>
     <dgm:pt modelId="{A6EA5044-16E7-42F9-A4AE-0867083ED4D9}" type="pres">
       <dgm:prSet presAssocID="{41994BBD-922B-49BB-8474-E4AE9F645B0E}" presName="accent_1" presStyleCnt="0"/>
@@ -9286,6 +10070,13 @@
         </dgm:presLayoutVars>
       </dgm:prSet>
       <dgm:spPr/>
+      <dgm:t>
+        <a:bodyPr/>
+        <a:lstStyle/>
+        <a:p>
+          <a:endParaRPr lang="en-US"/>
+        </a:p>
+      </dgm:t>
     </dgm:pt>
     <dgm:pt modelId="{47D36926-69F8-49CF-9671-65CFA6388C6F}" type="pres">
       <dgm:prSet presAssocID="{2B4C4EF1-11C9-492C-8365-C902B7DC42B8}" presName="accent_2" presStyleCnt="0"/>
@@ -9349,6 +10140,273 @@
   <dgm:extLst>
     <a:ext uri="http://schemas.microsoft.com/office/drawing/2008/diagram">
       <dsp:dataModelExt xmlns:dsp="http://schemas.microsoft.com/office/drawing/2008/diagram" relId="rId6" minVer="http://schemas.openxmlformats.org/drawingml/2006/diagram"/>
+    </a:ext>
+  </dgm:extLst>
+</dgm:dataModel>
+</file>
+
+<file path=ppt/diagrams/data11.xml><?xml version="1.0" encoding="utf-8"?>
+<dgm:dataModel xmlns:dgm="http://schemas.openxmlformats.org/drawingml/2006/diagram" xmlns:a="http://schemas.openxmlformats.org/drawingml/2006/main">
+  <dgm:ptLst>
+    <dgm:pt modelId="{1A97853D-9EE8-449A-A565-DF4AC95E353C}" type="doc">
+      <dgm:prSet loTypeId="urn:microsoft.com/office/officeart/2005/8/layout/matrix3" loCatId="matrix" qsTypeId="urn:microsoft.com/office/officeart/2005/8/quickstyle/simple1" qsCatId="simple" csTypeId="urn:microsoft.com/office/officeart/2005/8/colors/accent1_2" csCatId="accent1" phldr="1"/>
+      <dgm:spPr/>
+      <dgm:t>
+        <a:bodyPr/>
+        <a:lstStyle/>
+        <a:p>
+          <a:endParaRPr lang="en-US"/>
+        </a:p>
+      </dgm:t>
+    </dgm:pt>
+    <dgm:pt modelId="{C1156425-18B5-425A-8BE9-3B6DEB24EA05}">
+      <dgm:prSet/>
+      <dgm:spPr/>
+      <dgm:t>
+        <a:bodyPr/>
+        <a:lstStyle/>
+        <a:p>
+          <a:pPr rtl="0"/>
+          <a:r>
+            <a:rPr lang="en-US" b="1" strike="noStrike" dirty="0" smtClean="0">
+              <a:solidFill>
+                <a:schemeClr val="bg2">
+                  <a:lumMod val="90000"/>
+                </a:schemeClr>
+              </a:solidFill>
+            </a:rPr>
+            <a:t>DEMO 1</a:t>
+          </a:r>
+          <a:endParaRPr lang="pt-BR" strike="noStrike" dirty="0">
+            <a:solidFill>
+              <a:schemeClr val="bg2">
+                <a:lumMod val="90000"/>
+              </a:schemeClr>
+            </a:solidFill>
+          </a:endParaRPr>
+        </a:p>
+      </dgm:t>
+    </dgm:pt>
+    <dgm:pt modelId="{63FFA68D-4AD2-4B21-94C7-749A165DDC9C}" type="parTrans" cxnId="{A1B6848F-BE84-4CAB-B17C-E3E4B927051E}">
+      <dgm:prSet/>
+      <dgm:spPr/>
+      <dgm:t>
+        <a:bodyPr/>
+        <a:lstStyle/>
+        <a:p>
+          <a:endParaRPr lang="en-US"/>
+        </a:p>
+      </dgm:t>
+    </dgm:pt>
+    <dgm:pt modelId="{92A34636-3B92-4410-966E-A060C810E335}" type="sibTrans" cxnId="{A1B6848F-BE84-4CAB-B17C-E3E4B927051E}">
+      <dgm:prSet/>
+      <dgm:spPr/>
+      <dgm:t>
+        <a:bodyPr/>
+        <a:lstStyle/>
+        <a:p>
+          <a:endParaRPr lang="en-US"/>
+        </a:p>
+      </dgm:t>
+    </dgm:pt>
+    <dgm:pt modelId="{D1FC58E9-63BB-421B-8C01-271376EBA7DF}">
+      <dgm:prSet/>
+      <dgm:spPr/>
+      <dgm:t>
+        <a:bodyPr/>
+        <a:lstStyle/>
+        <a:p>
+          <a:pPr rtl="0"/>
+          <a:r>
+            <a:rPr lang="pt-BR" b="1" strike="noStrike" dirty="0" smtClean="0">
+              <a:solidFill>
+                <a:schemeClr val="bg2">
+                  <a:lumMod val="90000"/>
+                </a:schemeClr>
+              </a:solidFill>
+            </a:rPr>
+            <a:t>DEMO 2</a:t>
+          </a:r>
+          <a:endParaRPr lang="pt-BR" b="1" strike="noStrike" dirty="0">
+            <a:solidFill>
+              <a:schemeClr val="bg2">
+                <a:lumMod val="90000"/>
+              </a:schemeClr>
+            </a:solidFill>
+          </a:endParaRPr>
+        </a:p>
+      </dgm:t>
+    </dgm:pt>
+    <dgm:pt modelId="{177E853E-E815-4280-95E0-76D2156E56EE}" type="parTrans" cxnId="{6B375CE4-EBB2-4868-BAF2-9343ED2B85FC}">
+      <dgm:prSet/>
+      <dgm:spPr/>
+      <dgm:t>
+        <a:bodyPr/>
+        <a:lstStyle/>
+        <a:p>
+          <a:endParaRPr lang="en-US"/>
+        </a:p>
+      </dgm:t>
+    </dgm:pt>
+    <dgm:pt modelId="{854A572F-5857-456A-A4A0-64BEC9EBB8CF}" type="sibTrans" cxnId="{6B375CE4-EBB2-4868-BAF2-9343ED2B85FC}">
+      <dgm:prSet/>
+      <dgm:spPr/>
+      <dgm:t>
+        <a:bodyPr/>
+        <a:lstStyle/>
+        <a:p>
+          <a:endParaRPr lang="en-US"/>
+        </a:p>
+      </dgm:t>
+    </dgm:pt>
+    <dgm:pt modelId="{6DE9740E-4ED0-4777-98EC-8999EC91BAD5}">
+      <dgm:prSet/>
+      <dgm:spPr/>
+      <dgm:t>
+        <a:bodyPr/>
+        <a:lstStyle/>
+        <a:p>
+          <a:pPr rtl="0"/>
+          <a:r>
+            <a:rPr lang="en-US" b="1" strike="noStrike" dirty="0" smtClean="0">
+              <a:solidFill>
+                <a:schemeClr val="bg1"/>
+              </a:solidFill>
+            </a:rPr>
+            <a:t>DEMO 3</a:t>
+          </a:r>
+          <a:endParaRPr lang="en-US" dirty="0">
+            <a:solidFill>
+              <a:schemeClr val="bg1"/>
+            </a:solidFill>
+          </a:endParaRPr>
+        </a:p>
+      </dgm:t>
+    </dgm:pt>
+    <dgm:pt modelId="{8B949E0C-8736-4D80-8DF5-C6E7C02D766B}" type="parTrans" cxnId="{543A065B-1EE6-4850-A803-51CD2EA7FA4C}">
+      <dgm:prSet/>
+      <dgm:spPr/>
+      <dgm:t>
+        <a:bodyPr/>
+        <a:lstStyle/>
+        <a:p>
+          <a:endParaRPr lang="en-US"/>
+        </a:p>
+      </dgm:t>
+    </dgm:pt>
+    <dgm:pt modelId="{18F95C34-CDE0-4835-B06D-E4DBDDFCA8D8}" type="sibTrans" cxnId="{543A065B-1EE6-4850-A803-51CD2EA7FA4C}">
+      <dgm:prSet/>
+      <dgm:spPr/>
+      <dgm:t>
+        <a:bodyPr/>
+        <a:lstStyle/>
+        <a:p>
+          <a:endParaRPr lang="en-US"/>
+        </a:p>
+      </dgm:t>
+    </dgm:pt>
+    <dgm:pt modelId="{63CF3302-2591-4AA6-844D-E62A54569102}" type="pres">
+      <dgm:prSet presAssocID="{1A97853D-9EE8-449A-A565-DF4AC95E353C}" presName="matrix" presStyleCnt="0">
+        <dgm:presLayoutVars>
+          <dgm:chMax val="1"/>
+          <dgm:dir/>
+          <dgm:resizeHandles val="exact"/>
+        </dgm:presLayoutVars>
+      </dgm:prSet>
+      <dgm:spPr/>
+      <dgm:t>
+        <a:bodyPr/>
+        <a:lstStyle/>
+        <a:p>
+          <a:endParaRPr lang="en-US"/>
+        </a:p>
+      </dgm:t>
+    </dgm:pt>
+    <dgm:pt modelId="{8B02F8A0-3D20-45BA-A7F5-AD04EBF56313}" type="pres">
+      <dgm:prSet presAssocID="{1A97853D-9EE8-449A-A565-DF4AC95E353C}" presName="diamond" presStyleLbl="bgShp" presStyleIdx="0" presStyleCnt="1"/>
+      <dgm:spPr/>
+    </dgm:pt>
+    <dgm:pt modelId="{D76B7595-CEE1-4F3D-AAC7-EE660D76F43D}" type="pres">
+      <dgm:prSet presAssocID="{1A97853D-9EE8-449A-A565-DF4AC95E353C}" presName="quad1" presStyleLbl="node1" presStyleIdx="0" presStyleCnt="4">
+        <dgm:presLayoutVars>
+          <dgm:chMax val="0"/>
+          <dgm:chPref val="0"/>
+          <dgm:bulletEnabled val="1"/>
+        </dgm:presLayoutVars>
+      </dgm:prSet>
+      <dgm:spPr/>
+      <dgm:t>
+        <a:bodyPr/>
+        <a:lstStyle/>
+        <a:p>
+          <a:endParaRPr lang="en-US"/>
+        </a:p>
+      </dgm:t>
+    </dgm:pt>
+    <dgm:pt modelId="{5CC929DB-2871-4AC4-B8D5-A168FD9881D5}" type="pres">
+      <dgm:prSet presAssocID="{1A97853D-9EE8-449A-A565-DF4AC95E353C}" presName="quad2" presStyleLbl="node1" presStyleIdx="1" presStyleCnt="4">
+        <dgm:presLayoutVars>
+          <dgm:chMax val="0"/>
+          <dgm:chPref val="0"/>
+          <dgm:bulletEnabled val="1"/>
+        </dgm:presLayoutVars>
+      </dgm:prSet>
+      <dgm:spPr/>
+      <dgm:t>
+        <a:bodyPr/>
+        <a:lstStyle/>
+        <a:p>
+          <a:endParaRPr lang="en-US"/>
+        </a:p>
+      </dgm:t>
+    </dgm:pt>
+    <dgm:pt modelId="{9B522921-7655-437C-8AC4-F056D98B6D00}" type="pres">
+      <dgm:prSet presAssocID="{1A97853D-9EE8-449A-A565-DF4AC95E353C}" presName="quad3" presStyleLbl="node1" presStyleIdx="2" presStyleCnt="4">
+        <dgm:presLayoutVars>
+          <dgm:chMax val="0"/>
+          <dgm:chPref val="0"/>
+          <dgm:bulletEnabled val="1"/>
+        </dgm:presLayoutVars>
+      </dgm:prSet>
+      <dgm:spPr/>
+      <dgm:t>
+        <a:bodyPr/>
+        <a:lstStyle/>
+        <a:p>
+          <a:endParaRPr lang="en-US"/>
+        </a:p>
+      </dgm:t>
+    </dgm:pt>
+    <dgm:pt modelId="{EE12ED43-964B-40B5-A170-08EAC7576F42}" type="pres">
+      <dgm:prSet presAssocID="{1A97853D-9EE8-449A-A565-DF4AC95E353C}" presName="quad4" presStyleLbl="node1" presStyleIdx="3" presStyleCnt="4">
+        <dgm:presLayoutVars>
+          <dgm:chMax val="0"/>
+          <dgm:chPref val="0"/>
+          <dgm:bulletEnabled val="1"/>
+        </dgm:presLayoutVars>
+      </dgm:prSet>
+      <dgm:spPr/>
+    </dgm:pt>
+  </dgm:ptLst>
+  <dgm:cxnLst>
+    <dgm:cxn modelId="{543A065B-1EE6-4850-A803-51CD2EA7FA4C}" srcId="{1A97853D-9EE8-449A-A565-DF4AC95E353C}" destId="{6DE9740E-4ED0-4777-98EC-8999EC91BAD5}" srcOrd="2" destOrd="0" parTransId="{8B949E0C-8736-4D80-8DF5-C6E7C02D766B}" sibTransId="{18F95C34-CDE0-4835-B06D-E4DBDDFCA8D8}"/>
+    <dgm:cxn modelId="{4B87E435-93F4-40FB-984B-324EADBAAD70}" type="presOf" srcId="{1A97853D-9EE8-449A-A565-DF4AC95E353C}" destId="{63CF3302-2591-4AA6-844D-E62A54569102}" srcOrd="0" destOrd="0" presId="urn:microsoft.com/office/officeart/2005/8/layout/matrix3"/>
+    <dgm:cxn modelId="{6B375CE4-EBB2-4868-BAF2-9343ED2B85FC}" srcId="{1A97853D-9EE8-449A-A565-DF4AC95E353C}" destId="{D1FC58E9-63BB-421B-8C01-271376EBA7DF}" srcOrd="1" destOrd="0" parTransId="{177E853E-E815-4280-95E0-76D2156E56EE}" sibTransId="{854A572F-5857-456A-A4A0-64BEC9EBB8CF}"/>
+    <dgm:cxn modelId="{B9A93168-214B-4B71-B8BA-CD22D50F4682}" type="presOf" srcId="{C1156425-18B5-425A-8BE9-3B6DEB24EA05}" destId="{D76B7595-CEE1-4F3D-AAC7-EE660D76F43D}" srcOrd="0" destOrd="0" presId="urn:microsoft.com/office/officeart/2005/8/layout/matrix3"/>
+    <dgm:cxn modelId="{E6C284AF-128F-4A5A-813E-38002983FCF0}" type="presOf" srcId="{D1FC58E9-63BB-421B-8C01-271376EBA7DF}" destId="{5CC929DB-2871-4AC4-B8D5-A168FD9881D5}" srcOrd="0" destOrd="0" presId="urn:microsoft.com/office/officeart/2005/8/layout/matrix3"/>
+    <dgm:cxn modelId="{7042435F-F703-4449-8D1E-08E2281B3D33}" type="presOf" srcId="{6DE9740E-4ED0-4777-98EC-8999EC91BAD5}" destId="{9B522921-7655-437C-8AC4-F056D98B6D00}" srcOrd="0" destOrd="0" presId="urn:microsoft.com/office/officeart/2005/8/layout/matrix3"/>
+    <dgm:cxn modelId="{A1B6848F-BE84-4CAB-B17C-E3E4B927051E}" srcId="{1A97853D-9EE8-449A-A565-DF4AC95E353C}" destId="{C1156425-18B5-425A-8BE9-3B6DEB24EA05}" srcOrd="0" destOrd="0" parTransId="{63FFA68D-4AD2-4B21-94C7-749A165DDC9C}" sibTransId="{92A34636-3B92-4410-966E-A060C810E335}"/>
+    <dgm:cxn modelId="{13220222-4516-4CC5-8E39-EF1D4A29FC87}" type="presParOf" srcId="{63CF3302-2591-4AA6-844D-E62A54569102}" destId="{8B02F8A0-3D20-45BA-A7F5-AD04EBF56313}" srcOrd="0" destOrd="0" presId="urn:microsoft.com/office/officeart/2005/8/layout/matrix3"/>
+    <dgm:cxn modelId="{0BDCF0D7-108E-40B5-AF63-C73F92A7C1A0}" type="presParOf" srcId="{63CF3302-2591-4AA6-844D-E62A54569102}" destId="{D76B7595-CEE1-4F3D-AAC7-EE660D76F43D}" srcOrd="1" destOrd="0" presId="urn:microsoft.com/office/officeart/2005/8/layout/matrix3"/>
+    <dgm:cxn modelId="{962C48F4-587F-4296-B220-D6C783011B88}" type="presParOf" srcId="{63CF3302-2591-4AA6-844D-E62A54569102}" destId="{5CC929DB-2871-4AC4-B8D5-A168FD9881D5}" srcOrd="2" destOrd="0" presId="urn:microsoft.com/office/officeart/2005/8/layout/matrix3"/>
+    <dgm:cxn modelId="{A6B1AE8B-10F6-44E3-8894-3E6808FB9A10}" type="presParOf" srcId="{63CF3302-2591-4AA6-844D-E62A54569102}" destId="{9B522921-7655-437C-8AC4-F056D98B6D00}" srcOrd="3" destOrd="0" presId="urn:microsoft.com/office/officeart/2005/8/layout/matrix3"/>
+    <dgm:cxn modelId="{265F6643-68FC-47A4-8432-DF9E091943B0}" type="presParOf" srcId="{63CF3302-2591-4AA6-844D-E62A54569102}" destId="{EE12ED43-964B-40B5-A170-08EAC7576F42}" srcOrd="4" destOrd="0" presId="urn:microsoft.com/office/officeart/2005/8/layout/matrix3"/>
+  </dgm:cxnLst>
+  <dgm:bg/>
+  <dgm:whole/>
+  <dgm:extLst>
+    <a:ext uri="http://schemas.microsoft.com/office/drawing/2008/diagram">
+      <dsp:dataModelExt xmlns:dsp="http://schemas.microsoft.com/office/drawing/2008/diagram" relId="rId7" minVer="http://schemas.openxmlformats.org/drawingml/2006/diagram"/>
     </a:ext>
   </dgm:extLst>
 </dgm:dataModel>
@@ -16312,6 +17370,374 @@
           <a:scrgbClr r="0" g="0" b="0"/>
         </a:effectRef>
         <a:fontRef idx="minor"/>
+      </dsp:style>
+    </dsp:sp>
+  </dsp:spTree>
+</dsp:drawing>
+</file>
+
+<file path=ppt/diagrams/drawing11.xml><?xml version="1.0" encoding="utf-8"?>
+<dsp:drawing xmlns:dgm="http://schemas.openxmlformats.org/drawingml/2006/diagram" xmlns:dsp="http://schemas.microsoft.com/office/drawing/2008/diagram" xmlns:a="http://schemas.openxmlformats.org/drawingml/2006/main">
+  <dsp:spTree>
+    <dsp:nvGrpSpPr>
+      <dsp:cNvPr id="0" name=""/>
+      <dsp:cNvGrpSpPr/>
+    </dsp:nvGrpSpPr>
+    <dsp:grpSpPr/>
+    <dsp:sp modelId="{8B02F8A0-3D20-45BA-A7F5-AD04EBF56313}">
+      <dsp:nvSpPr>
+        <dsp:cNvPr id="0" name=""/>
+        <dsp:cNvSpPr/>
+      </dsp:nvSpPr>
+      <dsp:spPr>
+        <a:xfrm>
+          <a:off x="2907350" y="0"/>
+          <a:ext cx="4700899" cy="4700899"/>
+        </a:xfrm>
+        <a:prstGeom prst="diamond">
+          <a:avLst/>
+        </a:prstGeom>
+        <a:solidFill>
+          <a:schemeClr val="accent1">
+            <a:tint val="40000"/>
+            <a:hueOff val="0"/>
+            <a:satOff val="0"/>
+            <a:lumOff val="0"/>
+            <a:alphaOff val="0"/>
+          </a:schemeClr>
+        </a:solidFill>
+        <a:ln>
+          <a:noFill/>
+        </a:ln>
+        <a:effectLst/>
+      </dsp:spPr>
+      <dsp:style>
+        <a:lnRef idx="0">
+          <a:scrgbClr r="0" g="0" b="0"/>
+        </a:lnRef>
+        <a:fillRef idx="1">
+          <a:scrgbClr r="0" g="0" b="0"/>
+        </a:fillRef>
+        <a:effectRef idx="0">
+          <a:scrgbClr r="0" g="0" b="0"/>
+        </a:effectRef>
+        <a:fontRef idx="minor"/>
+      </dsp:style>
+    </dsp:sp>
+    <dsp:sp modelId="{D76B7595-CEE1-4F3D-AAC7-EE660D76F43D}">
+      <dsp:nvSpPr>
+        <dsp:cNvPr id="0" name=""/>
+        <dsp:cNvSpPr/>
+      </dsp:nvSpPr>
+      <dsp:spPr>
+        <a:xfrm>
+          <a:off x="3353935" y="446585"/>
+          <a:ext cx="1833350" cy="1833350"/>
+        </a:xfrm>
+        <a:prstGeom prst="roundRect">
+          <a:avLst/>
+        </a:prstGeom>
+        <a:solidFill>
+          <a:schemeClr val="accent1">
+            <a:hueOff val="0"/>
+            <a:satOff val="0"/>
+            <a:lumOff val="0"/>
+            <a:alphaOff val="0"/>
+          </a:schemeClr>
+        </a:solidFill>
+        <a:ln w="12700" cap="flat" cmpd="sng" algn="ctr">
+          <a:solidFill>
+            <a:schemeClr val="lt1">
+              <a:hueOff val="0"/>
+              <a:satOff val="0"/>
+              <a:lumOff val="0"/>
+              <a:alphaOff val="0"/>
+            </a:schemeClr>
+          </a:solidFill>
+          <a:prstDash val="solid"/>
+          <a:miter lim="800000"/>
+        </a:ln>
+        <a:effectLst/>
+      </dsp:spPr>
+      <dsp:style>
+        <a:lnRef idx="2">
+          <a:scrgbClr r="0" g="0" b="0"/>
+        </a:lnRef>
+        <a:fillRef idx="1">
+          <a:scrgbClr r="0" g="0" b="0"/>
+        </a:fillRef>
+        <a:effectRef idx="0">
+          <a:scrgbClr r="0" g="0" b="0"/>
+        </a:effectRef>
+        <a:fontRef idx="minor">
+          <a:schemeClr val="lt1"/>
+        </a:fontRef>
+      </dsp:style>
+      <dsp:txBody>
+        <a:bodyPr spcFirstLastPara="0" vert="horz" wrap="square" lIns="137160" tIns="137160" rIns="137160" bIns="137160" numCol="1" spcCol="1270" anchor="ctr" anchorCtr="0">
+          <a:noAutofit/>
+        </a:bodyPr>
+        <a:lstStyle/>
+        <a:p>
+          <a:pPr lvl="0" algn="ctr" defTabSz="1600200" rtl="0">
+            <a:lnSpc>
+              <a:spcPct val="90000"/>
+            </a:lnSpc>
+            <a:spcBef>
+              <a:spcPct val="0"/>
+            </a:spcBef>
+            <a:spcAft>
+              <a:spcPct val="35000"/>
+            </a:spcAft>
+          </a:pPr>
+          <a:r>
+            <a:rPr lang="en-US" sz="3600" b="1" strike="noStrike" kern="1200" dirty="0" smtClean="0">
+              <a:solidFill>
+                <a:schemeClr val="bg2">
+                  <a:lumMod val="90000"/>
+                </a:schemeClr>
+              </a:solidFill>
+            </a:rPr>
+            <a:t>DEMO 1</a:t>
+          </a:r>
+          <a:endParaRPr lang="pt-BR" sz="3600" strike="noStrike" kern="1200" dirty="0">
+            <a:solidFill>
+              <a:schemeClr val="bg2">
+                <a:lumMod val="90000"/>
+              </a:schemeClr>
+            </a:solidFill>
+          </a:endParaRPr>
+        </a:p>
+      </dsp:txBody>
+      <dsp:txXfrm>
+        <a:off x="3443432" y="536082"/>
+        <a:ext cx="1654356" cy="1654356"/>
+      </dsp:txXfrm>
+    </dsp:sp>
+    <dsp:sp modelId="{5CC929DB-2871-4AC4-B8D5-A168FD9881D5}">
+      <dsp:nvSpPr>
+        <dsp:cNvPr id="0" name=""/>
+        <dsp:cNvSpPr/>
+      </dsp:nvSpPr>
+      <dsp:spPr>
+        <a:xfrm>
+          <a:off x="5328313" y="446585"/>
+          <a:ext cx="1833350" cy="1833350"/>
+        </a:xfrm>
+        <a:prstGeom prst="roundRect">
+          <a:avLst/>
+        </a:prstGeom>
+        <a:solidFill>
+          <a:schemeClr val="accent1">
+            <a:hueOff val="0"/>
+            <a:satOff val="0"/>
+            <a:lumOff val="0"/>
+            <a:alphaOff val="0"/>
+          </a:schemeClr>
+        </a:solidFill>
+        <a:ln w="12700" cap="flat" cmpd="sng" algn="ctr">
+          <a:solidFill>
+            <a:schemeClr val="lt1">
+              <a:hueOff val="0"/>
+              <a:satOff val="0"/>
+              <a:lumOff val="0"/>
+              <a:alphaOff val="0"/>
+            </a:schemeClr>
+          </a:solidFill>
+          <a:prstDash val="solid"/>
+          <a:miter lim="800000"/>
+        </a:ln>
+        <a:effectLst/>
+      </dsp:spPr>
+      <dsp:style>
+        <a:lnRef idx="2">
+          <a:scrgbClr r="0" g="0" b="0"/>
+        </a:lnRef>
+        <a:fillRef idx="1">
+          <a:scrgbClr r="0" g="0" b="0"/>
+        </a:fillRef>
+        <a:effectRef idx="0">
+          <a:scrgbClr r="0" g="0" b="0"/>
+        </a:effectRef>
+        <a:fontRef idx="minor">
+          <a:schemeClr val="lt1"/>
+        </a:fontRef>
+      </dsp:style>
+      <dsp:txBody>
+        <a:bodyPr spcFirstLastPara="0" vert="horz" wrap="square" lIns="137160" tIns="137160" rIns="137160" bIns="137160" numCol="1" spcCol="1270" anchor="ctr" anchorCtr="0">
+          <a:noAutofit/>
+        </a:bodyPr>
+        <a:lstStyle/>
+        <a:p>
+          <a:pPr lvl="0" algn="ctr" defTabSz="1600200" rtl="0">
+            <a:lnSpc>
+              <a:spcPct val="90000"/>
+            </a:lnSpc>
+            <a:spcBef>
+              <a:spcPct val="0"/>
+            </a:spcBef>
+            <a:spcAft>
+              <a:spcPct val="35000"/>
+            </a:spcAft>
+          </a:pPr>
+          <a:r>
+            <a:rPr lang="pt-BR" sz="3600" b="1" strike="noStrike" kern="1200" dirty="0" smtClean="0">
+              <a:solidFill>
+                <a:schemeClr val="bg2">
+                  <a:lumMod val="90000"/>
+                </a:schemeClr>
+              </a:solidFill>
+            </a:rPr>
+            <a:t>DEMO 2</a:t>
+          </a:r>
+          <a:endParaRPr lang="pt-BR" sz="3600" b="1" strike="noStrike" kern="1200" dirty="0">
+            <a:solidFill>
+              <a:schemeClr val="bg2">
+                <a:lumMod val="90000"/>
+              </a:schemeClr>
+            </a:solidFill>
+          </a:endParaRPr>
+        </a:p>
+      </dsp:txBody>
+      <dsp:txXfrm>
+        <a:off x="5417810" y="536082"/>
+        <a:ext cx="1654356" cy="1654356"/>
+      </dsp:txXfrm>
+    </dsp:sp>
+    <dsp:sp modelId="{9B522921-7655-437C-8AC4-F056D98B6D00}">
+      <dsp:nvSpPr>
+        <dsp:cNvPr id="0" name=""/>
+        <dsp:cNvSpPr/>
+      </dsp:nvSpPr>
+      <dsp:spPr>
+        <a:xfrm>
+          <a:off x="3353935" y="2420962"/>
+          <a:ext cx="1833350" cy="1833350"/>
+        </a:xfrm>
+        <a:prstGeom prst="roundRect">
+          <a:avLst/>
+        </a:prstGeom>
+        <a:solidFill>
+          <a:schemeClr val="accent1">
+            <a:hueOff val="0"/>
+            <a:satOff val="0"/>
+            <a:lumOff val="0"/>
+            <a:alphaOff val="0"/>
+          </a:schemeClr>
+        </a:solidFill>
+        <a:ln w="12700" cap="flat" cmpd="sng" algn="ctr">
+          <a:solidFill>
+            <a:schemeClr val="lt1">
+              <a:hueOff val="0"/>
+              <a:satOff val="0"/>
+              <a:lumOff val="0"/>
+              <a:alphaOff val="0"/>
+            </a:schemeClr>
+          </a:solidFill>
+          <a:prstDash val="solid"/>
+          <a:miter lim="800000"/>
+        </a:ln>
+        <a:effectLst/>
+      </dsp:spPr>
+      <dsp:style>
+        <a:lnRef idx="2">
+          <a:scrgbClr r="0" g="0" b="0"/>
+        </a:lnRef>
+        <a:fillRef idx="1">
+          <a:scrgbClr r="0" g="0" b="0"/>
+        </a:fillRef>
+        <a:effectRef idx="0">
+          <a:scrgbClr r="0" g="0" b="0"/>
+        </a:effectRef>
+        <a:fontRef idx="minor">
+          <a:schemeClr val="lt1"/>
+        </a:fontRef>
+      </dsp:style>
+      <dsp:txBody>
+        <a:bodyPr spcFirstLastPara="0" vert="horz" wrap="square" lIns="137160" tIns="137160" rIns="137160" bIns="137160" numCol="1" spcCol="1270" anchor="ctr" anchorCtr="0">
+          <a:noAutofit/>
+        </a:bodyPr>
+        <a:lstStyle/>
+        <a:p>
+          <a:pPr lvl="0" algn="ctr" defTabSz="1600200" rtl="0">
+            <a:lnSpc>
+              <a:spcPct val="90000"/>
+            </a:lnSpc>
+            <a:spcBef>
+              <a:spcPct val="0"/>
+            </a:spcBef>
+            <a:spcAft>
+              <a:spcPct val="35000"/>
+            </a:spcAft>
+          </a:pPr>
+          <a:r>
+            <a:rPr lang="en-US" sz="3600" b="1" strike="noStrike" kern="1200" dirty="0" smtClean="0">
+              <a:solidFill>
+                <a:schemeClr val="bg1"/>
+              </a:solidFill>
+            </a:rPr>
+            <a:t>DEMO 3</a:t>
+          </a:r>
+          <a:endParaRPr lang="en-US" sz="3600" kern="1200" dirty="0">
+            <a:solidFill>
+              <a:schemeClr val="bg1"/>
+            </a:solidFill>
+          </a:endParaRPr>
+        </a:p>
+      </dsp:txBody>
+      <dsp:txXfrm>
+        <a:off x="3443432" y="2510459"/>
+        <a:ext cx="1654356" cy="1654356"/>
+      </dsp:txXfrm>
+    </dsp:sp>
+    <dsp:sp modelId="{EE12ED43-964B-40B5-A170-08EAC7576F42}">
+      <dsp:nvSpPr>
+        <dsp:cNvPr id="0" name=""/>
+        <dsp:cNvSpPr/>
+      </dsp:nvSpPr>
+      <dsp:spPr>
+        <a:xfrm>
+          <a:off x="5328313" y="2420962"/>
+          <a:ext cx="1833350" cy="1833350"/>
+        </a:xfrm>
+        <a:prstGeom prst="roundRect">
+          <a:avLst/>
+        </a:prstGeom>
+        <a:solidFill>
+          <a:schemeClr val="accent1">
+            <a:hueOff val="0"/>
+            <a:satOff val="0"/>
+            <a:lumOff val="0"/>
+            <a:alphaOff val="0"/>
+          </a:schemeClr>
+        </a:solidFill>
+        <a:ln w="12700" cap="flat" cmpd="sng" algn="ctr">
+          <a:solidFill>
+            <a:schemeClr val="lt1">
+              <a:hueOff val="0"/>
+              <a:satOff val="0"/>
+              <a:lumOff val="0"/>
+              <a:alphaOff val="0"/>
+            </a:schemeClr>
+          </a:solidFill>
+          <a:prstDash val="solid"/>
+          <a:miter lim="800000"/>
+        </a:ln>
+        <a:effectLst/>
+      </dsp:spPr>
+      <dsp:style>
+        <a:lnRef idx="2">
+          <a:scrgbClr r="0" g="0" b="0"/>
+        </a:lnRef>
+        <a:fillRef idx="1">
+          <a:scrgbClr r="0" g="0" b="0"/>
+        </a:fillRef>
+        <a:effectRef idx="0">
+          <a:scrgbClr r="0" g="0" b="0"/>
+        </a:effectRef>
+        <a:fontRef idx="minor">
+          <a:schemeClr val="lt1"/>
+        </a:fontRef>
       </dsp:style>
     </dsp:sp>
   </dsp:spTree>
@@ -24593,6 +26019,225 @@
 </dgm:layoutDef>
 </file>
 
+<file path=ppt/diagrams/layout11.xml><?xml version="1.0" encoding="utf-8"?>
+<dgm:layoutDef xmlns:dgm="http://schemas.openxmlformats.org/drawingml/2006/diagram" xmlns:a="http://schemas.openxmlformats.org/drawingml/2006/main" uniqueId="urn:microsoft.com/office/officeart/2005/8/layout/matrix3">
+  <dgm:title val=""/>
+  <dgm:desc val=""/>
+  <dgm:catLst>
+    <dgm:cat type="matrix" pri="1000"/>
+    <dgm:cat type="convert" pri="18000"/>
+  </dgm:catLst>
+  <dgm:sampData>
+    <dgm:dataModel>
+      <dgm:ptLst>
+        <dgm:pt modelId="0" type="doc"/>
+        <dgm:pt modelId="1">
+          <dgm:prSet phldr="1"/>
+        </dgm:pt>
+        <dgm:pt modelId="2">
+          <dgm:prSet phldr="1"/>
+        </dgm:pt>
+        <dgm:pt modelId="3">
+          <dgm:prSet phldr="1"/>
+        </dgm:pt>
+        <dgm:pt modelId="4">
+          <dgm:prSet phldr="1"/>
+        </dgm:pt>
+      </dgm:ptLst>
+      <dgm:cxnLst>
+        <dgm:cxn modelId="5" srcId="0" destId="1" srcOrd="0" destOrd="0"/>
+        <dgm:cxn modelId="6" srcId="0" destId="2" srcOrd="1" destOrd="0"/>
+        <dgm:cxn modelId="7" srcId="0" destId="3" srcOrd="0" destOrd="0"/>
+        <dgm:cxn modelId="8" srcId="0" destId="4" srcOrd="1" destOrd="0"/>
+      </dgm:cxnLst>
+      <dgm:bg/>
+      <dgm:whole/>
+    </dgm:dataModel>
+  </dgm:sampData>
+  <dgm:styleData useDef="1">
+    <dgm:dataModel>
+      <dgm:ptLst/>
+      <dgm:bg/>
+      <dgm:whole/>
+    </dgm:dataModel>
+  </dgm:styleData>
+  <dgm:clrData useDef="1">
+    <dgm:dataModel>
+      <dgm:ptLst/>
+      <dgm:bg/>
+      <dgm:whole/>
+    </dgm:dataModel>
+  </dgm:clrData>
+  <dgm:layoutNode name="matrix">
+    <dgm:varLst>
+      <dgm:chMax val="1"/>
+      <dgm:dir/>
+      <dgm:resizeHandles val="exact"/>
+    </dgm:varLst>
+    <dgm:alg type="composite">
+      <dgm:param type="ar" val="1"/>
+    </dgm:alg>
+    <dgm:shape xmlns:r="http://schemas.openxmlformats.org/officeDocument/2006/relationships" r:blip="">
+      <dgm:adjLst/>
+    </dgm:shape>
+    <dgm:presOf/>
+    <dgm:choose name="Name0">
+      <dgm:if name="Name1" func="var" arg="dir" op="equ" val="norm">
+        <dgm:constrLst>
+          <dgm:constr type="w" for="ch" forName="diamond" refType="w"/>
+          <dgm:constr type="h" for="ch" forName="diamond" refType="h"/>
+          <dgm:constr type="w" for="ch" forName="quad1" refType="w" fact="0.39"/>
+          <dgm:constr type="h" for="ch" forName="quad1" refType="h" fact="0.39"/>
+          <dgm:constr type="ctrX" for="ch" forName="quad1" refType="w" fact="0.29"/>
+          <dgm:constr type="ctrY" for="ch" forName="quad1" refType="h" fact="0.29"/>
+          <dgm:constr type="w" for="ch" forName="quad2" refType="w" fact="0.39"/>
+          <dgm:constr type="h" for="ch" forName="quad2" refType="h" fact="0.39"/>
+          <dgm:constr type="ctrX" for="ch" forName="quad2" refType="w" fact="0.71"/>
+          <dgm:constr type="ctrY" for="ch" forName="quad2" refType="h" fact="0.29"/>
+          <dgm:constr type="w" for="ch" forName="quad3" refType="w" fact="0.39"/>
+          <dgm:constr type="h" for="ch" forName="quad3" refType="h" fact="0.39"/>
+          <dgm:constr type="ctrX" for="ch" forName="quad3" refType="w" fact="0.29"/>
+          <dgm:constr type="ctrY" for="ch" forName="quad3" refType="h" fact="0.71"/>
+          <dgm:constr type="w" for="ch" forName="quad4" refType="w" fact="0.39"/>
+          <dgm:constr type="h" for="ch" forName="quad4" refType="h" fact="0.39"/>
+          <dgm:constr type="ctrX" for="ch" forName="quad4" refType="w" fact="0.71"/>
+          <dgm:constr type="ctrY" for="ch" forName="quad4" refType="h" fact="0.71"/>
+          <dgm:constr type="primFontSz" for="des" ptType="node" op="equ" val="65"/>
+        </dgm:constrLst>
+      </dgm:if>
+      <dgm:else name="Name2">
+        <dgm:constrLst>
+          <dgm:constr type="w" for="ch" forName="diamond" refType="w"/>
+          <dgm:constr type="h" for="ch" forName="diamond" refType="h"/>
+          <dgm:constr type="w" for="ch" forName="quad1" refType="w" fact="0.39"/>
+          <dgm:constr type="h" for="ch" forName="quad1" refType="h" fact="0.39"/>
+          <dgm:constr type="ctrX" for="ch" forName="quad1" refType="w" fact="0.71"/>
+          <dgm:constr type="ctrY" for="ch" forName="quad1" refType="h" fact="0.29"/>
+          <dgm:constr type="w" for="ch" forName="quad2" refType="w" fact="0.39"/>
+          <dgm:constr type="h" for="ch" forName="quad2" refType="h" fact="0.39"/>
+          <dgm:constr type="ctrX" for="ch" forName="quad2" refType="w" fact="0.29"/>
+          <dgm:constr type="ctrY" for="ch" forName="quad2" refType="h" fact="0.29"/>
+          <dgm:constr type="w" for="ch" forName="quad3" refType="w" fact="0.39"/>
+          <dgm:constr type="h" for="ch" forName="quad3" refType="h" fact="0.39"/>
+          <dgm:constr type="ctrX" for="ch" forName="quad3" refType="w" fact="0.71"/>
+          <dgm:constr type="ctrY" for="ch" forName="quad3" refType="h" fact="0.71"/>
+          <dgm:constr type="w" for="ch" forName="quad4" refType="w" fact="0.39"/>
+          <dgm:constr type="h" for="ch" forName="quad4" refType="h" fact="0.39"/>
+          <dgm:constr type="ctrX" for="ch" forName="quad4" refType="w" fact="0.29"/>
+          <dgm:constr type="ctrY" for="ch" forName="quad4" refType="h" fact="0.71"/>
+          <dgm:constr type="primFontSz" for="des" ptType="node" op="equ" val="65"/>
+        </dgm:constrLst>
+      </dgm:else>
+    </dgm:choose>
+    <dgm:ruleLst/>
+    <dgm:choose name="Name3">
+      <dgm:if name="Name4" axis="ch" ptType="node" func="cnt" op="gte" val="1">
+        <dgm:layoutNode name="diamond" styleLbl="bgShp">
+          <dgm:alg type="sp"/>
+          <dgm:shape xmlns:r="http://schemas.openxmlformats.org/officeDocument/2006/relationships" type="diamond" r:blip="">
+            <dgm:adjLst/>
+          </dgm:shape>
+          <dgm:presOf/>
+          <dgm:constrLst>
+            <dgm:constr type="w" refType="h" op="equ"/>
+          </dgm:constrLst>
+          <dgm:ruleLst/>
+        </dgm:layoutNode>
+        <dgm:layoutNode name="quad1">
+          <dgm:varLst>
+            <dgm:chMax val="0"/>
+            <dgm:chPref val="0"/>
+            <dgm:bulletEnabled val="1"/>
+          </dgm:varLst>
+          <dgm:alg type="tx"/>
+          <dgm:shape xmlns:r="http://schemas.openxmlformats.org/officeDocument/2006/relationships" type="roundRect" r:blip="">
+            <dgm:adjLst/>
+          </dgm:shape>
+          <dgm:presOf axis="ch desOrSelf" ptType="node node" st="1 1" cnt="1 0"/>
+          <dgm:constrLst>
+            <dgm:constr type="w" refType="h" op="equ"/>
+            <dgm:constr type="tMarg" refType="primFontSz" fact="0.3"/>
+            <dgm:constr type="bMarg" refType="primFontSz" fact="0.3"/>
+            <dgm:constr type="lMarg" refType="primFontSz" fact="0.3"/>
+            <dgm:constr type="rMarg" refType="primFontSz" fact="0.3"/>
+          </dgm:constrLst>
+          <dgm:ruleLst>
+            <dgm:rule type="primFontSz" val="5" fact="NaN" max="NaN"/>
+          </dgm:ruleLst>
+        </dgm:layoutNode>
+        <dgm:layoutNode name="quad2">
+          <dgm:varLst>
+            <dgm:chMax val="0"/>
+            <dgm:chPref val="0"/>
+            <dgm:bulletEnabled val="1"/>
+          </dgm:varLst>
+          <dgm:alg type="tx"/>
+          <dgm:shape xmlns:r="http://schemas.openxmlformats.org/officeDocument/2006/relationships" type="roundRect" r:blip="">
+            <dgm:adjLst/>
+          </dgm:shape>
+          <dgm:presOf axis="ch desOrSelf" ptType="node node" st="2 1" cnt="1 0"/>
+          <dgm:constrLst>
+            <dgm:constr type="w" refType="h" op="equ"/>
+            <dgm:constr type="tMarg" refType="primFontSz" fact="0.3"/>
+            <dgm:constr type="bMarg" refType="primFontSz" fact="0.3"/>
+            <dgm:constr type="lMarg" refType="primFontSz" fact="0.3"/>
+            <dgm:constr type="rMarg" refType="primFontSz" fact="0.3"/>
+          </dgm:constrLst>
+          <dgm:ruleLst>
+            <dgm:rule type="primFontSz" val="5" fact="NaN" max="NaN"/>
+          </dgm:ruleLst>
+        </dgm:layoutNode>
+        <dgm:layoutNode name="quad3">
+          <dgm:varLst>
+            <dgm:chMax val="0"/>
+            <dgm:chPref val="0"/>
+            <dgm:bulletEnabled val="1"/>
+          </dgm:varLst>
+          <dgm:alg type="tx"/>
+          <dgm:shape xmlns:r="http://schemas.openxmlformats.org/officeDocument/2006/relationships" type="roundRect" r:blip="">
+            <dgm:adjLst/>
+          </dgm:shape>
+          <dgm:presOf axis="ch desOrSelf" ptType="node node" st="3 1" cnt="1 0"/>
+          <dgm:constrLst>
+            <dgm:constr type="w" refType="h" op="equ"/>
+            <dgm:constr type="tMarg" refType="primFontSz" fact="0.3"/>
+            <dgm:constr type="bMarg" refType="primFontSz" fact="0.3"/>
+            <dgm:constr type="lMarg" refType="primFontSz" fact="0.3"/>
+            <dgm:constr type="rMarg" refType="primFontSz" fact="0.3"/>
+          </dgm:constrLst>
+          <dgm:ruleLst>
+            <dgm:rule type="primFontSz" val="5" fact="NaN" max="NaN"/>
+          </dgm:ruleLst>
+        </dgm:layoutNode>
+        <dgm:layoutNode name="quad4">
+          <dgm:varLst>
+            <dgm:chMax val="0"/>
+            <dgm:chPref val="0"/>
+            <dgm:bulletEnabled val="1"/>
+          </dgm:varLst>
+          <dgm:alg type="tx"/>
+          <dgm:shape xmlns:r="http://schemas.openxmlformats.org/officeDocument/2006/relationships" type="roundRect" r:blip="">
+            <dgm:adjLst/>
+          </dgm:shape>
+          <dgm:presOf axis="ch desOrSelf" ptType="node node" st="4 1" cnt="1 0"/>
+          <dgm:constrLst>
+            <dgm:constr type="w" refType="h" op="equ"/>
+            <dgm:constr type="tMarg" refType="primFontSz" fact="0.3"/>
+            <dgm:constr type="bMarg" refType="primFontSz" fact="0.3"/>
+            <dgm:constr type="lMarg" refType="primFontSz" fact="0.3"/>
+            <dgm:constr type="rMarg" refType="primFontSz" fact="0.3"/>
+          </dgm:constrLst>
+          <dgm:ruleLst>
+            <dgm:rule type="primFontSz" val="5" fact="NaN" max="NaN"/>
+          </dgm:ruleLst>
+        </dgm:layoutNode>
+      </dgm:if>
+      <dgm:else name="Name5"/>
+    </dgm:choose>
+  </dgm:layoutNode>
+</dgm:layoutDef>
+</file>
+
 <file path=ppt/diagrams/layout2.xml><?xml version="1.0" encoding="utf-8"?>
 <dgm:layoutDef xmlns:dgm="http://schemas.openxmlformats.org/drawingml/2006/diagram" xmlns:a="http://schemas.openxmlformats.org/drawingml/2006/main" uniqueId="urn:microsoft.com/office/officeart/2005/8/layout/matrix3">
   <dgm:title val=""/>
@@ -30731,6 +32376,1040 @@
 </dgm:styleDef>
 </file>
 
+<file path=ppt/diagrams/quickStyle11.xml><?xml version="1.0" encoding="utf-8"?>
+<dgm:styleDef xmlns:dgm="http://schemas.openxmlformats.org/drawingml/2006/diagram" xmlns:a="http://schemas.openxmlformats.org/drawingml/2006/main" uniqueId="urn:microsoft.com/office/officeart/2005/8/quickstyle/simple1">
+  <dgm:title val=""/>
+  <dgm:desc val=""/>
+  <dgm:catLst>
+    <dgm:cat type="simple" pri="10100"/>
+  </dgm:catLst>
+  <dgm:scene3d>
+    <a:camera prst="orthographicFront"/>
+    <a:lightRig rig="threePt" dir="t"/>
+  </dgm:scene3d>
+  <dgm:styleLbl name="node0">
+    <dgm:scene3d>
+      <a:camera prst="orthographicFront"/>
+      <a:lightRig rig="threePt" dir="t"/>
+    </dgm:scene3d>
+    <dgm:sp3d/>
+    <dgm:txPr/>
+    <dgm:style>
+      <a:lnRef idx="2">
+        <a:scrgbClr r="0" g="0" b="0"/>
+      </a:lnRef>
+      <a:fillRef idx="1">
+        <a:scrgbClr r="0" g="0" b="0"/>
+      </a:fillRef>
+      <a:effectRef idx="0">
+        <a:scrgbClr r="0" g="0" b="0"/>
+      </a:effectRef>
+      <a:fontRef idx="minor">
+        <a:schemeClr val="lt1"/>
+      </a:fontRef>
+    </dgm:style>
+  </dgm:styleLbl>
+  <dgm:styleLbl name="lnNode1">
+    <dgm:scene3d>
+      <a:camera prst="orthographicFront"/>
+      <a:lightRig rig="threePt" dir="t"/>
+    </dgm:scene3d>
+    <dgm:sp3d/>
+    <dgm:txPr/>
+    <dgm:style>
+      <a:lnRef idx="2">
+        <a:scrgbClr r="0" g="0" b="0"/>
+      </a:lnRef>
+      <a:fillRef idx="1">
+        <a:scrgbClr r="0" g="0" b="0"/>
+      </a:fillRef>
+      <a:effectRef idx="0">
+        <a:scrgbClr r="0" g="0" b="0"/>
+      </a:effectRef>
+      <a:fontRef idx="minor">
+        <a:schemeClr val="lt1"/>
+      </a:fontRef>
+    </dgm:style>
+  </dgm:styleLbl>
+  <dgm:styleLbl name="vennNode1">
+    <dgm:scene3d>
+      <a:camera prst="orthographicFront"/>
+      <a:lightRig rig="threePt" dir="t"/>
+    </dgm:scene3d>
+    <dgm:sp3d/>
+    <dgm:txPr/>
+    <dgm:style>
+      <a:lnRef idx="2">
+        <a:scrgbClr r="0" g="0" b="0"/>
+      </a:lnRef>
+      <a:fillRef idx="1">
+        <a:scrgbClr r="0" g="0" b="0"/>
+      </a:fillRef>
+      <a:effectRef idx="0">
+        <a:scrgbClr r="0" g="0" b="0"/>
+      </a:effectRef>
+      <a:fontRef idx="minor">
+        <a:schemeClr val="tx1"/>
+      </a:fontRef>
+    </dgm:style>
+  </dgm:styleLbl>
+  <dgm:styleLbl name="alignNode1">
+    <dgm:scene3d>
+      <a:camera prst="orthographicFront"/>
+      <a:lightRig rig="threePt" dir="t"/>
+    </dgm:scene3d>
+    <dgm:sp3d/>
+    <dgm:txPr/>
+    <dgm:style>
+      <a:lnRef idx="2">
+        <a:scrgbClr r="0" g="0" b="0"/>
+      </a:lnRef>
+      <a:fillRef idx="1">
+        <a:scrgbClr r="0" g="0" b="0"/>
+      </a:fillRef>
+      <a:effectRef idx="0">
+        <a:scrgbClr r="0" g="0" b="0"/>
+      </a:effectRef>
+      <a:fontRef idx="minor">
+        <a:schemeClr val="lt1"/>
+      </a:fontRef>
+    </dgm:style>
+  </dgm:styleLbl>
+  <dgm:styleLbl name="node1">
+    <dgm:scene3d>
+      <a:camera prst="orthographicFront"/>
+      <a:lightRig rig="threePt" dir="t"/>
+    </dgm:scene3d>
+    <dgm:sp3d/>
+    <dgm:txPr/>
+    <dgm:style>
+      <a:lnRef idx="2">
+        <a:scrgbClr r="0" g="0" b="0"/>
+      </a:lnRef>
+      <a:fillRef idx="1">
+        <a:scrgbClr r="0" g="0" b="0"/>
+      </a:fillRef>
+      <a:effectRef idx="0">
+        <a:scrgbClr r="0" g="0" b="0"/>
+      </a:effectRef>
+      <a:fontRef idx="minor">
+        <a:schemeClr val="lt1"/>
+      </a:fontRef>
+    </dgm:style>
+  </dgm:styleLbl>
+  <dgm:styleLbl name="node2">
+    <dgm:scene3d>
+      <a:camera prst="orthographicFront"/>
+      <a:lightRig rig="threePt" dir="t"/>
+    </dgm:scene3d>
+    <dgm:sp3d/>
+    <dgm:txPr/>
+    <dgm:style>
+      <a:lnRef idx="2">
+        <a:scrgbClr r="0" g="0" b="0"/>
+      </a:lnRef>
+      <a:fillRef idx="1">
+        <a:scrgbClr r="0" g="0" b="0"/>
+      </a:fillRef>
+      <a:effectRef idx="0">
+        <a:scrgbClr r="0" g="0" b="0"/>
+      </a:effectRef>
+      <a:fontRef idx="minor">
+        <a:schemeClr val="lt1"/>
+      </a:fontRef>
+    </dgm:style>
+  </dgm:styleLbl>
+  <dgm:styleLbl name="node3">
+    <dgm:scene3d>
+      <a:camera prst="orthographicFront"/>
+      <a:lightRig rig="threePt" dir="t"/>
+    </dgm:scene3d>
+    <dgm:sp3d/>
+    <dgm:txPr/>
+    <dgm:style>
+      <a:lnRef idx="2">
+        <a:scrgbClr r="0" g="0" b="0"/>
+      </a:lnRef>
+      <a:fillRef idx="1">
+        <a:scrgbClr r="0" g="0" b="0"/>
+      </a:fillRef>
+      <a:effectRef idx="0">
+        <a:scrgbClr r="0" g="0" b="0"/>
+      </a:effectRef>
+      <a:fontRef idx="minor">
+        <a:schemeClr val="lt1"/>
+      </a:fontRef>
+    </dgm:style>
+  </dgm:styleLbl>
+  <dgm:styleLbl name="node4">
+    <dgm:scene3d>
+      <a:camera prst="orthographicFront"/>
+      <a:lightRig rig="threePt" dir="t"/>
+    </dgm:scene3d>
+    <dgm:sp3d/>
+    <dgm:txPr/>
+    <dgm:style>
+      <a:lnRef idx="2">
+        <a:scrgbClr r="0" g="0" b="0"/>
+      </a:lnRef>
+      <a:fillRef idx="1">
+        <a:scrgbClr r="0" g="0" b="0"/>
+      </a:fillRef>
+      <a:effectRef idx="0">
+        <a:scrgbClr r="0" g="0" b="0"/>
+      </a:effectRef>
+      <a:fontRef idx="minor">
+        <a:schemeClr val="lt1"/>
+      </a:fontRef>
+    </dgm:style>
+  </dgm:styleLbl>
+  <dgm:styleLbl name="fgImgPlace1">
+    <dgm:scene3d>
+      <a:camera prst="orthographicFront"/>
+      <a:lightRig rig="threePt" dir="t"/>
+    </dgm:scene3d>
+    <dgm:sp3d/>
+    <dgm:txPr/>
+    <dgm:style>
+      <a:lnRef idx="2">
+        <a:scrgbClr r="0" g="0" b="0"/>
+      </a:lnRef>
+      <a:fillRef idx="1">
+        <a:scrgbClr r="0" g="0" b="0"/>
+      </a:fillRef>
+      <a:effectRef idx="0">
+        <a:scrgbClr r="0" g="0" b="0"/>
+      </a:effectRef>
+      <a:fontRef idx="minor"/>
+    </dgm:style>
+  </dgm:styleLbl>
+  <dgm:styleLbl name="alignImgPlace1">
+    <dgm:scene3d>
+      <a:camera prst="orthographicFront"/>
+      <a:lightRig rig="threePt" dir="t"/>
+    </dgm:scene3d>
+    <dgm:sp3d/>
+    <dgm:txPr/>
+    <dgm:style>
+      <a:lnRef idx="2">
+        <a:scrgbClr r="0" g="0" b="0"/>
+      </a:lnRef>
+      <a:fillRef idx="1">
+        <a:scrgbClr r="0" g="0" b="0"/>
+      </a:fillRef>
+      <a:effectRef idx="0">
+        <a:scrgbClr r="0" g="0" b="0"/>
+      </a:effectRef>
+      <a:fontRef idx="minor"/>
+    </dgm:style>
+  </dgm:styleLbl>
+  <dgm:styleLbl name="bgImgPlace1">
+    <dgm:scene3d>
+      <a:camera prst="orthographicFront"/>
+      <a:lightRig rig="threePt" dir="t"/>
+    </dgm:scene3d>
+    <dgm:sp3d/>
+    <dgm:txPr/>
+    <dgm:style>
+      <a:lnRef idx="2">
+        <a:scrgbClr r="0" g="0" b="0"/>
+      </a:lnRef>
+      <a:fillRef idx="1">
+        <a:scrgbClr r="0" g="0" b="0"/>
+      </a:fillRef>
+      <a:effectRef idx="0">
+        <a:scrgbClr r="0" g="0" b="0"/>
+      </a:effectRef>
+      <a:fontRef idx="minor"/>
+    </dgm:style>
+  </dgm:styleLbl>
+  <dgm:styleLbl name="sibTrans2D1">
+    <dgm:scene3d>
+      <a:camera prst="orthographicFront"/>
+      <a:lightRig rig="threePt" dir="t"/>
+    </dgm:scene3d>
+    <dgm:sp3d/>
+    <dgm:txPr/>
+    <dgm:style>
+      <a:lnRef idx="0">
+        <a:scrgbClr r="0" g="0" b="0"/>
+      </a:lnRef>
+      <a:fillRef idx="1">
+        <a:scrgbClr r="0" g="0" b="0"/>
+      </a:fillRef>
+      <a:effectRef idx="0">
+        <a:scrgbClr r="0" g="0" b="0"/>
+      </a:effectRef>
+      <a:fontRef idx="minor">
+        <a:schemeClr val="lt1"/>
+      </a:fontRef>
+    </dgm:style>
+  </dgm:styleLbl>
+  <dgm:styleLbl name="fgSibTrans2D1">
+    <dgm:scene3d>
+      <a:camera prst="orthographicFront"/>
+      <a:lightRig rig="threePt" dir="t"/>
+    </dgm:scene3d>
+    <dgm:sp3d/>
+    <dgm:txPr/>
+    <dgm:style>
+      <a:lnRef idx="0">
+        <a:scrgbClr r="0" g="0" b="0"/>
+      </a:lnRef>
+      <a:fillRef idx="1">
+        <a:scrgbClr r="0" g="0" b="0"/>
+      </a:fillRef>
+      <a:effectRef idx="0">
+        <a:scrgbClr r="0" g="0" b="0"/>
+      </a:effectRef>
+      <a:fontRef idx="minor">
+        <a:schemeClr val="lt1"/>
+      </a:fontRef>
+    </dgm:style>
+  </dgm:styleLbl>
+  <dgm:styleLbl name="bgSibTrans2D1">
+    <dgm:scene3d>
+      <a:camera prst="orthographicFront"/>
+      <a:lightRig rig="threePt" dir="t"/>
+    </dgm:scene3d>
+    <dgm:sp3d/>
+    <dgm:txPr/>
+    <dgm:style>
+      <a:lnRef idx="0">
+        <a:scrgbClr r="0" g="0" b="0"/>
+      </a:lnRef>
+      <a:fillRef idx="1">
+        <a:scrgbClr r="0" g="0" b="0"/>
+      </a:fillRef>
+      <a:effectRef idx="0">
+        <a:scrgbClr r="0" g="0" b="0"/>
+      </a:effectRef>
+      <a:fontRef idx="minor">
+        <a:schemeClr val="lt1"/>
+      </a:fontRef>
+    </dgm:style>
+  </dgm:styleLbl>
+  <dgm:styleLbl name="sibTrans1D1">
+    <dgm:scene3d>
+      <a:camera prst="orthographicFront"/>
+      <a:lightRig rig="threePt" dir="t"/>
+    </dgm:scene3d>
+    <dgm:sp3d/>
+    <dgm:txPr/>
+    <dgm:style>
+      <a:lnRef idx="1">
+        <a:scrgbClr r="0" g="0" b="0"/>
+      </a:lnRef>
+      <a:fillRef idx="0">
+        <a:scrgbClr r="0" g="0" b="0"/>
+      </a:fillRef>
+      <a:effectRef idx="0">
+        <a:scrgbClr r="0" g="0" b="0"/>
+      </a:effectRef>
+      <a:fontRef idx="minor"/>
+    </dgm:style>
+  </dgm:styleLbl>
+  <dgm:styleLbl name="callout">
+    <dgm:scene3d>
+      <a:camera prst="orthographicFront"/>
+      <a:lightRig rig="threePt" dir="t"/>
+    </dgm:scene3d>
+    <dgm:sp3d/>
+    <dgm:txPr/>
+    <dgm:style>
+      <a:lnRef idx="2">
+        <a:scrgbClr r="0" g="0" b="0"/>
+      </a:lnRef>
+      <a:fillRef idx="1">
+        <a:scrgbClr r="0" g="0" b="0"/>
+      </a:fillRef>
+      <a:effectRef idx="0">
+        <a:scrgbClr r="0" g="0" b="0"/>
+      </a:effectRef>
+      <a:fontRef idx="minor"/>
+    </dgm:style>
+  </dgm:styleLbl>
+  <dgm:styleLbl name="asst0">
+    <dgm:scene3d>
+      <a:camera prst="orthographicFront"/>
+      <a:lightRig rig="threePt" dir="t"/>
+    </dgm:scene3d>
+    <dgm:sp3d/>
+    <dgm:txPr/>
+    <dgm:style>
+      <a:lnRef idx="2">
+        <a:scrgbClr r="0" g="0" b="0"/>
+      </a:lnRef>
+      <a:fillRef idx="1">
+        <a:scrgbClr r="0" g="0" b="0"/>
+      </a:fillRef>
+      <a:effectRef idx="0">
+        <a:scrgbClr r="0" g="0" b="0"/>
+      </a:effectRef>
+      <a:fontRef idx="minor">
+        <a:schemeClr val="lt1"/>
+      </a:fontRef>
+    </dgm:style>
+  </dgm:styleLbl>
+  <dgm:styleLbl name="asst1">
+    <dgm:scene3d>
+      <a:camera prst="orthographicFront"/>
+      <a:lightRig rig="threePt" dir="t"/>
+    </dgm:scene3d>
+    <dgm:sp3d/>
+    <dgm:txPr/>
+    <dgm:style>
+      <a:lnRef idx="2">
+        <a:scrgbClr r="0" g="0" b="0"/>
+      </a:lnRef>
+      <a:fillRef idx="1">
+        <a:scrgbClr r="0" g="0" b="0"/>
+      </a:fillRef>
+      <a:effectRef idx="0">
+        <a:scrgbClr r="0" g="0" b="0"/>
+      </a:effectRef>
+      <a:fontRef idx="minor">
+        <a:schemeClr val="lt1"/>
+      </a:fontRef>
+    </dgm:style>
+  </dgm:styleLbl>
+  <dgm:styleLbl name="asst2">
+    <dgm:scene3d>
+      <a:camera prst="orthographicFront"/>
+      <a:lightRig rig="threePt" dir="t"/>
+    </dgm:scene3d>
+    <dgm:sp3d/>
+    <dgm:txPr/>
+    <dgm:style>
+      <a:lnRef idx="2">
+        <a:scrgbClr r="0" g="0" b="0"/>
+      </a:lnRef>
+      <a:fillRef idx="1">
+        <a:scrgbClr r="0" g="0" b="0"/>
+      </a:fillRef>
+      <a:effectRef idx="0">
+        <a:scrgbClr r="0" g="0" b="0"/>
+      </a:effectRef>
+      <a:fontRef idx="minor">
+        <a:schemeClr val="lt1"/>
+      </a:fontRef>
+    </dgm:style>
+  </dgm:styleLbl>
+  <dgm:styleLbl name="asst3">
+    <dgm:scene3d>
+      <a:camera prst="orthographicFront"/>
+      <a:lightRig rig="threePt" dir="t"/>
+    </dgm:scene3d>
+    <dgm:sp3d/>
+    <dgm:txPr/>
+    <dgm:style>
+      <a:lnRef idx="2">
+        <a:scrgbClr r="0" g="0" b="0"/>
+      </a:lnRef>
+      <a:fillRef idx="1">
+        <a:scrgbClr r="0" g="0" b="0"/>
+      </a:fillRef>
+      <a:effectRef idx="0">
+        <a:scrgbClr r="0" g="0" b="0"/>
+      </a:effectRef>
+      <a:fontRef idx="minor">
+        <a:schemeClr val="lt1"/>
+      </a:fontRef>
+    </dgm:style>
+  </dgm:styleLbl>
+  <dgm:styleLbl name="asst4">
+    <dgm:scene3d>
+      <a:camera prst="orthographicFront"/>
+      <a:lightRig rig="threePt" dir="t"/>
+    </dgm:scene3d>
+    <dgm:sp3d/>
+    <dgm:txPr/>
+    <dgm:style>
+      <a:lnRef idx="2">
+        <a:scrgbClr r="0" g="0" b="0"/>
+      </a:lnRef>
+      <a:fillRef idx="1">
+        <a:scrgbClr r="0" g="0" b="0"/>
+      </a:fillRef>
+      <a:effectRef idx="0">
+        <a:scrgbClr r="0" g="0" b="0"/>
+      </a:effectRef>
+      <a:fontRef idx="minor">
+        <a:schemeClr val="lt1"/>
+      </a:fontRef>
+    </dgm:style>
+  </dgm:styleLbl>
+  <dgm:styleLbl name="parChTrans2D1">
+    <dgm:scene3d>
+      <a:camera prst="orthographicFront"/>
+      <a:lightRig rig="threePt" dir="t"/>
+    </dgm:scene3d>
+    <dgm:sp3d/>
+    <dgm:txPr/>
+    <dgm:style>
+      <a:lnRef idx="2">
+        <a:scrgbClr r="0" g="0" b="0"/>
+      </a:lnRef>
+      <a:fillRef idx="1">
+        <a:scrgbClr r="0" g="0" b="0"/>
+      </a:fillRef>
+      <a:effectRef idx="0">
+        <a:scrgbClr r="0" g="0" b="0"/>
+      </a:effectRef>
+      <a:fontRef idx="minor">
+        <a:schemeClr val="lt1"/>
+      </a:fontRef>
+    </dgm:style>
+  </dgm:styleLbl>
+  <dgm:styleLbl name="parChTrans2D2">
+    <dgm:scene3d>
+      <a:camera prst="orthographicFront"/>
+      <a:lightRig rig="threePt" dir="t"/>
+    </dgm:scene3d>
+    <dgm:sp3d/>
+    <dgm:txPr/>
+    <dgm:style>
+      <a:lnRef idx="2">
+        <a:scrgbClr r="0" g="0" b="0"/>
+      </a:lnRef>
+      <a:fillRef idx="1">
+        <a:scrgbClr r="0" g="0" b="0"/>
+      </a:fillRef>
+      <a:effectRef idx="0">
+        <a:scrgbClr r="0" g="0" b="0"/>
+      </a:effectRef>
+      <a:fontRef idx="minor">
+        <a:schemeClr val="lt1"/>
+      </a:fontRef>
+    </dgm:style>
+  </dgm:styleLbl>
+  <dgm:styleLbl name="parChTrans2D3">
+    <dgm:scene3d>
+      <a:camera prst="orthographicFront"/>
+      <a:lightRig rig="threePt" dir="t"/>
+    </dgm:scene3d>
+    <dgm:sp3d/>
+    <dgm:txPr/>
+    <dgm:style>
+      <a:lnRef idx="2">
+        <a:scrgbClr r="0" g="0" b="0"/>
+      </a:lnRef>
+      <a:fillRef idx="1">
+        <a:scrgbClr r="0" g="0" b="0"/>
+      </a:fillRef>
+      <a:effectRef idx="0">
+        <a:scrgbClr r="0" g="0" b="0"/>
+      </a:effectRef>
+      <a:fontRef idx="minor">
+        <a:schemeClr val="lt1"/>
+      </a:fontRef>
+    </dgm:style>
+  </dgm:styleLbl>
+  <dgm:styleLbl name="parChTrans2D4">
+    <dgm:scene3d>
+      <a:camera prst="orthographicFront"/>
+      <a:lightRig rig="threePt" dir="t"/>
+    </dgm:scene3d>
+    <dgm:sp3d/>
+    <dgm:txPr/>
+    <dgm:style>
+      <a:lnRef idx="2">
+        <a:scrgbClr r="0" g="0" b="0"/>
+      </a:lnRef>
+      <a:fillRef idx="1">
+        <a:scrgbClr r="0" g="0" b="0"/>
+      </a:fillRef>
+      <a:effectRef idx="0">
+        <a:scrgbClr r="0" g="0" b="0"/>
+      </a:effectRef>
+      <a:fontRef idx="minor">
+        <a:schemeClr val="lt1"/>
+      </a:fontRef>
+    </dgm:style>
+  </dgm:styleLbl>
+  <dgm:styleLbl name="parChTrans1D1">
+    <dgm:scene3d>
+      <a:camera prst="orthographicFront"/>
+      <a:lightRig rig="threePt" dir="t"/>
+    </dgm:scene3d>
+    <dgm:sp3d/>
+    <dgm:txPr/>
+    <dgm:style>
+      <a:lnRef idx="2">
+        <a:scrgbClr r="0" g="0" b="0"/>
+      </a:lnRef>
+      <a:fillRef idx="0">
+        <a:scrgbClr r="0" g="0" b="0"/>
+      </a:fillRef>
+      <a:effectRef idx="0">
+        <a:scrgbClr r="0" g="0" b="0"/>
+      </a:effectRef>
+      <a:fontRef idx="minor"/>
+    </dgm:style>
+  </dgm:styleLbl>
+  <dgm:styleLbl name="parChTrans1D2">
+    <dgm:scene3d>
+      <a:camera prst="orthographicFront"/>
+      <a:lightRig rig="threePt" dir="t"/>
+    </dgm:scene3d>
+    <dgm:sp3d/>
+    <dgm:txPr/>
+    <dgm:style>
+      <a:lnRef idx="2">
+        <a:scrgbClr r="0" g="0" b="0"/>
+      </a:lnRef>
+      <a:fillRef idx="0">
+        <a:scrgbClr r="0" g="0" b="0"/>
+      </a:fillRef>
+      <a:effectRef idx="0">
+        <a:scrgbClr r="0" g="0" b="0"/>
+      </a:effectRef>
+      <a:fontRef idx="minor"/>
+    </dgm:style>
+  </dgm:styleLbl>
+  <dgm:styleLbl name="parChTrans1D3">
+    <dgm:scene3d>
+      <a:camera prst="orthographicFront"/>
+      <a:lightRig rig="threePt" dir="t"/>
+    </dgm:scene3d>
+    <dgm:sp3d/>
+    <dgm:txPr/>
+    <dgm:style>
+      <a:lnRef idx="2">
+        <a:scrgbClr r="0" g="0" b="0"/>
+      </a:lnRef>
+      <a:fillRef idx="0">
+        <a:scrgbClr r="0" g="0" b="0"/>
+      </a:fillRef>
+      <a:effectRef idx="0">
+        <a:scrgbClr r="0" g="0" b="0"/>
+      </a:effectRef>
+      <a:fontRef idx="minor"/>
+    </dgm:style>
+  </dgm:styleLbl>
+  <dgm:styleLbl name="parChTrans1D4">
+    <dgm:scene3d>
+      <a:camera prst="orthographicFront"/>
+      <a:lightRig rig="threePt" dir="t"/>
+    </dgm:scene3d>
+    <dgm:sp3d/>
+    <dgm:txPr/>
+    <dgm:style>
+      <a:lnRef idx="2">
+        <a:scrgbClr r="0" g="0" b="0"/>
+      </a:lnRef>
+      <a:fillRef idx="0">
+        <a:scrgbClr r="0" g="0" b="0"/>
+      </a:fillRef>
+      <a:effectRef idx="0">
+        <a:scrgbClr r="0" g="0" b="0"/>
+      </a:effectRef>
+      <a:fontRef idx="minor"/>
+    </dgm:style>
+  </dgm:styleLbl>
+  <dgm:styleLbl name="fgAcc1">
+    <dgm:scene3d>
+      <a:camera prst="orthographicFront"/>
+      <a:lightRig rig="threePt" dir="t"/>
+    </dgm:scene3d>
+    <dgm:sp3d/>
+    <dgm:txPr/>
+    <dgm:style>
+      <a:lnRef idx="2">
+        <a:scrgbClr r="0" g="0" b="0"/>
+      </a:lnRef>
+      <a:fillRef idx="1">
+        <a:scrgbClr r="0" g="0" b="0"/>
+      </a:fillRef>
+      <a:effectRef idx="0">
+        <a:scrgbClr r="0" g="0" b="0"/>
+      </a:effectRef>
+      <a:fontRef idx="minor"/>
+    </dgm:style>
+  </dgm:styleLbl>
+  <dgm:styleLbl name="conFgAcc1">
+    <dgm:scene3d>
+      <a:camera prst="orthographicFront"/>
+      <a:lightRig rig="threePt" dir="t"/>
+    </dgm:scene3d>
+    <dgm:sp3d/>
+    <dgm:txPr/>
+    <dgm:style>
+      <a:lnRef idx="2">
+        <a:scrgbClr r="0" g="0" b="0"/>
+      </a:lnRef>
+      <a:fillRef idx="1">
+        <a:scrgbClr r="0" g="0" b="0"/>
+      </a:fillRef>
+      <a:effectRef idx="0">
+        <a:scrgbClr r="0" g="0" b="0"/>
+      </a:effectRef>
+      <a:fontRef idx="minor"/>
+    </dgm:style>
+  </dgm:styleLbl>
+  <dgm:styleLbl name="alignAcc1">
+    <dgm:scene3d>
+      <a:camera prst="orthographicFront"/>
+      <a:lightRig rig="threePt" dir="t"/>
+    </dgm:scene3d>
+    <dgm:sp3d/>
+    <dgm:txPr/>
+    <dgm:style>
+      <a:lnRef idx="2">
+        <a:scrgbClr r="0" g="0" b="0"/>
+      </a:lnRef>
+      <a:fillRef idx="1">
+        <a:scrgbClr r="0" g="0" b="0"/>
+      </a:fillRef>
+      <a:effectRef idx="0">
+        <a:scrgbClr r="0" g="0" b="0"/>
+      </a:effectRef>
+      <a:fontRef idx="minor"/>
+    </dgm:style>
+  </dgm:styleLbl>
+  <dgm:styleLbl name="trAlignAcc1">
+    <dgm:scene3d>
+      <a:camera prst="orthographicFront"/>
+      <a:lightRig rig="threePt" dir="t"/>
+    </dgm:scene3d>
+    <dgm:sp3d/>
+    <dgm:txPr/>
+    <dgm:style>
+      <a:lnRef idx="1">
+        <a:scrgbClr r="0" g="0" b="0"/>
+      </a:lnRef>
+      <a:fillRef idx="1">
+        <a:scrgbClr r="0" g="0" b="0"/>
+      </a:fillRef>
+      <a:effectRef idx="0">
+        <a:scrgbClr r="0" g="0" b="0"/>
+      </a:effectRef>
+      <a:fontRef idx="minor"/>
+    </dgm:style>
+  </dgm:styleLbl>
+  <dgm:styleLbl name="bgAcc1">
+    <dgm:scene3d>
+      <a:camera prst="orthographicFront"/>
+      <a:lightRig rig="threePt" dir="t"/>
+    </dgm:scene3d>
+    <dgm:sp3d/>
+    <dgm:txPr/>
+    <dgm:style>
+      <a:lnRef idx="2">
+        <a:scrgbClr r="0" g="0" b="0"/>
+      </a:lnRef>
+      <a:fillRef idx="1">
+        <a:scrgbClr r="0" g="0" b="0"/>
+      </a:fillRef>
+      <a:effectRef idx="0">
+        <a:scrgbClr r="0" g="0" b="0"/>
+      </a:effectRef>
+      <a:fontRef idx="minor"/>
+    </dgm:style>
+  </dgm:styleLbl>
+  <dgm:styleLbl name="solidFgAcc1">
+    <dgm:scene3d>
+      <a:camera prst="orthographicFront"/>
+      <a:lightRig rig="threePt" dir="t"/>
+    </dgm:scene3d>
+    <dgm:sp3d/>
+    <dgm:txPr/>
+    <dgm:style>
+      <a:lnRef idx="2">
+        <a:scrgbClr r="0" g="0" b="0"/>
+      </a:lnRef>
+      <a:fillRef idx="1">
+        <a:scrgbClr r="0" g="0" b="0"/>
+      </a:fillRef>
+      <a:effectRef idx="0">
+        <a:scrgbClr r="0" g="0" b="0"/>
+      </a:effectRef>
+      <a:fontRef idx="minor"/>
+    </dgm:style>
+  </dgm:styleLbl>
+  <dgm:styleLbl name="solidAlignAcc1">
+    <dgm:scene3d>
+      <a:camera prst="orthographicFront"/>
+      <a:lightRig rig="threePt" dir="t"/>
+    </dgm:scene3d>
+    <dgm:sp3d/>
+    <dgm:txPr/>
+    <dgm:style>
+      <a:lnRef idx="2">
+        <a:scrgbClr r="0" g="0" b="0"/>
+      </a:lnRef>
+      <a:fillRef idx="1">
+        <a:scrgbClr r="0" g="0" b="0"/>
+      </a:fillRef>
+      <a:effectRef idx="0">
+        <a:scrgbClr r="0" g="0" b="0"/>
+      </a:effectRef>
+      <a:fontRef idx="minor"/>
+    </dgm:style>
+  </dgm:styleLbl>
+  <dgm:styleLbl name="solidBgAcc1">
+    <dgm:scene3d>
+      <a:camera prst="orthographicFront"/>
+      <a:lightRig rig="threePt" dir="t"/>
+    </dgm:scene3d>
+    <dgm:sp3d/>
+    <dgm:txPr/>
+    <dgm:style>
+      <a:lnRef idx="2">
+        <a:scrgbClr r="0" g="0" b="0"/>
+      </a:lnRef>
+      <a:fillRef idx="1">
+        <a:scrgbClr r="0" g="0" b="0"/>
+      </a:fillRef>
+      <a:effectRef idx="0">
+        <a:scrgbClr r="0" g="0" b="0"/>
+      </a:effectRef>
+      <a:fontRef idx="minor"/>
+    </dgm:style>
+  </dgm:styleLbl>
+  <dgm:styleLbl name="fgAccFollowNode1">
+    <dgm:scene3d>
+      <a:camera prst="orthographicFront"/>
+      <a:lightRig rig="threePt" dir="t"/>
+    </dgm:scene3d>
+    <dgm:sp3d/>
+    <dgm:txPr/>
+    <dgm:style>
+      <a:lnRef idx="2">
+        <a:scrgbClr r="0" g="0" b="0"/>
+      </a:lnRef>
+      <a:fillRef idx="1">
+        <a:scrgbClr r="0" g="0" b="0"/>
+      </a:fillRef>
+      <a:effectRef idx="0">
+        <a:scrgbClr r="0" g="0" b="0"/>
+      </a:effectRef>
+      <a:fontRef idx="minor"/>
+    </dgm:style>
+  </dgm:styleLbl>
+  <dgm:styleLbl name="alignAccFollowNode1">
+    <dgm:scene3d>
+      <a:camera prst="orthographicFront"/>
+      <a:lightRig rig="threePt" dir="t"/>
+    </dgm:scene3d>
+    <dgm:sp3d/>
+    <dgm:txPr/>
+    <dgm:style>
+      <a:lnRef idx="2">
+        <a:scrgbClr r="0" g="0" b="0"/>
+      </a:lnRef>
+      <a:fillRef idx="1">
+        <a:scrgbClr r="0" g="0" b="0"/>
+      </a:fillRef>
+      <a:effectRef idx="0">
+        <a:scrgbClr r="0" g="0" b="0"/>
+      </a:effectRef>
+      <a:fontRef idx="minor"/>
+    </dgm:style>
+  </dgm:styleLbl>
+  <dgm:styleLbl name="bgAccFollowNode1">
+    <dgm:scene3d>
+      <a:camera prst="orthographicFront"/>
+      <a:lightRig rig="threePt" dir="t"/>
+    </dgm:scene3d>
+    <dgm:sp3d/>
+    <dgm:txPr/>
+    <dgm:style>
+      <a:lnRef idx="2">
+        <a:scrgbClr r="0" g="0" b="0"/>
+      </a:lnRef>
+      <a:fillRef idx="1">
+        <a:scrgbClr r="0" g="0" b="0"/>
+      </a:fillRef>
+      <a:effectRef idx="0">
+        <a:scrgbClr r="0" g="0" b="0"/>
+      </a:effectRef>
+      <a:fontRef idx="minor"/>
+    </dgm:style>
+  </dgm:styleLbl>
+  <dgm:styleLbl name="fgAcc0">
+    <dgm:scene3d>
+      <a:camera prst="orthographicFront"/>
+      <a:lightRig rig="threePt" dir="t"/>
+    </dgm:scene3d>
+    <dgm:sp3d/>
+    <dgm:txPr/>
+    <dgm:style>
+      <a:lnRef idx="2">
+        <a:scrgbClr r="0" g="0" b="0"/>
+      </a:lnRef>
+      <a:fillRef idx="1">
+        <a:scrgbClr r="0" g="0" b="0"/>
+      </a:fillRef>
+      <a:effectRef idx="0">
+        <a:scrgbClr r="0" g="0" b="0"/>
+      </a:effectRef>
+      <a:fontRef idx="minor"/>
+    </dgm:style>
+  </dgm:styleLbl>
+  <dgm:styleLbl name="fgAcc2">
+    <dgm:scene3d>
+      <a:camera prst="orthographicFront"/>
+      <a:lightRig rig="threePt" dir="t"/>
+    </dgm:scene3d>
+    <dgm:sp3d/>
+    <dgm:txPr/>
+    <dgm:style>
+      <a:lnRef idx="2">
+        <a:scrgbClr r="0" g="0" b="0"/>
+      </a:lnRef>
+      <a:fillRef idx="1">
+        <a:scrgbClr r="0" g="0" b="0"/>
+      </a:fillRef>
+      <a:effectRef idx="0">
+        <a:scrgbClr r="0" g="0" b="0"/>
+      </a:effectRef>
+      <a:fontRef idx="minor"/>
+    </dgm:style>
+  </dgm:styleLbl>
+  <dgm:styleLbl name="fgAcc3">
+    <dgm:scene3d>
+      <a:camera prst="orthographicFront"/>
+      <a:lightRig rig="threePt" dir="t"/>
+    </dgm:scene3d>
+    <dgm:sp3d/>
+    <dgm:txPr/>
+    <dgm:style>
+      <a:lnRef idx="2">
+        <a:scrgbClr r="0" g="0" b="0"/>
+      </a:lnRef>
+      <a:fillRef idx="1">
+        <a:scrgbClr r="0" g="0" b="0"/>
+      </a:fillRef>
+      <a:effectRef idx="0">
+        <a:scrgbClr r="0" g="0" b="0"/>
+      </a:effectRef>
+      <a:fontRef idx="minor"/>
+    </dgm:style>
+  </dgm:styleLbl>
+  <dgm:styleLbl name="fgAcc4">
+    <dgm:scene3d>
+      <a:camera prst="orthographicFront"/>
+      <a:lightRig rig="threePt" dir="t"/>
+    </dgm:scene3d>
+    <dgm:sp3d/>
+    <dgm:txPr/>
+    <dgm:style>
+      <a:lnRef idx="2">
+        <a:scrgbClr r="0" g="0" b="0"/>
+      </a:lnRef>
+      <a:fillRef idx="1">
+        <a:scrgbClr r="0" g="0" b="0"/>
+      </a:fillRef>
+      <a:effectRef idx="0">
+        <a:scrgbClr r="0" g="0" b="0"/>
+      </a:effectRef>
+      <a:fontRef idx="minor"/>
+    </dgm:style>
+  </dgm:styleLbl>
+  <dgm:styleLbl name="bgShp">
+    <dgm:scene3d>
+      <a:camera prst="orthographicFront"/>
+      <a:lightRig rig="threePt" dir="t"/>
+    </dgm:scene3d>
+    <dgm:sp3d/>
+    <dgm:txPr/>
+    <dgm:style>
+      <a:lnRef idx="0">
+        <a:scrgbClr r="0" g="0" b="0"/>
+      </a:lnRef>
+      <a:fillRef idx="1">
+        <a:scrgbClr r="0" g="0" b="0"/>
+      </a:fillRef>
+      <a:effectRef idx="0">
+        <a:scrgbClr r="0" g="0" b="0"/>
+      </a:effectRef>
+      <a:fontRef idx="minor"/>
+    </dgm:style>
+  </dgm:styleLbl>
+  <dgm:styleLbl name="dkBgShp">
+    <dgm:scene3d>
+      <a:camera prst="orthographicFront"/>
+      <a:lightRig rig="threePt" dir="t"/>
+    </dgm:scene3d>
+    <dgm:sp3d/>
+    <dgm:txPr/>
+    <dgm:style>
+      <a:lnRef idx="0">
+        <a:scrgbClr r="0" g="0" b="0"/>
+      </a:lnRef>
+      <a:fillRef idx="1">
+        <a:scrgbClr r="0" g="0" b="0"/>
+      </a:fillRef>
+      <a:effectRef idx="0">
+        <a:scrgbClr r="0" g="0" b="0"/>
+      </a:effectRef>
+      <a:fontRef idx="minor"/>
+    </dgm:style>
+  </dgm:styleLbl>
+  <dgm:styleLbl name="trBgShp">
+    <dgm:scene3d>
+      <a:camera prst="orthographicFront"/>
+      <a:lightRig rig="threePt" dir="t"/>
+    </dgm:scene3d>
+    <dgm:sp3d/>
+    <dgm:txPr/>
+    <dgm:style>
+      <a:lnRef idx="0">
+        <a:scrgbClr r="0" g="0" b="0"/>
+      </a:lnRef>
+      <a:fillRef idx="1">
+        <a:scrgbClr r="0" g="0" b="0"/>
+      </a:fillRef>
+      <a:effectRef idx="0">
+        <a:scrgbClr r="0" g="0" b="0"/>
+      </a:effectRef>
+      <a:fontRef idx="minor"/>
+    </dgm:style>
+  </dgm:styleLbl>
+  <dgm:styleLbl name="fgShp">
+    <dgm:scene3d>
+      <a:camera prst="orthographicFront"/>
+      <a:lightRig rig="threePt" dir="t"/>
+    </dgm:scene3d>
+    <dgm:sp3d/>
+    <dgm:txPr/>
+    <dgm:style>
+      <a:lnRef idx="2">
+        <a:scrgbClr r="0" g="0" b="0"/>
+      </a:lnRef>
+      <a:fillRef idx="1">
+        <a:scrgbClr r="0" g="0" b="0"/>
+      </a:fillRef>
+      <a:effectRef idx="0">
+        <a:scrgbClr r="0" g="0" b="0"/>
+      </a:effectRef>
+      <a:fontRef idx="minor"/>
+    </dgm:style>
+  </dgm:styleLbl>
+  <dgm:styleLbl name="revTx">
+    <dgm:scene3d>
+      <a:camera prst="orthographicFront"/>
+      <a:lightRig rig="threePt" dir="t"/>
+    </dgm:scene3d>
+    <dgm:sp3d/>
+    <dgm:txPr/>
+    <dgm:style>
+      <a:lnRef idx="0">
+        <a:scrgbClr r="0" g="0" b="0"/>
+      </a:lnRef>
+      <a:fillRef idx="0">
+        <a:scrgbClr r="0" g="0" b="0"/>
+      </a:fillRef>
+      <a:effectRef idx="0">
+        <a:scrgbClr r="0" g="0" b="0"/>
+      </a:effectRef>
+      <a:fontRef idx="minor"/>
+    </dgm:style>
+  </dgm:styleLbl>
+</dgm:styleDef>
+</file>
+
 <file path=ppt/diagrams/quickStyle2.xml><?xml version="1.0" encoding="utf-8"?>
 <dgm:styleDef xmlns:dgm="http://schemas.openxmlformats.org/drawingml/2006/diagram" xmlns:a="http://schemas.openxmlformats.org/drawingml/2006/main" uniqueId="urn:microsoft.com/office/officeart/2005/8/quickstyle/simple1">
   <dgm:title val=""/>
@@ -39085,7 +41764,7 @@
           <a:p>
             <a:fld id="{80680FBE-A8DF-4758-9AC4-3A9E1039168F}" type="datetimeFigureOut">
               <a:rPr lang="en-US" smtClean="0"/>
-              <a:t>1/4/2018</a:t>
+              <a:t>1/5/2018</a:t>
             </a:fld>
             <a:endParaRPr lang="en-US"/>
           </a:p>
@@ -39250,7 +41929,7 @@
           <a:p>
             <a:fld id="{EC13577B-6902-467D-A26C-08A0DD5E4E03}" type="datetimeFigureOut">
               <a:rPr lang="en-US" smtClean="0"/>
-              <a:t>1/4/2018</a:t>
+              <a:t>1/5/2018</a:t>
             </a:fld>
             <a:endParaRPr lang="en-US"/>
           </a:p>
@@ -39833,6 +42512,1935 @@
           <a:bodyPr/>
           <a:lstStyle/>
           <a:p>
+            <a:pPr marL="171450" indent="-171450">
+              <a:buFont typeface="Arial" panose="020B0604020202020204" pitchFamily="34" charset="0"/>
+              <a:buChar char="•"/>
+            </a:pPr>
+            <a:r>
+              <a:rPr lang="en-US" dirty="0" err="1" smtClean="0"/>
+              <a:t>Criar</a:t>
+            </a:r>
+            <a:r>
+              <a:rPr lang="en-US" dirty="0" smtClean="0"/>
+              <a:t> </a:t>
+            </a:r>
+            <a:r>
+              <a:rPr lang="en-US" dirty="0" err="1" smtClean="0"/>
+              <a:t>uma</a:t>
+            </a:r>
+            <a:r>
+              <a:rPr lang="en-US" dirty="0" smtClean="0"/>
+              <a:t> </a:t>
+            </a:r>
+            <a:r>
+              <a:rPr lang="en-US" dirty="0" err="1" smtClean="0"/>
+              <a:t>solução</a:t>
+            </a:r>
+            <a:r>
+              <a:rPr lang="en-US" dirty="0" smtClean="0"/>
+              <a:t> </a:t>
+            </a:r>
+            <a:r>
+              <a:rPr lang="en-US" dirty="0" err="1" smtClean="0"/>
+              <a:t>em</a:t>
+            </a:r>
+            <a:r>
+              <a:rPr lang="en-US" dirty="0" smtClean="0"/>
+              <a:t> </a:t>
+            </a:r>
+            <a:r>
+              <a:rPr lang="en-US" dirty="0" err="1" smtClean="0"/>
+              <a:t>branco</a:t>
+            </a:r>
+            <a:endParaRPr lang="en-US" dirty="0" smtClean="0"/>
+          </a:p>
+          <a:p>
+            <a:pPr marL="171450" indent="-171450">
+              <a:buFont typeface="Arial" panose="020B0604020202020204" pitchFamily="34" charset="0"/>
+              <a:buChar char="•"/>
+            </a:pPr>
+            <a:r>
+              <a:rPr lang="en-US" dirty="0" err="1" smtClean="0"/>
+              <a:t>Criar</a:t>
+            </a:r>
+            <a:r>
+              <a:rPr lang="en-US" dirty="0" smtClean="0"/>
+              <a:t> as pastas</a:t>
+            </a:r>
+          </a:p>
+          <a:p>
+            <a:pPr marL="171450" indent="-171450">
+              <a:buFont typeface="Arial" panose="020B0604020202020204" pitchFamily="34" charset="0"/>
+              <a:buChar char="•"/>
+            </a:pPr>
+            <a:r>
+              <a:rPr lang="en-US" dirty="0" err="1" smtClean="0"/>
+              <a:t>Criar</a:t>
+            </a:r>
+            <a:r>
+              <a:rPr lang="en-US" dirty="0" smtClean="0"/>
+              <a:t> </a:t>
+            </a:r>
+            <a:r>
+              <a:rPr lang="en-US" dirty="0" err="1" smtClean="0"/>
+              <a:t>os</a:t>
+            </a:r>
+            <a:r>
+              <a:rPr lang="en-US" dirty="0" smtClean="0"/>
+              <a:t> </a:t>
+            </a:r>
+            <a:r>
+              <a:rPr lang="en-US" dirty="0" err="1" smtClean="0"/>
+              <a:t>projetos</a:t>
+            </a:r>
+            <a:r>
+              <a:rPr lang="en-US" dirty="0" smtClean="0"/>
+              <a:t> de </a:t>
+            </a:r>
+            <a:r>
+              <a:rPr lang="en-US" dirty="0" err="1" smtClean="0"/>
+              <a:t>acordo</a:t>
+            </a:r>
+            <a:r>
+              <a:rPr lang="en-US" dirty="0" smtClean="0"/>
+              <a:t> com as pastas</a:t>
+            </a:r>
+          </a:p>
+          <a:p>
+            <a:pPr marL="171450" indent="-171450">
+              <a:buFont typeface="Arial" panose="020B0604020202020204" pitchFamily="34" charset="0"/>
+              <a:buChar char="•"/>
+            </a:pPr>
+            <a:r>
+              <a:rPr lang="en-US" dirty="0" err="1" smtClean="0"/>
+              <a:t>Criar</a:t>
+            </a:r>
+            <a:r>
+              <a:rPr lang="en-US" dirty="0" smtClean="0"/>
+              <a:t> a </a:t>
+            </a:r>
+            <a:r>
+              <a:rPr lang="en-US" dirty="0" err="1" smtClean="0"/>
+              <a:t>entidade</a:t>
+            </a:r>
+            <a:r>
+              <a:rPr lang="en-US" dirty="0" smtClean="0"/>
+              <a:t> </a:t>
+            </a:r>
+            <a:r>
+              <a:rPr lang="en-US" dirty="0" err="1" smtClean="0"/>
+              <a:t>cliente</a:t>
+            </a:r>
+            <a:r>
+              <a:rPr lang="en-US" dirty="0" smtClean="0"/>
+              <a:t> </a:t>
+            </a:r>
+            <a:r>
+              <a:rPr lang="en-US" dirty="0" err="1" smtClean="0"/>
+              <a:t>em</a:t>
+            </a:r>
+            <a:r>
+              <a:rPr lang="en-US" baseline="0" dirty="0" smtClean="0"/>
+              <a:t> Domain</a:t>
+            </a:r>
+            <a:endParaRPr lang="en-US" dirty="0" smtClean="0"/>
+          </a:p>
+          <a:p>
+            <a:pPr marL="171450" indent="-171450">
+              <a:buFont typeface="Arial" panose="020B0604020202020204" pitchFamily="34" charset="0"/>
+              <a:buChar char="•"/>
+            </a:pPr>
+            <a:r>
+              <a:rPr lang="en-US" dirty="0" smtClean="0"/>
+              <a:t>No </a:t>
+            </a:r>
+            <a:r>
+              <a:rPr lang="en-US" dirty="0" err="1" smtClean="0"/>
+              <a:t>projeto</a:t>
+            </a:r>
+            <a:r>
+              <a:rPr lang="en-US" dirty="0" smtClean="0"/>
+              <a:t> de Data </a:t>
+            </a:r>
+            <a:r>
+              <a:rPr lang="en-US" dirty="0" err="1" smtClean="0"/>
+              <a:t>instalar</a:t>
+            </a:r>
+            <a:r>
+              <a:rPr lang="en-US" dirty="0" smtClean="0"/>
+              <a:t> o</a:t>
+            </a:r>
+            <a:r>
+              <a:rPr lang="en-US" baseline="0" dirty="0" smtClean="0"/>
+              <a:t> entity framework</a:t>
+            </a:r>
+          </a:p>
+          <a:p>
+            <a:pPr marL="171450" indent="-171450">
+              <a:buFont typeface="Arial" panose="020B0604020202020204" pitchFamily="34" charset="0"/>
+              <a:buChar char="•"/>
+            </a:pPr>
+            <a:r>
+              <a:rPr lang="en-US" baseline="0" dirty="0" smtClean="0"/>
+              <a:t>No </a:t>
+            </a:r>
+            <a:r>
+              <a:rPr lang="en-US" baseline="0" dirty="0" err="1" smtClean="0"/>
+              <a:t>projeto</a:t>
+            </a:r>
+            <a:r>
+              <a:rPr lang="en-US" baseline="0" dirty="0" smtClean="0"/>
+              <a:t> de MVC </a:t>
+            </a:r>
+            <a:r>
+              <a:rPr lang="en-US" baseline="0" dirty="0" err="1" smtClean="0"/>
+              <a:t>adicionar</a:t>
+            </a:r>
+            <a:r>
+              <a:rPr lang="en-US" baseline="0" dirty="0" smtClean="0"/>
+              <a:t> a connection string</a:t>
+            </a:r>
+          </a:p>
+          <a:p>
+            <a:pPr marL="171450" indent="-171450">
+              <a:buFont typeface="Arial" panose="020B0604020202020204" pitchFamily="34" charset="0"/>
+              <a:buChar char="•"/>
+            </a:pPr>
+            <a:r>
+              <a:rPr lang="en-US" baseline="0" dirty="0" smtClean="0"/>
+              <a:t>No </a:t>
+            </a:r>
+            <a:r>
+              <a:rPr lang="en-US" baseline="0" dirty="0" err="1" smtClean="0"/>
+              <a:t>projeto</a:t>
+            </a:r>
+            <a:r>
+              <a:rPr lang="en-US" baseline="0" dirty="0" smtClean="0"/>
+              <a:t> de data </a:t>
+            </a:r>
+            <a:r>
+              <a:rPr lang="en-US" baseline="0" dirty="0" err="1" smtClean="0"/>
+              <a:t>habilitar</a:t>
+            </a:r>
+            <a:r>
+              <a:rPr lang="en-US" baseline="0" dirty="0" smtClean="0"/>
+              <a:t> o migrations</a:t>
+            </a:r>
+          </a:p>
+          <a:p>
+            <a:pPr marL="171450" indent="-171450">
+              <a:buFont typeface="Arial" panose="020B0604020202020204" pitchFamily="34" charset="0"/>
+              <a:buChar char="•"/>
+            </a:pPr>
+            <a:r>
+              <a:rPr lang="en-US" baseline="0" dirty="0" err="1" smtClean="0"/>
+              <a:t>Executar</a:t>
+            </a:r>
+            <a:r>
+              <a:rPr lang="en-US" baseline="0" dirty="0" smtClean="0"/>
+              <a:t> o commando update-database –verbose</a:t>
+            </a:r>
+          </a:p>
+          <a:p>
+            <a:pPr marL="171450" indent="-171450">
+              <a:buFont typeface="Arial" panose="020B0604020202020204" pitchFamily="34" charset="0"/>
+              <a:buChar char="•"/>
+            </a:pPr>
+            <a:r>
+              <a:rPr lang="en-US" baseline="0" dirty="0" err="1" smtClean="0"/>
+              <a:t>Criar</a:t>
+            </a:r>
+            <a:r>
+              <a:rPr lang="en-US" baseline="0" dirty="0" smtClean="0"/>
+              <a:t> a </a:t>
+            </a:r>
+            <a:r>
+              <a:rPr lang="en-US" baseline="0" dirty="0" err="1" smtClean="0"/>
+              <a:t>classe</a:t>
+            </a:r>
+            <a:r>
+              <a:rPr lang="en-US" baseline="0" dirty="0" smtClean="0"/>
+              <a:t> </a:t>
+            </a:r>
+            <a:r>
+              <a:rPr lang="en-US" baseline="0" dirty="0" err="1" smtClean="0"/>
+              <a:t>ClienteConfigurations</a:t>
+            </a:r>
+            <a:endParaRPr lang="en-US" baseline="0" dirty="0" smtClean="0"/>
+          </a:p>
+          <a:p>
+            <a:pPr marL="171450" indent="-171450">
+              <a:buFont typeface="Arial" panose="020B0604020202020204" pitchFamily="34" charset="0"/>
+              <a:buChar char="•"/>
+            </a:pPr>
+            <a:r>
+              <a:rPr lang="en-US" baseline="0" dirty="0" err="1" smtClean="0"/>
+              <a:t>Adicionar</a:t>
+            </a:r>
+            <a:r>
+              <a:rPr lang="en-US" baseline="0" dirty="0" smtClean="0"/>
+              <a:t> a nova </a:t>
+            </a:r>
+            <a:r>
+              <a:rPr lang="en-US" baseline="0" dirty="0" err="1" smtClean="0"/>
+              <a:t>configuracao</a:t>
+            </a:r>
+            <a:r>
+              <a:rPr lang="en-US" baseline="0" dirty="0" smtClean="0"/>
+              <a:t> no </a:t>
+            </a:r>
+            <a:r>
+              <a:rPr lang="en-US" baseline="0" dirty="0" err="1" smtClean="0"/>
+              <a:t>metodo</a:t>
+            </a:r>
+            <a:r>
+              <a:rPr lang="en-US" baseline="0" dirty="0" smtClean="0"/>
+              <a:t> </a:t>
+            </a:r>
+            <a:r>
+              <a:rPr lang="en-US" baseline="0" dirty="0" err="1" smtClean="0"/>
+              <a:t>OnModelCreating</a:t>
+            </a:r>
+            <a:endParaRPr lang="en-US" baseline="0" dirty="0" smtClean="0"/>
+          </a:p>
+          <a:p>
+            <a:pPr marL="171450" indent="-171450">
+              <a:buFont typeface="Arial" panose="020B0604020202020204" pitchFamily="34" charset="0"/>
+              <a:buChar char="•"/>
+            </a:pPr>
+            <a:r>
+              <a:rPr lang="en-US" baseline="0" dirty="0" err="1" smtClean="0"/>
+              <a:t>Apagar</a:t>
+            </a:r>
+            <a:r>
+              <a:rPr lang="en-US" baseline="0" dirty="0" smtClean="0"/>
+              <a:t> o banco de dados</a:t>
+            </a:r>
+          </a:p>
+          <a:p>
+            <a:pPr marL="171450" marR="0" indent="-171450" algn="l" defTabSz="914400" rtl="0" eaLnBrk="1" fontAlgn="auto" latinLnBrk="0" hangingPunct="1">
+              <a:lnSpc>
+                <a:spcPct val="100000"/>
+              </a:lnSpc>
+              <a:spcBef>
+                <a:spcPts val="0"/>
+              </a:spcBef>
+              <a:spcAft>
+                <a:spcPts val="0"/>
+              </a:spcAft>
+              <a:buClrTx/>
+              <a:buSzTx/>
+              <a:buFont typeface="Arial" panose="020B0604020202020204" pitchFamily="34" charset="0"/>
+              <a:buChar char="•"/>
+              <a:tabLst/>
+              <a:defRPr/>
+            </a:pPr>
+            <a:r>
+              <a:rPr lang="en-US" baseline="0" dirty="0" err="1" smtClean="0"/>
+              <a:t>Executar</a:t>
+            </a:r>
+            <a:r>
+              <a:rPr lang="en-US" baseline="0" dirty="0" smtClean="0"/>
+              <a:t> </a:t>
+            </a:r>
+            <a:r>
+              <a:rPr lang="en-US" baseline="0" dirty="0" err="1" smtClean="0"/>
+              <a:t>novamento</a:t>
+            </a:r>
+            <a:r>
+              <a:rPr lang="en-US" baseline="0" dirty="0" smtClean="0"/>
+              <a:t> o commando update-database –verbose</a:t>
+            </a:r>
+          </a:p>
+          <a:p>
+            <a:pPr marL="171450" marR="0" indent="-171450" algn="l" defTabSz="914400" rtl="0" eaLnBrk="1" fontAlgn="auto" latinLnBrk="0" hangingPunct="1">
+              <a:lnSpc>
+                <a:spcPct val="100000"/>
+              </a:lnSpc>
+              <a:spcBef>
+                <a:spcPts val="0"/>
+              </a:spcBef>
+              <a:spcAft>
+                <a:spcPts val="0"/>
+              </a:spcAft>
+              <a:buClrTx/>
+              <a:buSzTx/>
+              <a:buFont typeface="Arial" panose="020B0604020202020204" pitchFamily="34" charset="0"/>
+              <a:buChar char="•"/>
+              <a:tabLst/>
+              <a:defRPr/>
+            </a:pPr>
+            <a:r>
+              <a:rPr lang="en-US" baseline="0" dirty="0" err="1" smtClean="0"/>
+              <a:t>Criar</a:t>
+            </a:r>
+            <a:r>
+              <a:rPr lang="en-US" baseline="0" dirty="0" smtClean="0"/>
+              <a:t> a </a:t>
+            </a:r>
+            <a:r>
+              <a:rPr lang="en-US" baseline="0" dirty="0" err="1" smtClean="0"/>
+              <a:t>entidade</a:t>
+            </a:r>
+            <a:r>
+              <a:rPr lang="en-US" baseline="0" dirty="0" smtClean="0"/>
+              <a:t> de </a:t>
+            </a:r>
+            <a:r>
+              <a:rPr lang="en-US" baseline="0" dirty="0" err="1" smtClean="0"/>
+              <a:t>Produto</a:t>
+            </a:r>
+            <a:endParaRPr lang="en-US" baseline="0" dirty="0" smtClean="0"/>
+          </a:p>
+          <a:p>
+            <a:pPr marL="171450" marR="0" indent="-171450" algn="l" defTabSz="914400" rtl="0" eaLnBrk="1" fontAlgn="auto" latinLnBrk="0" hangingPunct="1">
+              <a:lnSpc>
+                <a:spcPct val="100000"/>
+              </a:lnSpc>
+              <a:spcBef>
+                <a:spcPts val="0"/>
+              </a:spcBef>
+              <a:spcAft>
+                <a:spcPts val="0"/>
+              </a:spcAft>
+              <a:buClrTx/>
+              <a:buSzTx/>
+              <a:buFont typeface="Arial" panose="020B0604020202020204" pitchFamily="34" charset="0"/>
+              <a:buChar char="•"/>
+              <a:tabLst/>
+              <a:defRPr/>
+            </a:pPr>
+            <a:r>
+              <a:rPr lang="en-US" baseline="0" dirty="0" err="1" smtClean="0"/>
+              <a:t>Vá</a:t>
+            </a:r>
+            <a:r>
+              <a:rPr lang="en-US" baseline="0" dirty="0" smtClean="0"/>
+              <a:t> </a:t>
+            </a:r>
+            <a:r>
+              <a:rPr lang="en-US" baseline="0" dirty="0" err="1" smtClean="0"/>
+              <a:t>na</a:t>
+            </a:r>
+            <a:r>
+              <a:rPr lang="en-US" baseline="0" dirty="0" smtClean="0"/>
+              <a:t> </a:t>
+            </a:r>
+            <a:r>
+              <a:rPr lang="en-US" baseline="0" dirty="0" err="1" smtClean="0"/>
+              <a:t>classe</a:t>
+            </a:r>
+            <a:r>
+              <a:rPr lang="en-US" baseline="0" dirty="0" smtClean="0"/>
+              <a:t> de </a:t>
+            </a:r>
+            <a:r>
+              <a:rPr lang="en-US" baseline="0" dirty="0" err="1" smtClean="0"/>
+              <a:t>Cliente</a:t>
+            </a:r>
+            <a:r>
+              <a:rPr lang="en-US" baseline="0" dirty="0" smtClean="0"/>
+              <a:t> e </a:t>
+            </a:r>
+            <a:r>
+              <a:rPr lang="en-US" baseline="0" dirty="0" err="1" smtClean="0"/>
+              <a:t>adicione</a:t>
+            </a:r>
+            <a:r>
+              <a:rPr lang="en-US" baseline="0" dirty="0" smtClean="0"/>
+              <a:t> o </a:t>
+            </a:r>
+            <a:r>
+              <a:rPr lang="en-US" baseline="0" dirty="0" err="1" smtClean="0"/>
+              <a:t>relacionamento</a:t>
+            </a:r>
+            <a:r>
+              <a:rPr lang="en-US" baseline="0" dirty="0" smtClean="0"/>
+              <a:t> com </a:t>
+            </a:r>
+            <a:r>
+              <a:rPr lang="en-US" baseline="0" dirty="0" err="1" smtClean="0"/>
+              <a:t>produto</a:t>
+            </a:r>
+            <a:endParaRPr lang="en-US" baseline="0" dirty="0" smtClean="0"/>
+          </a:p>
+          <a:p>
+            <a:pPr marL="171450" marR="0" indent="-171450" algn="l" defTabSz="914400" rtl="0" eaLnBrk="1" fontAlgn="auto" latinLnBrk="0" hangingPunct="1">
+              <a:lnSpc>
+                <a:spcPct val="100000"/>
+              </a:lnSpc>
+              <a:spcBef>
+                <a:spcPts val="0"/>
+              </a:spcBef>
+              <a:spcAft>
+                <a:spcPts val="0"/>
+              </a:spcAft>
+              <a:buClrTx/>
+              <a:buSzTx/>
+              <a:buFont typeface="Arial" panose="020B0604020202020204" pitchFamily="34" charset="0"/>
+              <a:buChar char="•"/>
+              <a:tabLst/>
+              <a:defRPr/>
+            </a:pPr>
+            <a:r>
+              <a:rPr lang="en-US" baseline="0" dirty="0" err="1" smtClean="0"/>
+              <a:t>Criar</a:t>
+            </a:r>
+            <a:r>
+              <a:rPr lang="en-US" baseline="0" dirty="0" smtClean="0"/>
+              <a:t> a </a:t>
+            </a:r>
+            <a:r>
+              <a:rPr lang="en-US" baseline="0" dirty="0" err="1" smtClean="0"/>
+              <a:t>classe</a:t>
+            </a:r>
+            <a:r>
+              <a:rPr lang="en-US" baseline="0" dirty="0" smtClean="0"/>
+              <a:t> de </a:t>
+            </a:r>
+            <a:r>
+              <a:rPr lang="en-US" baseline="0" dirty="0" err="1" smtClean="0"/>
+              <a:t>configuração</a:t>
+            </a:r>
+            <a:r>
+              <a:rPr lang="en-US" baseline="0" dirty="0" smtClean="0"/>
+              <a:t> do </a:t>
+            </a:r>
+            <a:r>
+              <a:rPr lang="en-US" baseline="0" dirty="0" err="1" smtClean="0"/>
+              <a:t>Produto</a:t>
+            </a:r>
+            <a:endParaRPr lang="en-US" baseline="0" dirty="0" smtClean="0"/>
+          </a:p>
+          <a:p>
+            <a:pPr marL="171450" marR="0" indent="-171450" algn="l" defTabSz="914400" rtl="0" eaLnBrk="1" fontAlgn="auto" latinLnBrk="0" hangingPunct="1">
+              <a:lnSpc>
+                <a:spcPct val="100000"/>
+              </a:lnSpc>
+              <a:spcBef>
+                <a:spcPts val="0"/>
+              </a:spcBef>
+              <a:spcAft>
+                <a:spcPts val="0"/>
+              </a:spcAft>
+              <a:buClrTx/>
+              <a:buSzTx/>
+              <a:buFont typeface="Arial" panose="020B0604020202020204" pitchFamily="34" charset="0"/>
+              <a:buChar char="•"/>
+              <a:tabLst/>
+              <a:defRPr/>
+            </a:pPr>
+            <a:r>
+              <a:rPr lang="en-US" baseline="0" dirty="0" smtClean="0"/>
+              <a:t>No context </a:t>
+            </a:r>
+            <a:r>
+              <a:rPr lang="en-US" baseline="0" dirty="0" err="1" smtClean="0"/>
+              <a:t>adicione</a:t>
+            </a:r>
+            <a:r>
+              <a:rPr lang="en-US" baseline="0" dirty="0" smtClean="0"/>
+              <a:t> a </a:t>
+            </a:r>
+            <a:r>
+              <a:rPr lang="en-US" baseline="0" dirty="0" err="1" smtClean="0"/>
+              <a:t>instancia</a:t>
+            </a:r>
+            <a:r>
+              <a:rPr lang="en-US" baseline="0" dirty="0" smtClean="0"/>
+              <a:t> de </a:t>
+            </a:r>
+            <a:r>
+              <a:rPr lang="en-US" baseline="0" dirty="0" err="1" smtClean="0"/>
+              <a:t>configuração</a:t>
+            </a:r>
+            <a:endParaRPr lang="en-US" baseline="0" dirty="0" smtClean="0"/>
+          </a:p>
+          <a:p>
+            <a:pPr marL="171450" marR="0" indent="-171450" algn="l" defTabSz="914400" rtl="0" eaLnBrk="1" fontAlgn="auto" latinLnBrk="0" hangingPunct="1">
+              <a:lnSpc>
+                <a:spcPct val="100000"/>
+              </a:lnSpc>
+              <a:spcBef>
+                <a:spcPts val="0"/>
+              </a:spcBef>
+              <a:spcAft>
+                <a:spcPts val="0"/>
+              </a:spcAft>
+              <a:buClrTx/>
+              <a:buSzTx/>
+              <a:buFont typeface="Arial" panose="020B0604020202020204" pitchFamily="34" charset="0"/>
+              <a:buChar char="•"/>
+              <a:tabLst/>
+              <a:defRPr/>
+            </a:pPr>
+            <a:r>
+              <a:rPr lang="en-US" baseline="0" dirty="0" err="1" smtClean="0"/>
+              <a:t>Imclua</a:t>
+            </a:r>
+            <a:r>
+              <a:rPr lang="en-US" baseline="0" dirty="0" smtClean="0"/>
+              <a:t> o </a:t>
+            </a:r>
+            <a:r>
+              <a:rPr lang="en-US" baseline="0" dirty="0" err="1" smtClean="0"/>
+              <a:t>DBSet</a:t>
+            </a:r>
+            <a:r>
+              <a:rPr lang="en-US" baseline="0" dirty="0" smtClean="0"/>
+              <a:t> de </a:t>
+            </a:r>
+            <a:r>
+              <a:rPr lang="en-US" baseline="0" dirty="0" err="1" smtClean="0"/>
+              <a:t>Produto</a:t>
+            </a:r>
+            <a:endParaRPr lang="en-US" baseline="0" dirty="0" smtClean="0"/>
+          </a:p>
+          <a:p>
+            <a:pPr marL="171450" marR="0" indent="-171450" algn="l" defTabSz="914400" rtl="0" eaLnBrk="1" fontAlgn="auto" latinLnBrk="0" hangingPunct="1">
+              <a:lnSpc>
+                <a:spcPct val="100000"/>
+              </a:lnSpc>
+              <a:spcBef>
+                <a:spcPts val="0"/>
+              </a:spcBef>
+              <a:spcAft>
+                <a:spcPts val="0"/>
+              </a:spcAft>
+              <a:buClrTx/>
+              <a:buSzTx/>
+              <a:buFont typeface="Arial" panose="020B0604020202020204" pitchFamily="34" charset="0"/>
+              <a:buChar char="•"/>
+              <a:tabLst/>
+              <a:defRPr/>
+            </a:pPr>
+            <a:r>
+              <a:rPr lang="en-US" baseline="0" dirty="0" smtClean="0"/>
+              <a:t>update-database –verbose –force</a:t>
+            </a:r>
+          </a:p>
+          <a:p>
+            <a:pPr marL="171450" marR="0" indent="-171450" algn="l" defTabSz="914400" rtl="0" eaLnBrk="1" fontAlgn="auto" latinLnBrk="0" hangingPunct="1">
+              <a:lnSpc>
+                <a:spcPct val="100000"/>
+              </a:lnSpc>
+              <a:spcBef>
+                <a:spcPts val="0"/>
+              </a:spcBef>
+              <a:spcAft>
+                <a:spcPts val="0"/>
+              </a:spcAft>
+              <a:buClrTx/>
+              <a:buSzTx/>
+              <a:buFont typeface="Arial" panose="020B0604020202020204" pitchFamily="34" charset="0"/>
+              <a:buChar char="•"/>
+              <a:tabLst/>
+              <a:defRPr/>
+            </a:pPr>
+            <a:r>
+              <a:rPr lang="en-US" baseline="0" dirty="0" smtClean="0"/>
+              <a:t>Na </a:t>
+            </a:r>
+            <a:r>
+              <a:rPr lang="en-US" baseline="0" dirty="0" err="1" smtClean="0"/>
+              <a:t>camada</a:t>
+            </a:r>
+            <a:r>
+              <a:rPr lang="en-US" baseline="0" dirty="0" smtClean="0"/>
+              <a:t> de </a:t>
+            </a:r>
+            <a:r>
+              <a:rPr lang="en-US" baseline="0" dirty="0" err="1" smtClean="0"/>
+              <a:t>dominio</a:t>
+            </a:r>
+            <a:r>
+              <a:rPr lang="en-US" baseline="0" dirty="0" smtClean="0"/>
+              <a:t> </a:t>
+            </a:r>
+            <a:r>
+              <a:rPr lang="en-US" baseline="0" dirty="0" err="1" smtClean="0"/>
+              <a:t>inclua</a:t>
+            </a:r>
+            <a:r>
+              <a:rPr lang="en-US" baseline="0" dirty="0" smtClean="0"/>
+              <a:t> as classes de </a:t>
+            </a:r>
+            <a:r>
+              <a:rPr lang="en-US" baseline="0" dirty="0" err="1" smtClean="0"/>
+              <a:t>repositorio</a:t>
+            </a:r>
+            <a:r>
+              <a:rPr lang="en-US" baseline="0" dirty="0" smtClean="0"/>
+              <a:t> (</a:t>
+            </a:r>
+            <a:r>
+              <a:rPr lang="en-US" baseline="0" dirty="0" err="1" smtClean="0"/>
+              <a:t>Crie</a:t>
+            </a:r>
+            <a:r>
+              <a:rPr lang="en-US" baseline="0" dirty="0" smtClean="0"/>
+              <a:t> a interface </a:t>
+            </a:r>
+            <a:r>
+              <a:rPr lang="en-US" baseline="0" dirty="0" err="1" smtClean="0"/>
+              <a:t>irepository</a:t>
+            </a:r>
+            <a:r>
+              <a:rPr lang="en-US" baseline="0" dirty="0" smtClean="0"/>
+              <a:t> base)</a:t>
+            </a:r>
+          </a:p>
+          <a:p>
+            <a:pPr marL="171450" marR="0" indent="-171450" algn="l" defTabSz="914400" rtl="0" eaLnBrk="1" fontAlgn="auto" latinLnBrk="0" hangingPunct="1">
+              <a:lnSpc>
+                <a:spcPct val="100000"/>
+              </a:lnSpc>
+              <a:spcBef>
+                <a:spcPts val="0"/>
+              </a:spcBef>
+              <a:spcAft>
+                <a:spcPts val="0"/>
+              </a:spcAft>
+              <a:buClrTx/>
+              <a:buSzTx/>
+              <a:buFont typeface="Arial" panose="020B0604020202020204" pitchFamily="34" charset="0"/>
+              <a:buChar char="•"/>
+              <a:tabLst/>
+              <a:defRPr/>
+            </a:pPr>
+            <a:r>
+              <a:rPr lang="en-US" baseline="0" dirty="0" err="1" smtClean="0"/>
+              <a:t>Criar</a:t>
+            </a:r>
+            <a:r>
+              <a:rPr lang="en-US" baseline="0" dirty="0" smtClean="0"/>
+              <a:t> a interface de </a:t>
+            </a:r>
+            <a:r>
+              <a:rPr lang="en-US" baseline="0" dirty="0" err="1" smtClean="0"/>
+              <a:t>repositorio</a:t>
+            </a:r>
+            <a:r>
+              <a:rPr lang="en-US" baseline="0" dirty="0" smtClean="0"/>
+              <a:t> do </a:t>
+            </a:r>
+            <a:r>
+              <a:rPr lang="en-US" baseline="0" dirty="0" err="1" smtClean="0"/>
+              <a:t>cliente</a:t>
+            </a:r>
+            <a:endParaRPr lang="en-US" baseline="0" dirty="0" smtClean="0"/>
+          </a:p>
+          <a:p>
+            <a:pPr marL="171450" marR="0" indent="-171450" algn="l" defTabSz="914400" rtl="0" eaLnBrk="1" fontAlgn="auto" latinLnBrk="0" hangingPunct="1">
+              <a:lnSpc>
+                <a:spcPct val="100000"/>
+              </a:lnSpc>
+              <a:spcBef>
+                <a:spcPts val="0"/>
+              </a:spcBef>
+              <a:spcAft>
+                <a:spcPts val="0"/>
+              </a:spcAft>
+              <a:buClrTx/>
+              <a:buSzTx/>
+              <a:buFont typeface="Arial" panose="020B0604020202020204" pitchFamily="34" charset="0"/>
+              <a:buChar char="•"/>
+              <a:tabLst/>
+              <a:defRPr/>
+            </a:pPr>
+            <a:r>
+              <a:rPr lang="en-US" baseline="0" dirty="0" smtClean="0"/>
+              <a:t>Na </a:t>
+            </a:r>
+            <a:r>
+              <a:rPr lang="en-US" baseline="0" dirty="0" err="1" smtClean="0"/>
+              <a:t>camada</a:t>
+            </a:r>
+            <a:r>
+              <a:rPr lang="en-US" baseline="0" dirty="0" smtClean="0"/>
+              <a:t> de infra </a:t>
+            </a:r>
+            <a:r>
+              <a:rPr lang="en-US" baseline="0" dirty="0" err="1" smtClean="0"/>
+              <a:t>crie</a:t>
+            </a:r>
+            <a:r>
+              <a:rPr lang="en-US" baseline="0" dirty="0" smtClean="0"/>
+              <a:t> a </a:t>
+            </a:r>
+            <a:r>
+              <a:rPr lang="en-US" baseline="0" dirty="0" err="1" smtClean="0"/>
+              <a:t>classe</a:t>
+            </a:r>
+            <a:r>
+              <a:rPr lang="en-US" baseline="0" dirty="0" smtClean="0"/>
+              <a:t> repository base (</a:t>
+            </a:r>
+            <a:r>
+              <a:rPr lang="en-US" baseline="0" dirty="0" err="1" smtClean="0"/>
+              <a:t>será</a:t>
+            </a:r>
+            <a:r>
+              <a:rPr lang="en-US" baseline="0" dirty="0" smtClean="0"/>
+              <a:t> que </a:t>
+            </a:r>
+            <a:r>
+              <a:rPr lang="en-US" baseline="0" dirty="0" err="1" smtClean="0"/>
+              <a:t>irá</a:t>
+            </a:r>
+            <a:r>
+              <a:rPr lang="en-US" baseline="0" dirty="0" smtClean="0"/>
+              <a:t> </a:t>
+            </a:r>
+            <a:r>
+              <a:rPr lang="en-US" baseline="0" dirty="0" err="1" smtClean="0"/>
+              <a:t>implementar</a:t>
+            </a:r>
+            <a:r>
+              <a:rPr lang="en-US" baseline="0" dirty="0" smtClean="0"/>
+              <a:t> </a:t>
+            </a:r>
+            <a:r>
+              <a:rPr lang="en-US" baseline="0" dirty="0" err="1" smtClean="0"/>
+              <a:t>Irepository</a:t>
+            </a:r>
+            <a:r>
+              <a:rPr lang="en-US" baseline="0" dirty="0" smtClean="0"/>
+              <a:t> Base)</a:t>
+            </a:r>
+          </a:p>
+          <a:p>
+            <a:pPr marL="171450" marR="0" indent="-171450" algn="l" defTabSz="914400" rtl="0" eaLnBrk="1" fontAlgn="auto" latinLnBrk="0" hangingPunct="1">
+              <a:lnSpc>
+                <a:spcPct val="100000"/>
+              </a:lnSpc>
+              <a:spcBef>
+                <a:spcPts val="0"/>
+              </a:spcBef>
+              <a:spcAft>
+                <a:spcPts val="0"/>
+              </a:spcAft>
+              <a:buClrTx/>
+              <a:buSzTx/>
+              <a:buFont typeface="Arial" panose="020B0604020202020204" pitchFamily="34" charset="0"/>
+              <a:buChar char="•"/>
+              <a:tabLst/>
+              <a:defRPr/>
+            </a:pPr>
+            <a:r>
+              <a:rPr lang="en-US" baseline="0" dirty="0" err="1" smtClean="0"/>
+              <a:t>Criar</a:t>
+            </a:r>
+            <a:r>
+              <a:rPr lang="en-US" baseline="0" dirty="0" smtClean="0"/>
+              <a:t> a </a:t>
+            </a:r>
+            <a:r>
+              <a:rPr lang="en-US" baseline="0" dirty="0" err="1" smtClean="0"/>
+              <a:t>classe</a:t>
+            </a:r>
+            <a:r>
+              <a:rPr lang="en-US" baseline="0" dirty="0" smtClean="0"/>
+              <a:t> </a:t>
+            </a:r>
+            <a:r>
+              <a:rPr lang="en-US" baseline="0" dirty="0" err="1" smtClean="0"/>
+              <a:t>ClienteRepository</a:t>
+            </a:r>
+            <a:endParaRPr lang="en-US" baseline="0" dirty="0" smtClean="0"/>
+          </a:p>
+          <a:p>
+            <a:pPr marL="171450" marR="0" indent="-171450" algn="l" defTabSz="914400" rtl="0" eaLnBrk="1" fontAlgn="auto" latinLnBrk="0" hangingPunct="1">
+              <a:lnSpc>
+                <a:spcPct val="100000"/>
+              </a:lnSpc>
+              <a:spcBef>
+                <a:spcPts val="0"/>
+              </a:spcBef>
+              <a:spcAft>
+                <a:spcPts val="0"/>
+              </a:spcAft>
+              <a:buClrTx/>
+              <a:buSzTx/>
+              <a:buFont typeface="Arial" panose="020B0604020202020204" pitchFamily="34" charset="0"/>
+              <a:buChar char="•"/>
+              <a:tabLst/>
+              <a:defRPr/>
+            </a:pPr>
+            <a:r>
+              <a:rPr lang="en-US" baseline="0" dirty="0" smtClean="0"/>
+              <a:t>No </a:t>
+            </a:r>
+            <a:r>
+              <a:rPr lang="en-US" baseline="0" dirty="0" err="1" smtClean="0"/>
+              <a:t>dominio</a:t>
+            </a:r>
+            <a:r>
+              <a:rPr lang="en-US" baseline="0" dirty="0" smtClean="0"/>
+              <a:t> </a:t>
+            </a:r>
+            <a:r>
+              <a:rPr lang="en-US" baseline="0" dirty="0" err="1" smtClean="0"/>
+              <a:t>crie</a:t>
+            </a:r>
+            <a:r>
+              <a:rPr lang="en-US" baseline="0" dirty="0" smtClean="0"/>
+              <a:t> a </a:t>
+            </a:r>
+            <a:r>
+              <a:rPr lang="en-US" baseline="0" dirty="0" err="1" smtClean="0"/>
+              <a:t>classe</a:t>
+            </a:r>
+            <a:r>
+              <a:rPr lang="en-US" baseline="0" dirty="0" smtClean="0"/>
+              <a:t> de </a:t>
+            </a:r>
+            <a:r>
+              <a:rPr lang="en-US" baseline="0" dirty="0" err="1" smtClean="0"/>
+              <a:t>IProdutoRepositary</a:t>
+            </a:r>
+            <a:endParaRPr lang="en-US" baseline="0" dirty="0" smtClean="0"/>
+          </a:p>
+          <a:p>
+            <a:pPr marL="171450" marR="0" indent="-171450" algn="l" defTabSz="914400" rtl="0" eaLnBrk="1" fontAlgn="auto" latinLnBrk="0" hangingPunct="1">
+              <a:lnSpc>
+                <a:spcPct val="100000"/>
+              </a:lnSpc>
+              <a:spcBef>
+                <a:spcPts val="0"/>
+              </a:spcBef>
+              <a:spcAft>
+                <a:spcPts val="0"/>
+              </a:spcAft>
+              <a:buClrTx/>
+              <a:buSzTx/>
+              <a:buFont typeface="Arial" panose="020B0604020202020204" pitchFamily="34" charset="0"/>
+              <a:buChar char="•"/>
+              <a:tabLst/>
+              <a:defRPr/>
+            </a:pPr>
+            <a:r>
+              <a:rPr lang="en-US" baseline="0" dirty="0" smtClean="0"/>
+              <a:t>Na Data </a:t>
+            </a:r>
+            <a:r>
+              <a:rPr lang="en-US" baseline="0" dirty="0" err="1" smtClean="0"/>
+              <a:t>crie</a:t>
+            </a:r>
+            <a:r>
+              <a:rPr lang="en-US" baseline="0" dirty="0" smtClean="0"/>
+              <a:t> a </a:t>
+            </a:r>
+            <a:r>
+              <a:rPr lang="en-US" baseline="0" dirty="0" err="1" smtClean="0"/>
+              <a:t>classe</a:t>
+            </a:r>
+            <a:r>
+              <a:rPr lang="en-US" baseline="0" dirty="0" smtClean="0"/>
+              <a:t> </a:t>
+            </a:r>
+            <a:r>
+              <a:rPr lang="en-US" baseline="0" dirty="0" err="1" smtClean="0"/>
+              <a:t>ProdutoRepository</a:t>
+            </a:r>
+            <a:endParaRPr lang="en-US" baseline="0" dirty="0" smtClean="0"/>
+          </a:p>
+          <a:p>
+            <a:pPr marL="171450" marR="0" indent="-171450" algn="l" defTabSz="914400" rtl="0" eaLnBrk="1" fontAlgn="auto" latinLnBrk="0" hangingPunct="1">
+              <a:lnSpc>
+                <a:spcPct val="100000"/>
+              </a:lnSpc>
+              <a:spcBef>
+                <a:spcPts val="0"/>
+              </a:spcBef>
+              <a:spcAft>
+                <a:spcPts val="0"/>
+              </a:spcAft>
+              <a:buClrTx/>
+              <a:buSzTx/>
+              <a:buFont typeface="Arial" panose="020B0604020202020204" pitchFamily="34" charset="0"/>
+              <a:buChar char="•"/>
+              <a:tabLst/>
+              <a:defRPr/>
+            </a:pPr>
+            <a:r>
+              <a:rPr lang="en-US" baseline="0" dirty="0" smtClean="0"/>
+              <a:t>No </a:t>
+            </a:r>
+            <a:r>
+              <a:rPr lang="en-US" baseline="0" dirty="0" err="1" smtClean="0"/>
+              <a:t>projeto</a:t>
+            </a:r>
+            <a:r>
+              <a:rPr lang="en-US" baseline="0" dirty="0" smtClean="0"/>
+              <a:t> MVC </a:t>
+            </a:r>
+            <a:r>
+              <a:rPr lang="en-US" baseline="0" dirty="0" err="1" smtClean="0"/>
+              <a:t>crie</a:t>
+            </a:r>
+            <a:r>
+              <a:rPr lang="en-US" baseline="0" dirty="0" smtClean="0"/>
+              <a:t> a </a:t>
+            </a:r>
+            <a:r>
+              <a:rPr lang="en-US" baseline="0" dirty="0" err="1" smtClean="0"/>
+              <a:t>ViewModel</a:t>
+            </a:r>
+            <a:r>
+              <a:rPr lang="en-US" baseline="0" dirty="0" smtClean="0"/>
+              <a:t> de </a:t>
+            </a:r>
+            <a:r>
+              <a:rPr lang="en-US" baseline="0" dirty="0" err="1" smtClean="0"/>
+              <a:t>Cliente</a:t>
+            </a:r>
+            <a:r>
+              <a:rPr lang="en-US" baseline="0" dirty="0" smtClean="0"/>
+              <a:t>.</a:t>
+            </a:r>
+          </a:p>
+          <a:p>
+            <a:pPr marL="171450" marR="0" indent="-171450" algn="l" defTabSz="914400" rtl="0" eaLnBrk="1" fontAlgn="auto" latinLnBrk="0" hangingPunct="1">
+              <a:lnSpc>
+                <a:spcPct val="100000"/>
+              </a:lnSpc>
+              <a:spcBef>
+                <a:spcPts val="0"/>
+              </a:spcBef>
+              <a:spcAft>
+                <a:spcPts val="0"/>
+              </a:spcAft>
+              <a:buClrTx/>
+              <a:buSzTx/>
+              <a:buFont typeface="Arial" panose="020B0604020202020204" pitchFamily="34" charset="0"/>
+              <a:buChar char="•"/>
+              <a:tabLst/>
+              <a:defRPr/>
+            </a:pPr>
+            <a:r>
+              <a:rPr lang="en-US" baseline="0" dirty="0" smtClean="0"/>
+              <a:t>No </a:t>
+            </a:r>
+            <a:r>
+              <a:rPr lang="en-US" baseline="0" dirty="0" err="1" smtClean="0"/>
+              <a:t>projeto</a:t>
+            </a:r>
+            <a:r>
+              <a:rPr lang="en-US" baseline="0" dirty="0" smtClean="0"/>
+              <a:t> MVC </a:t>
+            </a:r>
+            <a:r>
+              <a:rPr lang="en-US" baseline="0" dirty="0" err="1" smtClean="0"/>
+              <a:t>crie</a:t>
+            </a:r>
+            <a:r>
+              <a:rPr lang="en-US" baseline="0" dirty="0" smtClean="0"/>
+              <a:t> a </a:t>
+            </a:r>
+            <a:r>
+              <a:rPr lang="en-US" baseline="0" dirty="0" err="1" smtClean="0"/>
+              <a:t>ViewModel</a:t>
+            </a:r>
+            <a:r>
+              <a:rPr lang="en-US" baseline="0" dirty="0" smtClean="0"/>
+              <a:t> de </a:t>
+            </a:r>
+            <a:r>
+              <a:rPr lang="en-US" baseline="0" dirty="0" err="1" smtClean="0"/>
+              <a:t>Produto</a:t>
+            </a:r>
+            <a:endParaRPr lang="en-US" baseline="0" dirty="0" smtClean="0"/>
+          </a:p>
+          <a:p>
+            <a:pPr marL="171450" marR="0" indent="-171450" algn="l" defTabSz="914400" rtl="0" eaLnBrk="1" fontAlgn="auto" latinLnBrk="0" hangingPunct="1">
+              <a:lnSpc>
+                <a:spcPct val="100000"/>
+              </a:lnSpc>
+              <a:spcBef>
+                <a:spcPts val="0"/>
+              </a:spcBef>
+              <a:spcAft>
+                <a:spcPts val="0"/>
+              </a:spcAft>
+              <a:buClrTx/>
+              <a:buSzTx/>
+              <a:buFont typeface="Arial" panose="020B0604020202020204" pitchFamily="34" charset="0"/>
+              <a:buChar char="•"/>
+              <a:tabLst/>
+              <a:defRPr/>
+            </a:pPr>
+            <a:r>
+              <a:rPr lang="en-US" baseline="0" dirty="0" err="1" smtClean="0"/>
+              <a:t>Implante</a:t>
+            </a:r>
+            <a:r>
+              <a:rPr lang="en-US" baseline="0" dirty="0" smtClean="0"/>
+              <a:t> o </a:t>
+            </a:r>
+            <a:r>
+              <a:rPr lang="en-US" baseline="0" dirty="0" err="1" smtClean="0"/>
+              <a:t>automaper</a:t>
+            </a:r>
+            <a:r>
+              <a:rPr lang="en-US" baseline="0" dirty="0" smtClean="0"/>
+              <a:t> , </a:t>
+            </a:r>
+            <a:r>
+              <a:rPr lang="en-US" baseline="0" dirty="0" err="1" smtClean="0"/>
+              <a:t>AutomaperConfig</a:t>
+            </a:r>
+            <a:r>
+              <a:rPr lang="en-US" baseline="0" dirty="0" smtClean="0"/>
+              <a:t> , </a:t>
+            </a:r>
+            <a:r>
+              <a:rPr lang="en-US" baseline="0" dirty="0" err="1" smtClean="0"/>
+              <a:t>DomainToViewModelMappingProfile</a:t>
+            </a:r>
+            <a:r>
+              <a:rPr lang="en-US" baseline="0" dirty="0" smtClean="0"/>
+              <a:t>, </a:t>
+            </a:r>
+            <a:r>
+              <a:rPr lang="en-US" baseline="0" dirty="0" err="1" smtClean="0"/>
+              <a:t>ViewModelMappingToDomainProfile</a:t>
+            </a:r>
+            <a:r>
+              <a:rPr lang="en-US" baseline="0" dirty="0" smtClean="0"/>
+              <a:t>, </a:t>
+            </a:r>
+            <a:r>
+              <a:rPr lang="en-US" baseline="0" dirty="0" err="1" smtClean="0"/>
+              <a:t>intale</a:t>
+            </a:r>
+            <a:r>
+              <a:rPr lang="en-US" baseline="0" dirty="0" smtClean="0"/>
+              <a:t> o </a:t>
+            </a:r>
+            <a:r>
+              <a:rPr lang="en-US" baseline="0" dirty="0" err="1" smtClean="0"/>
+              <a:t>pacote</a:t>
+            </a:r>
+            <a:r>
+              <a:rPr lang="en-US" baseline="0" dirty="0" smtClean="0"/>
+              <a:t> </a:t>
+            </a:r>
+            <a:r>
+              <a:rPr lang="en-US" baseline="0" dirty="0" err="1" smtClean="0"/>
+              <a:t>AutoMapper</a:t>
+            </a:r>
+            <a:r>
+              <a:rPr lang="en-US" baseline="0" dirty="0" smtClean="0"/>
+              <a:t>.</a:t>
+            </a:r>
+          </a:p>
+          <a:p>
+            <a:pPr marL="171450" marR="0" indent="-171450" algn="l" defTabSz="914400" rtl="0" eaLnBrk="1" fontAlgn="auto" latinLnBrk="0" hangingPunct="1">
+              <a:lnSpc>
+                <a:spcPct val="100000"/>
+              </a:lnSpc>
+              <a:spcBef>
+                <a:spcPts val="0"/>
+              </a:spcBef>
+              <a:spcAft>
+                <a:spcPts val="0"/>
+              </a:spcAft>
+              <a:buClrTx/>
+              <a:buSzTx/>
+              <a:buFont typeface="Arial" panose="020B0604020202020204" pitchFamily="34" charset="0"/>
+              <a:buChar char="•"/>
+              <a:tabLst/>
+              <a:defRPr/>
+            </a:pPr>
+            <a:r>
+              <a:rPr lang="en-US" baseline="0" dirty="0" err="1" smtClean="0"/>
+              <a:t>Adicione</a:t>
+            </a:r>
+            <a:r>
+              <a:rPr lang="en-US" baseline="0" dirty="0" smtClean="0"/>
+              <a:t> no </a:t>
+            </a:r>
+            <a:r>
+              <a:rPr lang="en-US" baseline="0" dirty="0" err="1" smtClean="0"/>
+              <a:t>Global.asax</a:t>
+            </a:r>
+            <a:r>
+              <a:rPr lang="en-US" baseline="0" dirty="0" smtClean="0"/>
+              <a:t> o </a:t>
+            </a:r>
+            <a:r>
+              <a:rPr lang="en-US" baseline="0" dirty="0" err="1" smtClean="0"/>
+              <a:t>registro</a:t>
+            </a:r>
+            <a:r>
+              <a:rPr lang="en-US" baseline="0" dirty="0" smtClean="0"/>
+              <a:t> de </a:t>
+            </a:r>
+            <a:r>
+              <a:rPr lang="en-US" baseline="0" dirty="0" err="1" smtClean="0"/>
+              <a:t>automapper</a:t>
+            </a:r>
+            <a:r>
+              <a:rPr lang="en-US" baseline="0" dirty="0" smtClean="0"/>
+              <a:t>.</a:t>
+            </a:r>
+          </a:p>
+          <a:p>
+            <a:pPr marL="171450" marR="0" indent="-171450" algn="l" defTabSz="914400" rtl="0" eaLnBrk="1" fontAlgn="auto" latinLnBrk="0" hangingPunct="1">
+              <a:lnSpc>
+                <a:spcPct val="100000"/>
+              </a:lnSpc>
+              <a:spcBef>
+                <a:spcPts val="0"/>
+              </a:spcBef>
+              <a:spcAft>
+                <a:spcPts val="0"/>
+              </a:spcAft>
+              <a:buClrTx/>
+              <a:buSzTx/>
+              <a:buFont typeface="Arial" panose="020B0604020202020204" pitchFamily="34" charset="0"/>
+              <a:buChar char="•"/>
+              <a:tabLst/>
+              <a:defRPr/>
+            </a:pPr>
+            <a:r>
+              <a:rPr lang="en-US" baseline="0" dirty="0" err="1" smtClean="0"/>
+              <a:t>Criar</a:t>
+            </a:r>
+            <a:r>
+              <a:rPr lang="en-US" baseline="0" dirty="0" smtClean="0"/>
+              <a:t> a controller de </a:t>
+            </a:r>
+            <a:r>
+              <a:rPr lang="en-US" baseline="0" dirty="0" err="1" smtClean="0"/>
+              <a:t>cliente</a:t>
+            </a:r>
+            <a:r>
+              <a:rPr lang="en-US" baseline="0" dirty="0" smtClean="0"/>
+              <a:t>.</a:t>
+            </a:r>
+          </a:p>
+          <a:p>
+            <a:pPr marL="171450" marR="0" indent="-171450" algn="l" defTabSz="914400" rtl="0" eaLnBrk="1" fontAlgn="auto" latinLnBrk="0" hangingPunct="1">
+              <a:lnSpc>
+                <a:spcPct val="100000"/>
+              </a:lnSpc>
+              <a:spcBef>
+                <a:spcPts val="0"/>
+              </a:spcBef>
+              <a:spcAft>
+                <a:spcPts val="0"/>
+              </a:spcAft>
+              <a:buClrTx/>
+              <a:buSzTx/>
+              <a:buFont typeface="Arial" panose="020B0604020202020204" pitchFamily="34" charset="0"/>
+              <a:buChar char="•"/>
+              <a:tabLst/>
+              <a:defRPr/>
+            </a:pPr>
+            <a:r>
+              <a:rPr lang="en-US" baseline="0" dirty="0" err="1" smtClean="0"/>
+              <a:t>Criar</a:t>
+            </a:r>
+            <a:r>
+              <a:rPr lang="en-US" baseline="0" dirty="0" smtClean="0"/>
+              <a:t> a view index , </a:t>
+            </a:r>
+            <a:r>
+              <a:rPr lang="en-US" baseline="0" dirty="0" err="1" smtClean="0"/>
+              <a:t>criar</a:t>
+            </a:r>
+            <a:r>
+              <a:rPr lang="en-US" baseline="0" dirty="0" smtClean="0"/>
+              <a:t> a view de create</a:t>
+            </a:r>
+          </a:p>
+          <a:p>
+            <a:pPr marL="171450" marR="0" indent="-171450" algn="l" defTabSz="914400" rtl="0" eaLnBrk="1" fontAlgn="auto" latinLnBrk="0" hangingPunct="1">
+              <a:lnSpc>
+                <a:spcPct val="100000"/>
+              </a:lnSpc>
+              <a:spcBef>
+                <a:spcPts val="0"/>
+              </a:spcBef>
+              <a:spcAft>
+                <a:spcPts val="0"/>
+              </a:spcAft>
+              <a:buClrTx/>
+              <a:buSzTx/>
+              <a:buFont typeface="Arial" panose="020B0604020202020204" pitchFamily="34" charset="0"/>
+              <a:buChar char="•"/>
+              <a:tabLst/>
+              <a:defRPr/>
+            </a:pPr>
+            <a:r>
+              <a:rPr lang="en-US" baseline="0" dirty="0" err="1" smtClean="0"/>
+              <a:t>Em</a:t>
+            </a:r>
+            <a:r>
+              <a:rPr lang="en-US" baseline="0" dirty="0" smtClean="0"/>
+              <a:t> Domain interfaces </a:t>
+            </a:r>
+            <a:r>
+              <a:rPr lang="en-US" baseline="0" dirty="0" err="1" smtClean="0"/>
+              <a:t>crie</a:t>
+            </a:r>
+            <a:r>
+              <a:rPr lang="en-US" baseline="0" dirty="0" smtClean="0"/>
+              <a:t> </a:t>
+            </a:r>
+            <a:r>
+              <a:rPr lang="en-US" baseline="0" dirty="0" err="1" smtClean="0"/>
+              <a:t>na</a:t>
+            </a:r>
+            <a:r>
+              <a:rPr lang="en-US" baseline="0" dirty="0" smtClean="0"/>
+              <a:t> pasta de interfaces a pasta </a:t>
+            </a:r>
+            <a:r>
+              <a:rPr lang="en-US" baseline="0" dirty="0" err="1" smtClean="0"/>
+              <a:t>Serviços</a:t>
+            </a:r>
+            <a:r>
+              <a:rPr lang="en-US" baseline="0" dirty="0" smtClean="0"/>
+              <a:t>.</a:t>
+            </a:r>
+          </a:p>
+          <a:p>
+            <a:pPr marL="171450" marR="0" indent="-171450" algn="l" defTabSz="914400" rtl="0" eaLnBrk="1" fontAlgn="auto" latinLnBrk="0" hangingPunct="1">
+              <a:lnSpc>
+                <a:spcPct val="100000"/>
+              </a:lnSpc>
+              <a:spcBef>
+                <a:spcPts val="0"/>
+              </a:spcBef>
+              <a:spcAft>
+                <a:spcPts val="0"/>
+              </a:spcAft>
+              <a:buClrTx/>
+              <a:buSzTx/>
+              <a:buFont typeface="Arial" panose="020B0604020202020204" pitchFamily="34" charset="0"/>
+              <a:buChar char="•"/>
+              <a:tabLst/>
+              <a:defRPr/>
+            </a:pPr>
+            <a:r>
+              <a:rPr lang="en-US" baseline="0" dirty="0" err="1" smtClean="0"/>
+              <a:t>Crie</a:t>
+            </a:r>
+            <a:r>
+              <a:rPr lang="en-US" baseline="0" dirty="0" smtClean="0"/>
+              <a:t> a interface </a:t>
+            </a:r>
+            <a:r>
+              <a:rPr lang="en-US" baseline="0" dirty="0" err="1" smtClean="0"/>
+              <a:t>IServicesBase</a:t>
+            </a:r>
+            <a:endParaRPr lang="en-US" baseline="0" dirty="0" smtClean="0"/>
+          </a:p>
+          <a:p>
+            <a:pPr marL="171450" marR="0" indent="-171450" algn="l" defTabSz="914400" rtl="0" eaLnBrk="1" fontAlgn="auto" latinLnBrk="0" hangingPunct="1">
+              <a:lnSpc>
+                <a:spcPct val="100000"/>
+              </a:lnSpc>
+              <a:spcBef>
+                <a:spcPts val="0"/>
+              </a:spcBef>
+              <a:spcAft>
+                <a:spcPts val="0"/>
+              </a:spcAft>
+              <a:buClrTx/>
+              <a:buSzTx/>
+              <a:buFont typeface="Arial" panose="020B0604020202020204" pitchFamily="34" charset="0"/>
+              <a:buChar char="•"/>
+              <a:tabLst/>
+              <a:defRPr/>
+            </a:pPr>
+            <a:r>
+              <a:rPr lang="en-US" baseline="0" dirty="0" err="1" smtClean="0"/>
+              <a:t>Crie</a:t>
+            </a:r>
+            <a:r>
+              <a:rPr lang="en-US" baseline="0" dirty="0" smtClean="0"/>
+              <a:t> as interfaces de </a:t>
+            </a:r>
+            <a:r>
+              <a:rPr lang="en-US" baseline="0" dirty="0" err="1" smtClean="0"/>
+              <a:t>Cliente</a:t>
+            </a:r>
+            <a:r>
+              <a:rPr lang="en-US" baseline="0" dirty="0" smtClean="0"/>
+              <a:t> e </a:t>
+            </a:r>
+            <a:r>
+              <a:rPr lang="en-US" baseline="0" dirty="0" err="1" smtClean="0"/>
+              <a:t>Produto</a:t>
+            </a:r>
+            <a:r>
+              <a:rPr lang="en-US" baseline="0" dirty="0" smtClean="0"/>
+              <a:t> Service.</a:t>
+            </a:r>
+          </a:p>
+          <a:p>
+            <a:pPr marL="171450" marR="0" indent="-171450" algn="l" defTabSz="914400" rtl="0" eaLnBrk="1" fontAlgn="auto" latinLnBrk="0" hangingPunct="1">
+              <a:lnSpc>
+                <a:spcPct val="100000"/>
+              </a:lnSpc>
+              <a:spcBef>
+                <a:spcPts val="0"/>
+              </a:spcBef>
+              <a:spcAft>
+                <a:spcPts val="0"/>
+              </a:spcAft>
+              <a:buClrTx/>
+              <a:buSzTx/>
+              <a:buFont typeface="Arial" panose="020B0604020202020204" pitchFamily="34" charset="0"/>
+              <a:buChar char="•"/>
+              <a:tabLst/>
+              <a:defRPr/>
+            </a:pPr>
+            <a:r>
+              <a:rPr lang="en-US" baseline="0" dirty="0" err="1" smtClean="0"/>
+              <a:t>Crie</a:t>
+            </a:r>
+            <a:r>
+              <a:rPr lang="en-US" baseline="0" dirty="0" smtClean="0"/>
+              <a:t> a </a:t>
+            </a:r>
+            <a:r>
+              <a:rPr lang="en-US" baseline="0" dirty="0" err="1" smtClean="0"/>
+              <a:t>implementação</a:t>
+            </a:r>
+            <a:r>
+              <a:rPr lang="en-US" baseline="0" dirty="0" smtClean="0"/>
+              <a:t> de </a:t>
+            </a:r>
+            <a:r>
+              <a:rPr lang="en-US" baseline="0" dirty="0" err="1" smtClean="0"/>
+              <a:t>IServicesBase</a:t>
+            </a:r>
+            <a:r>
+              <a:rPr lang="en-US" baseline="0" dirty="0" smtClean="0"/>
+              <a:t> , </a:t>
+            </a:r>
+            <a:r>
+              <a:rPr lang="en-US" baseline="0" dirty="0" err="1" smtClean="0"/>
+              <a:t>Cliente</a:t>
+            </a:r>
+            <a:r>
+              <a:rPr lang="en-US" baseline="0" dirty="0" smtClean="0"/>
+              <a:t> e </a:t>
+            </a:r>
+            <a:r>
+              <a:rPr lang="en-US" baseline="0" dirty="0" err="1" smtClean="0"/>
+              <a:t>Produto</a:t>
+            </a:r>
+            <a:endParaRPr lang="en-US" baseline="0" dirty="0" smtClean="0"/>
+          </a:p>
+          <a:p>
+            <a:pPr marL="171450" marR="0" indent="-171450" algn="l" defTabSz="914400" rtl="0" eaLnBrk="1" fontAlgn="auto" latinLnBrk="0" hangingPunct="1">
+              <a:lnSpc>
+                <a:spcPct val="100000"/>
+              </a:lnSpc>
+              <a:spcBef>
+                <a:spcPts val="0"/>
+              </a:spcBef>
+              <a:spcAft>
+                <a:spcPts val="0"/>
+              </a:spcAft>
+              <a:buClrTx/>
+              <a:buSzTx/>
+              <a:buFont typeface="Arial" panose="020B0604020202020204" pitchFamily="34" charset="0"/>
+              <a:buChar char="•"/>
+              <a:tabLst/>
+              <a:defRPr/>
+            </a:pPr>
+            <a:r>
+              <a:rPr lang="en-US" baseline="0" dirty="0" smtClean="0"/>
+              <a:t>Na </a:t>
+            </a:r>
+            <a:r>
+              <a:rPr lang="en-US" baseline="0" dirty="0" err="1" smtClean="0"/>
+              <a:t>camada</a:t>
+            </a:r>
+            <a:r>
+              <a:rPr lang="en-US" baseline="0" dirty="0" smtClean="0"/>
+              <a:t> de </a:t>
+            </a:r>
+            <a:r>
+              <a:rPr lang="en-US" baseline="0" dirty="0" err="1" smtClean="0"/>
+              <a:t>aplicação</a:t>
+            </a:r>
+            <a:r>
+              <a:rPr lang="en-US" baseline="0" dirty="0" smtClean="0"/>
+              <a:t> </a:t>
+            </a:r>
+            <a:r>
+              <a:rPr lang="en-US" baseline="0" dirty="0" err="1" smtClean="0"/>
+              <a:t>crie</a:t>
+            </a:r>
+            <a:r>
+              <a:rPr lang="en-US" baseline="0" dirty="0" smtClean="0"/>
+              <a:t> a pasta Interface e </a:t>
+            </a:r>
+            <a:r>
+              <a:rPr lang="en-US" baseline="0" dirty="0" err="1" smtClean="0"/>
+              <a:t>crie</a:t>
+            </a:r>
+            <a:r>
+              <a:rPr lang="en-US" baseline="0" dirty="0" smtClean="0"/>
+              <a:t> a interface </a:t>
+            </a:r>
+            <a:r>
+              <a:rPr lang="en-US" baseline="0" dirty="0" err="1" smtClean="0"/>
+              <a:t>IAppServiceBase</a:t>
+            </a:r>
+            <a:endParaRPr lang="en-US" baseline="0" dirty="0" smtClean="0"/>
+          </a:p>
+          <a:p>
+            <a:pPr marL="171450" marR="0" indent="-171450" algn="l" defTabSz="914400" rtl="0" eaLnBrk="1" fontAlgn="auto" latinLnBrk="0" hangingPunct="1">
+              <a:lnSpc>
+                <a:spcPct val="100000"/>
+              </a:lnSpc>
+              <a:spcBef>
+                <a:spcPts val="0"/>
+              </a:spcBef>
+              <a:spcAft>
+                <a:spcPts val="0"/>
+              </a:spcAft>
+              <a:buClrTx/>
+              <a:buSzTx/>
+              <a:buFont typeface="Arial" panose="020B0604020202020204" pitchFamily="34" charset="0"/>
+              <a:buChar char="•"/>
+              <a:tabLst/>
+              <a:defRPr/>
+            </a:pPr>
+            <a:r>
+              <a:rPr lang="en-US" baseline="0" dirty="0" err="1" smtClean="0"/>
+              <a:t>Crie</a:t>
+            </a:r>
+            <a:r>
+              <a:rPr lang="en-US" baseline="0" dirty="0" smtClean="0"/>
+              <a:t> as interfaces </a:t>
+            </a:r>
+            <a:r>
+              <a:rPr lang="en-US" baseline="0" dirty="0" err="1" smtClean="0"/>
+              <a:t>especializadas</a:t>
+            </a:r>
+            <a:r>
+              <a:rPr lang="en-US" baseline="0" dirty="0" smtClean="0"/>
+              <a:t>.</a:t>
+            </a:r>
+          </a:p>
+          <a:p>
+            <a:pPr marL="171450" marR="0" indent="-171450" algn="l" defTabSz="914400" rtl="0" eaLnBrk="1" fontAlgn="auto" latinLnBrk="0" hangingPunct="1">
+              <a:lnSpc>
+                <a:spcPct val="100000"/>
+              </a:lnSpc>
+              <a:spcBef>
+                <a:spcPts val="0"/>
+              </a:spcBef>
+              <a:spcAft>
+                <a:spcPts val="0"/>
+              </a:spcAft>
+              <a:buClrTx/>
+              <a:buSzTx/>
+              <a:buFont typeface="Arial" panose="020B0604020202020204" pitchFamily="34" charset="0"/>
+              <a:buChar char="•"/>
+              <a:tabLst/>
+              <a:defRPr/>
+            </a:pPr>
+            <a:r>
+              <a:rPr lang="en-US" baseline="0" dirty="0" err="1" smtClean="0"/>
+              <a:t>Implemente</a:t>
+            </a:r>
+            <a:r>
+              <a:rPr lang="en-US" baseline="0" dirty="0" smtClean="0"/>
+              <a:t> as interfaces da </a:t>
+            </a:r>
+            <a:r>
+              <a:rPr lang="en-US" baseline="0" dirty="0" err="1" smtClean="0"/>
+              <a:t>camada</a:t>
+            </a:r>
+            <a:r>
+              <a:rPr lang="en-US" baseline="0" dirty="0" smtClean="0"/>
+              <a:t> de application</a:t>
+            </a:r>
+          </a:p>
+          <a:p>
+            <a:pPr marL="171450" marR="0" indent="-171450" algn="l" defTabSz="914400" rtl="0" eaLnBrk="1" fontAlgn="auto" latinLnBrk="0" hangingPunct="1">
+              <a:lnSpc>
+                <a:spcPct val="100000"/>
+              </a:lnSpc>
+              <a:spcBef>
+                <a:spcPts val="0"/>
+              </a:spcBef>
+              <a:spcAft>
+                <a:spcPts val="0"/>
+              </a:spcAft>
+              <a:buClrTx/>
+              <a:buSzTx/>
+              <a:buFont typeface="Arial" panose="020B0604020202020204" pitchFamily="34" charset="0"/>
+              <a:buChar char="•"/>
+              <a:tabLst/>
+              <a:defRPr/>
+            </a:pPr>
+            <a:r>
+              <a:rPr lang="en-US" baseline="0" dirty="0" err="1" smtClean="0"/>
+              <a:t>Atualize</a:t>
+            </a:r>
+            <a:r>
+              <a:rPr lang="en-US" baseline="0" dirty="0" smtClean="0"/>
+              <a:t> a </a:t>
+            </a:r>
+            <a:r>
+              <a:rPr lang="en-US" baseline="0" dirty="0" err="1" smtClean="0"/>
+              <a:t>camada</a:t>
+            </a:r>
+            <a:r>
+              <a:rPr lang="en-US" baseline="0" dirty="0" smtClean="0"/>
+              <a:t> controller para </a:t>
+            </a:r>
+            <a:r>
+              <a:rPr lang="en-US" baseline="0" dirty="0" err="1" smtClean="0"/>
+              <a:t>usar</a:t>
+            </a:r>
+            <a:r>
+              <a:rPr lang="en-US" baseline="0" dirty="0" smtClean="0"/>
+              <a:t> </a:t>
+            </a:r>
+            <a:r>
+              <a:rPr lang="en-US" baseline="0" dirty="0" err="1" smtClean="0"/>
+              <a:t>apenas</a:t>
+            </a:r>
+            <a:r>
+              <a:rPr lang="en-US" baseline="0" dirty="0" smtClean="0"/>
+              <a:t> a </a:t>
+            </a:r>
+            <a:r>
+              <a:rPr lang="en-US" baseline="0" dirty="0" err="1" smtClean="0"/>
+              <a:t>camada</a:t>
+            </a:r>
+            <a:r>
+              <a:rPr lang="en-US" baseline="0" dirty="0" smtClean="0"/>
+              <a:t> de </a:t>
+            </a:r>
+            <a:r>
+              <a:rPr lang="en-US" baseline="0" dirty="0" err="1" smtClean="0"/>
+              <a:t>Aplicação</a:t>
+            </a:r>
+            <a:r>
+              <a:rPr lang="en-US" baseline="0" dirty="0" smtClean="0"/>
+              <a:t>.</a:t>
+            </a:r>
+          </a:p>
+          <a:p>
+            <a:pPr marL="171450" marR="0" indent="-171450" algn="l" defTabSz="914400" rtl="0" eaLnBrk="1" fontAlgn="auto" latinLnBrk="0" hangingPunct="1">
+              <a:lnSpc>
+                <a:spcPct val="100000"/>
+              </a:lnSpc>
+              <a:spcBef>
+                <a:spcPts val="0"/>
+              </a:spcBef>
+              <a:spcAft>
+                <a:spcPts val="0"/>
+              </a:spcAft>
+              <a:buClrTx/>
+              <a:buSzTx/>
+              <a:buFont typeface="Arial" panose="020B0604020202020204" pitchFamily="34" charset="0"/>
+              <a:buChar char="•"/>
+              <a:tabLst/>
+              <a:defRPr/>
+            </a:pPr>
+            <a:r>
+              <a:rPr lang="en-US" baseline="0" dirty="0" smtClean="0"/>
+              <a:t>Teste a </a:t>
+            </a:r>
+            <a:r>
+              <a:rPr lang="en-US" baseline="0" dirty="0" err="1" smtClean="0"/>
+              <a:t>a</a:t>
+            </a:r>
+            <a:r>
+              <a:rPr lang="en-US" baseline="0" dirty="0" smtClean="0"/>
+              <a:t> </a:t>
+            </a:r>
+            <a:r>
+              <a:rPr lang="en-US" baseline="0" dirty="0" err="1" smtClean="0"/>
+              <a:t>plicação</a:t>
+            </a:r>
+            <a:r>
+              <a:rPr lang="en-US" baseline="0" dirty="0" smtClean="0"/>
+              <a:t> e </a:t>
+            </a:r>
+            <a:r>
+              <a:rPr lang="en-US" baseline="0" dirty="0" err="1" smtClean="0"/>
+              <a:t>mostre</a:t>
+            </a:r>
+            <a:r>
+              <a:rPr lang="en-US" baseline="0" dirty="0" smtClean="0"/>
+              <a:t> o </a:t>
+            </a:r>
+            <a:r>
+              <a:rPr lang="en-US" baseline="0" dirty="0" err="1" smtClean="0"/>
+              <a:t>problema</a:t>
+            </a:r>
+            <a:r>
+              <a:rPr lang="en-US" baseline="0" dirty="0" smtClean="0"/>
+              <a:t> que </a:t>
+            </a:r>
+            <a:r>
+              <a:rPr lang="en-US" baseline="0" dirty="0" err="1" smtClean="0"/>
+              <a:t>ocorreu</a:t>
+            </a:r>
+            <a:r>
+              <a:rPr lang="en-US" baseline="0" dirty="0" smtClean="0"/>
+              <a:t> </a:t>
+            </a:r>
+            <a:r>
+              <a:rPr lang="en-US" baseline="0" dirty="0" err="1" smtClean="0"/>
+              <a:t>pois</a:t>
+            </a:r>
+            <a:r>
+              <a:rPr lang="en-US" baseline="0" dirty="0" smtClean="0"/>
+              <a:t> para o controller </a:t>
+            </a:r>
+            <a:r>
+              <a:rPr lang="en-US" baseline="0" dirty="0" err="1" smtClean="0"/>
+              <a:t>Cliente</a:t>
+            </a:r>
+            <a:r>
+              <a:rPr lang="en-US" baseline="0" dirty="0" smtClean="0"/>
+              <a:t>.</a:t>
+            </a:r>
+          </a:p>
+          <a:p>
+            <a:pPr marL="171450" marR="0" indent="-171450" algn="l" defTabSz="914400" rtl="0" eaLnBrk="1" fontAlgn="auto" latinLnBrk="0" hangingPunct="1">
+              <a:lnSpc>
+                <a:spcPct val="100000"/>
+              </a:lnSpc>
+              <a:spcBef>
+                <a:spcPts val="0"/>
+              </a:spcBef>
+              <a:spcAft>
+                <a:spcPts val="0"/>
+              </a:spcAft>
+              <a:buClrTx/>
+              <a:buSzTx/>
+              <a:buFont typeface="Arial" panose="020B0604020202020204" pitchFamily="34" charset="0"/>
+              <a:buChar char="•"/>
+              <a:tabLst/>
+              <a:defRPr/>
+            </a:pPr>
+            <a:r>
+              <a:rPr lang="en-US" baseline="0" dirty="0" err="1" smtClean="0"/>
+              <a:t>Instalando</a:t>
+            </a:r>
+            <a:r>
+              <a:rPr lang="en-US" baseline="0" dirty="0" smtClean="0"/>
+              <a:t> o </a:t>
+            </a:r>
+            <a:r>
+              <a:rPr lang="en-US" baseline="0" dirty="0" err="1" smtClean="0"/>
+              <a:t>SimpleInject</a:t>
+            </a:r>
+            <a:r>
+              <a:rPr lang="en-US" baseline="0" dirty="0" smtClean="0"/>
+              <a:t>  “Install-</a:t>
+            </a:r>
+            <a:r>
+              <a:rPr lang="en-US" baseline="0" dirty="0" err="1" smtClean="0"/>
+              <a:t>Packege</a:t>
+            </a:r>
+            <a:r>
+              <a:rPr lang="en-US" baseline="0" smtClean="0"/>
+              <a:t> Ninject.MVC5”</a:t>
+            </a:r>
+          </a:p>
+          <a:p>
+            <a:pPr marL="171450" marR="0" indent="-171450" algn="l" defTabSz="914400" rtl="0" eaLnBrk="1" fontAlgn="auto" latinLnBrk="0" hangingPunct="1">
+              <a:lnSpc>
+                <a:spcPct val="100000"/>
+              </a:lnSpc>
+              <a:spcBef>
+                <a:spcPts val="0"/>
+              </a:spcBef>
+              <a:spcAft>
+                <a:spcPts val="0"/>
+              </a:spcAft>
+              <a:buClrTx/>
+              <a:buSzTx/>
+              <a:buFont typeface="Arial" panose="020B0604020202020204" pitchFamily="34" charset="0"/>
+              <a:buChar char="•"/>
+              <a:tabLst/>
+              <a:defRPr/>
+            </a:pPr>
+            <a:endParaRPr lang="en-US" baseline="0" dirty="0" smtClean="0"/>
+          </a:p>
+          <a:p>
+            <a:pPr marL="171450" marR="0" indent="-171450" algn="l" defTabSz="914400" rtl="0" eaLnBrk="1" fontAlgn="auto" latinLnBrk="0" hangingPunct="1">
+              <a:lnSpc>
+                <a:spcPct val="100000"/>
+              </a:lnSpc>
+              <a:spcBef>
+                <a:spcPts val="0"/>
+              </a:spcBef>
+              <a:spcAft>
+                <a:spcPts val="0"/>
+              </a:spcAft>
+              <a:buClrTx/>
+              <a:buSzTx/>
+              <a:buFont typeface="Arial" panose="020B0604020202020204" pitchFamily="34" charset="0"/>
+              <a:buChar char="•"/>
+              <a:tabLst/>
+              <a:defRPr/>
+            </a:pPr>
+            <a:r>
+              <a:rPr lang="en-US" baseline="0" dirty="0" smtClean="0"/>
+              <a:t> </a:t>
+            </a:r>
+          </a:p>
+          <a:p>
+            <a:pPr marL="171450" marR="0" indent="-171450" algn="l" defTabSz="914400" rtl="0" eaLnBrk="1" fontAlgn="auto" latinLnBrk="0" hangingPunct="1">
+              <a:lnSpc>
+                <a:spcPct val="100000"/>
+              </a:lnSpc>
+              <a:spcBef>
+                <a:spcPts val="0"/>
+              </a:spcBef>
+              <a:spcAft>
+                <a:spcPts val="0"/>
+              </a:spcAft>
+              <a:buClrTx/>
+              <a:buSzTx/>
+              <a:buFont typeface="Arial" panose="020B0604020202020204" pitchFamily="34" charset="0"/>
+              <a:buChar char="•"/>
+              <a:tabLst/>
+              <a:defRPr/>
+            </a:pPr>
+            <a:endParaRPr lang="en-US" baseline="0" dirty="0" smtClean="0"/>
+          </a:p>
+          <a:p>
+            <a:pPr marL="171450" marR="0" indent="-171450" algn="l" defTabSz="914400" rtl="0" eaLnBrk="1" fontAlgn="auto" latinLnBrk="0" hangingPunct="1">
+              <a:lnSpc>
+                <a:spcPct val="100000"/>
+              </a:lnSpc>
+              <a:spcBef>
+                <a:spcPts val="0"/>
+              </a:spcBef>
+              <a:spcAft>
+                <a:spcPts val="0"/>
+              </a:spcAft>
+              <a:buClrTx/>
+              <a:buSzTx/>
+              <a:buFont typeface="Arial" panose="020B0604020202020204" pitchFamily="34" charset="0"/>
+              <a:buChar char="•"/>
+              <a:tabLst/>
+              <a:defRPr/>
+            </a:pPr>
+            <a:endParaRPr lang="en-US" baseline="0" dirty="0" smtClean="0"/>
+          </a:p>
+          <a:p>
+            <a:pPr marL="171450" indent="-171450">
+              <a:buFont typeface="Arial" panose="020B0604020202020204" pitchFamily="34" charset="0"/>
+              <a:buChar char="•"/>
+            </a:pPr>
+            <a:endParaRPr lang="en-US" baseline="0" dirty="0" smtClean="0"/>
+          </a:p>
+          <a:p>
+            <a:pPr marL="171450" indent="-171450">
+              <a:buFont typeface="Arial" panose="020B0604020202020204" pitchFamily="34" charset="0"/>
+              <a:buChar char="•"/>
+            </a:pPr>
+            <a:endParaRPr lang="en-US" dirty="0"/>
+          </a:p>
+        </p:txBody>
+      </p:sp>
+      <p:sp>
+        <p:nvSpPr>
+          <p:cNvPr id="4" name="Slide Number Placeholder 3"/>
+          <p:cNvSpPr>
+            <a:spLocks noGrp="1"/>
+          </p:cNvSpPr>
+          <p:nvPr>
+            <p:ph type="sldNum" sz="quarter" idx="10"/>
+          </p:nvPr>
+        </p:nvSpPr>
+        <p:spPr/>
+        <p:txBody>
+          <a:bodyPr/>
+          <a:lstStyle/>
+          <a:p>
+            <a:fld id="{DF61EA0F-A667-4B49-8422-0062BC55E249}" type="slidenum">
+              <a:rPr lang="en-US" smtClean="0"/>
+              <a:t>33</a:t>
+            </a:fld>
+            <a:endParaRPr lang="en-US"/>
+          </a:p>
+        </p:txBody>
+      </p:sp>
+    </p:spTree>
+    <p:extLst>
+      <p:ext uri="{BB962C8B-B14F-4D97-AF65-F5344CB8AC3E}">
+        <p14:creationId xmlns:p14="http://schemas.microsoft.com/office/powerpoint/2010/main" val="2608541470"/>
+      </p:ext>
+    </p:extLst>
+  </p:cSld>
+  <p:clrMapOvr>
+    <a:masterClrMapping/>
+  </p:clrMapOvr>
+</p:notes>
+</file>
+
+<file path=ppt/notesSlides/notesSlide5.xml><?xml version="1.0" encoding="utf-8"?>
+<p:notes xmlns:a="http://schemas.openxmlformats.org/drawingml/2006/main" xmlns:r="http://schemas.openxmlformats.org/officeDocument/2006/relationships" xmlns:p="http://schemas.openxmlformats.org/presentationml/2006/main">
+  <p:cSld>
+    <p:spTree>
+      <p:nvGrpSpPr>
+        <p:cNvPr id="1" name=""/>
+        <p:cNvGrpSpPr/>
+        <p:nvPr/>
+      </p:nvGrpSpPr>
+      <p:grpSpPr>
+        <a:xfrm>
+          <a:off x="0" y="0"/>
+          <a:ext cx="0" cy="0"/>
+          <a:chOff x="0" y="0"/>
+          <a:chExt cx="0" cy="0"/>
+        </a:xfrm>
+      </p:grpSpPr>
+      <p:sp>
+        <p:nvSpPr>
+          <p:cNvPr id="2" name="Slide Image Placeholder 1"/>
+          <p:cNvSpPr>
+            <a:spLocks noGrp="1" noRot="1" noChangeAspect="1"/>
+          </p:cNvSpPr>
+          <p:nvPr>
+            <p:ph type="sldImg"/>
+          </p:nvPr>
+        </p:nvSpPr>
+        <p:spPr>
+          <a:xfrm>
+            <a:off x="685800" y="1143000"/>
+            <a:ext cx="5486400" cy="3086100"/>
+          </a:xfrm>
+        </p:spPr>
+      </p:sp>
+      <p:sp>
+        <p:nvSpPr>
+          <p:cNvPr id="3" name="Notes Placeholder 2"/>
+          <p:cNvSpPr>
+            <a:spLocks noGrp="1"/>
+          </p:cNvSpPr>
+          <p:nvPr>
+            <p:ph type="body" idx="1"/>
+          </p:nvPr>
+        </p:nvSpPr>
+        <p:spPr/>
+        <p:txBody>
+          <a:bodyPr/>
+          <a:lstStyle/>
+          <a:p>
             <a:r>
               <a:rPr lang="en-US" dirty="0"/>
               <a:t>In </a:t>
@@ -39862,7 +44470,7 @@
           <a:p>
             <a:fld id="{DF61EA0F-A667-4B49-8422-0062BC55E249}" type="slidenum">
               <a:rPr lang="en-US" smtClean="0"/>
-              <a:t>33</a:t>
+              <a:t>34</a:t>
             </a:fld>
             <a:endParaRPr lang="en-US"/>
           </a:p>
@@ -40320,7 +44928,7 @@
             <a:fld id="{8BEEBAAA-29B5-4AF5-BC5F-7E580C29002D}" type="datetimeFigureOut">
               <a:rPr lang="en-US" smtClean="0"/>
               <a:pPr/>
-              <a:t>1/4/2018</a:t>
+              <a:t>1/5/2018</a:t>
             </a:fld>
             <a:endParaRPr lang="en-US" dirty="0"/>
           </a:p>
@@ -40981,7 +45589,7 @@
             <a:fld id="{8BEEBAAA-29B5-4AF5-BC5F-7E580C29002D}" type="datetimeFigureOut">
               <a:rPr lang="en-US" smtClean="0"/>
               <a:pPr/>
-              <a:t>1/4/2018</a:t>
+              <a:t>1/5/2018</a:t>
             </a:fld>
             <a:endParaRPr lang="en-US" dirty="0"/>
           </a:p>
@@ -45993,6 +50601,58 @@
           <a:chExt cx="0" cy="0"/>
         </a:xfrm>
       </p:grpSpPr>
+      <p:graphicFrame>
+        <p:nvGraphicFramePr>
+          <p:cNvPr id="4" name="Diagram 3"/>
+          <p:cNvGraphicFramePr/>
+          <p:nvPr>
+            <p:extLst>
+              <p:ext uri="{D42A27DB-BD31-4B8C-83A1-F6EECF244321}">
+                <p14:modId xmlns:p14="http://schemas.microsoft.com/office/powerpoint/2010/main" val="1621586680"/>
+              </p:ext>
+            </p:extLst>
+          </p:nvPr>
+        </p:nvGraphicFramePr>
+        <p:xfrm>
+          <a:off x="838200" y="1164323"/>
+          <a:ext cx="10515600" cy="4700899"/>
+        </p:xfrm>
+        <a:graphic>
+          <a:graphicData uri="http://schemas.openxmlformats.org/drawingml/2006/diagram">
+            <dgm:relIds xmlns:dgm="http://schemas.openxmlformats.org/drawingml/2006/diagram" xmlns:r="http://schemas.openxmlformats.org/officeDocument/2006/relationships" r:dm="rId3" r:lo="rId4" r:qs="rId5" r:cs="rId6"/>
+          </a:graphicData>
+        </a:graphic>
+      </p:graphicFrame>
+    </p:spTree>
+    <p:extLst>
+      <p:ext uri="{BB962C8B-B14F-4D97-AF65-F5344CB8AC3E}">
+        <p14:creationId xmlns:p14="http://schemas.microsoft.com/office/powerpoint/2010/main" val="3363320632"/>
+      </p:ext>
+    </p:extLst>
+  </p:cSld>
+  <p:clrMapOvr>
+    <a:masterClrMapping/>
+  </p:clrMapOvr>
+</p:sld>
+</file>
+
+<file path=ppt/slides/slide34.xml><?xml version="1.0" encoding="utf-8"?>
+<p:sld xmlns:a="http://schemas.openxmlformats.org/drawingml/2006/main" xmlns:r="http://schemas.openxmlformats.org/officeDocument/2006/relationships" xmlns:p="http://schemas.openxmlformats.org/presentationml/2006/main">
+  <p:cSld>
+    <p:spTree>
+      <p:nvGrpSpPr>
+        <p:cNvPr id="1" name=""/>
+        <p:cNvGrpSpPr/>
+        <p:nvPr/>
+      </p:nvGrpSpPr>
+      <p:grpSpPr>
+        <a:xfrm>
+          <a:off x="0" y="0"/>
+          <a:ext cx="0" cy="0"/>
+          <a:chOff x="0" y="0"/>
+          <a:chExt cx="0" cy="0"/>
+        </a:xfrm>
+      </p:grpSpPr>
       <p:sp>
         <p:nvSpPr>
           <p:cNvPr id="10" name="Title 9"/>

</xml_diff>